<commit_message>
updated powerpoint with Gantt chart
</commit_message>
<xml_diff>
--- a/Team Deliverable 4/Final Presentation - FHIRed Up.pptx
+++ b/Team Deliverable 4/Final Presentation - FHIRed Up.pptx
@@ -146,6 +146,1570 @@
 </p:cmAuthorLst>
 </file>
 
+<file path=ppt/charts/chart1.xml><?xml version="1.0" encoding="utf-8"?>
+<c:chartSpace xmlns:c="http://schemas.openxmlformats.org/drawingml/2006/chart" xmlns:a="http://schemas.openxmlformats.org/drawingml/2006/main" xmlns:r="http://schemas.openxmlformats.org/officeDocument/2006/relationships" xmlns:c16r2="http://schemas.microsoft.com/office/drawing/2015/06/chart">
+  <c:date1904 val="0"/>
+  <c:lang val="en-US"/>
+  <c:roundedCorners val="0"/>
+  <mc:AlternateContent xmlns:mc="http://schemas.openxmlformats.org/markup-compatibility/2006">
+    <mc:Choice xmlns:c14="http://schemas.microsoft.com/office/drawing/2007/8/2/chart" Requires="c14">
+      <c14:style val="102"/>
+    </mc:Choice>
+    <mc:Fallback>
+      <c:style val="2"/>
+    </mc:Fallback>
+  </mc:AlternateContent>
+  <c:chart>
+    <c:autoTitleDeleted val="0"/>
+    <c:plotArea>
+      <c:layout>
+        <c:manualLayout>
+          <c:layoutTarget val="inner"/>
+          <c:xMode val="edge"/>
+          <c:yMode val="edge"/>
+          <c:x val="1.6865992026985587E-2"/>
+          <c:y val="3.0128731854286498E-2"/>
+          <c:w val="0.96626801594602885"/>
+          <c:h val="0.79717432609337968"/>
+        </c:manualLayout>
+      </c:layout>
+      <c:scatterChart>
+        <c:scatterStyle val="lineMarker"/>
+        <c:varyColors val="0"/>
+        <c:ser>
+          <c:idx val="0"/>
+          <c:order val="0"/>
+          <c:tx>
+            <c:strRef>
+              <c:f>Sheet1!$A$4</c:f>
+              <c:strCache>
+                <c:ptCount val="1"/>
+                <c:pt idx="0">
+                  <c:v>   Scope</c:v>
+                </c:pt>
+              </c:strCache>
+            </c:strRef>
+          </c:tx>
+          <c:spPr>
+            <a:ln w="50800">
+              <a:solidFill>
+                <a:srgbClr val="7030A0"/>
+              </a:solidFill>
+            </a:ln>
+          </c:spPr>
+          <c:marker>
+            <c:symbol val="none"/>
+          </c:marker>
+          <c:dLbls>
+            <c:dLbl>
+              <c:idx val="0"/>
+              <c:tx>
+                <c:rich>
+                  <a:bodyPr/>
+                  <a:lstStyle/>
+                  <a:p>
+                    <a:fld id="{C4C9D91C-A7AE-43EB-B248-AF46F2AED4D3}" type="SERIESNAME">
+                      <a:rPr lang="en-US" smtClean="0"/>
+                      <a:pPr/>
+                      <a:t>[SERIES NAME]</a:t>
+                    </a:fld>
+                    <a:r>
+                      <a:rPr lang="en-US"/>
+                      <a:t>*</a:t>
+                    </a:r>
+                  </a:p>
+                </c:rich>
+              </c:tx>
+              <c:dLblPos val="t"/>
+              <c:showLegendKey val="0"/>
+              <c:showVal val="0"/>
+              <c:showCatName val="0"/>
+              <c:showSerName val="1"/>
+              <c:showPercent val="0"/>
+              <c:showBubbleSize val="0"/>
+              <c:extLst>
+                <c:ext xmlns:c15="http://schemas.microsoft.com/office/drawing/2012/chart" uri="{CE6537A1-D6FC-4f65-9D91-7224C49458BB}">
+                  <c15:dlblFieldTable/>
+                  <c15:showDataLabelsRange val="0"/>
+                </c:ext>
+                <c:ext xmlns:c16="http://schemas.microsoft.com/office/drawing/2014/chart" uri="{C3380CC4-5D6E-409C-BE32-E72D297353CC}">
+                  <c16:uniqueId val="{0000001F-8090-479E-BF1A-EA59472E2D6D}"/>
+                </c:ext>
+              </c:extLst>
+            </c:dLbl>
+            <c:dLbl>
+              <c:idx val="1"/>
+              <c:delete val="1"/>
+              <c:extLst>
+                <c:ext xmlns:c15="http://schemas.microsoft.com/office/drawing/2012/chart" uri="{CE6537A1-D6FC-4f65-9D91-7224C49458BB}"/>
+                <c:ext xmlns:c16="http://schemas.microsoft.com/office/drawing/2014/chart" uri="{C3380CC4-5D6E-409C-BE32-E72D297353CC}">
+                  <c16:uniqueId val="{00000000-8090-479E-BF1A-EA59472E2D6D}"/>
+                </c:ext>
+              </c:extLst>
+            </c:dLbl>
+            <c:spPr>
+              <a:noFill/>
+              <a:ln>
+                <a:noFill/>
+              </a:ln>
+              <a:effectLst/>
+            </c:spPr>
+            <c:dLblPos val="t"/>
+            <c:showLegendKey val="0"/>
+            <c:showVal val="0"/>
+            <c:showCatName val="0"/>
+            <c:showSerName val="1"/>
+            <c:showPercent val="0"/>
+            <c:showBubbleSize val="0"/>
+            <c:showLeaderLines val="0"/>
+            <c:extLst>
+              <c:ext xmlns:c15="http://schemas.microsoft.com/office/drawing/2012/chart" uri="{CE6537A1-D6FC-4f65-9D91-7224C49458BB}">
+                <c15:showLeaderLines val="0"/>
+              </c:ext>
+            </c:extLst>
+          </c:dLbls>
+          <c:xVal>
+            <c:numRef>
+              <c:f>(Sheet1!$C$4,Sheet1!$E$4)</c:f>
+              <c:numCache>
+                <c:formatCode>m/d/yyyy</c:formatCode>
+                <c:ptCount val="2"/>
+                <c:pt idx="0">
+                  <c:v>42415</c:v>
+                </c:pt>
+                <c:pt idx="1">
+                  <c:v>42417</c:v>
+                </c:pt>
+              </c:numCache>
+            </c:numRef>
+          </c:xVal>
+          <c:yVal>
+            <c:numRef>
+              <c:f>(Sheet1!$D$4,Sheet1!$F$4)</c:f>
+              <c:numCache>
+                <c:formatCode>0.00</c:formatCode>
+                <c:ptCount val="2"/>
+                <c:pt idx="0">
+                  <c:v>6</c:v>
+                </c:pt>
+                <c:pt idx="1">
+                  <c:v>6</c:v>
+                </c:pt>
+              </c:numCache>
+            </c:numRef>
+          </c:yVal>
+          <c:smooth val="0"/>
+          <c:extLst>
+            <c:ext xmlns:c16="http://schemas.microsoft.com/office/drawing/2014/chart" uri="{C3380CC4-5D6E-409C-BE32-E72D297353CC}">
+              <c16:uniqueId val="{00000001-8090-479E-BF1A-EA59472E2D6D}"/>
+            </c:ext>
+          </c:extLst>
+        </c:ser>
+        <c:ser>
+          <c:idx val="1"/>
+          <c:order val="1"/>
+          <c:tx>
+            <c:strRef>
+              <c:f>Sheet1!$A$5</c:f>
+              <c:strCache>
+                <c:ptCount val="1"/>
+                <c:pt idx="0">
+                  <c:v>   Analysis/Software Requirements</c:v>
+                </c:pt>
+              </c:strCache>
+            </c:strRef>
+          </c:tx>
+          <c:spPr>
+            <a:ln w="50800">
+              <a:solidFill>
+                <a:srgbClr val="00B0F0"/>
+              </a:solidFill>
+            </a:ln>
+          </c:spPr>
+          <c:marker>
+            <c:symbol val="none"/>
+          </c:marker>
+          <c:dLbls>
+            <c:dLbl>
+              <c:idx val="0"/>
+              <c:layout>
+                <c:manualLayout>
+                  <c:x val="1.297522377320136E-2"/>
+                  <c:y val="-6.0818845877626017E-2"/>
+                </c:manualLayout>
+              </c:layout>
+              <c:tx>
+                <c:rich>
+                  <a:bodyPr/>
+                  <a:lstStyle/>
+                  <a:p>
+                    <a:fld id="{90CCD8B5-1B2F-4620-AA9D-165B7643FA34}" type="SERIESNAME">
+                      <a:rPr lang="en-US" smtClean="0"/>
+                      <a:pPr/>
+                      <a:t>[SERIES NAME]</a:t>
+                    </a:fld>
+                    <a:r>
+                      <a:rPr lang="en-US" sz="1200" b="0" i="0" u="none" strike="noStrike" kern="1200" baseline="0" dirty="0">
+                        <a:solidFill>
+                          <a:prstClr val="black"/>
+                        </a:solidFill>
+                      </a:rPr>
+                      <a:t>‡</a:t>
+                    </a:r>
+                  </a:p>
+                </c:rich>
+              </c:tx>
+              <c:dLblPos val="r"/>
+              <c:showLegendKey val="0"/>
+              <c:showVal val="0"/>
+              <c:showCatName val="0"/>
+              <c:showSerName val="1"/>
+              <c:showPercent val="0"/>
+              <c:showBubbleSize val="0"/>
+              <c:extLst>
+                <c:ext xmlns:c15="http://schemas.microsoft.com/office/drawing/2012/chart" uri="{CE6537A1-D6FC-4f65-9D91-7224C49458BB}">
+                  <c15:dlblFieldTable/>
+                  <c15:showDataLabelsRange val="0"/>
+                </c:ext>
+                <c:ext xmlns:c16="http://schemas.microsoft.com/office/drawing/2014/chart" uri="{C3380CC4-5D6E-409C-BE32-E72D297353CC}">
+                  <c16:uniqueId val="{00000002-8090-479E-BF1A-EA59472E2D6D}"/>
+                </c:ext>
+              </c:extLst>
+            </c:dLbl>
+            <c:dLbl>
+              <c:idx val="1"/>
+              <c:delete val="1"/>
+              <c:extLst>
+                <c:ext xmlns:c15="http://schemas.microsoft.com/office/drawing/2012/chart" uri="{CE6537A1-D6FC-4f65-9D91-7224C49458BB}"/>
+                <c:ext xmlns:c16="http://schemas.microsoft.com/office/drawing/2014/chart" uri="{C3380CC4-5D6E-409C-BE32-E72D297353CC}">
+                  <c16:uniqueId val="{00000003-8090-479E-BF1A-EA59472E2D6D}"/>
+                </c:ext>
+              </c:extLst>
+            </c:dLbl>
+            <c:spPr>
+              <a:noFill/>
+              <a:ln>
+                <a:noFill/>
+              </a:ln>
+              <a:effectLst/>
+            </c:spPr>
+            <c:dLblPos val="t"/>
+            <c:showLegendKey val="0"/>
+            <c:showVal val="0"/>
+            <c:showCatName val="0"/>
+            <c:showSerName val="1"/>
+            <c:showPercent val="0"/>
+            <c:showBubbleSize val="0"/>
+            <c:showLeaderLines val="0"/>
+            <c:extLst>
+              <c:ext xmlns:c15="http://schemas.microsoft.com/office/drawing/2012/chart" uri="{CE6537A1-D6FC-4f65-9D91-7224C49458BB}">
+                <c15:showLeaderLines val="0"/>
+              </c:ext>
+            </c:extLst>
+          </c:dLbls>
+          <c:xVal>
+            <c:numRef>
+              <c:f>(Sheet1!$C$5,Sheet1!$E$5)</c:f>
+              <c:numCache>
+                <c:formatCode>m/d/yyyy</c:formatCode>
+                <c:ptCount val="2"/>
+                <c:pt idx="0">
+                  <c:v>42432</c:v>
+                </c:pt>
+                <c:pt idx="1">
+                  <c:v>42462</c:v>
+                </c:pt>
+              </c:numCache>
+            </c:numRef>
+          </c:xVal>
+          <c:yVal>
+            <c:numRef>
+              <c:f>(Sheet1!$D$5,Sheet1!$F$5)</c:f>
+              <c:numCache>
+                <c:formatCode>0.00</c:formatCode>
+                <c:ptCount val="2"/>
+                <c:pt idx="0">
+                  <c:v>5</c:v>
+                </c:pt>
+                <c:pt idx="1">
+                  <c:v>5</c:v>
+                </c:pt>
+              </c:numCache>
+            </c:numRef>
+          </c:yVal>
+          <c:smooth val="0"/>
+          <c:extLst>
+            <c:ext xmlns:c16="http://schemas.microsoft.com/office/drawing/2014/chart" uri="{C3380CC4-5D6E-409C-BE32-E72D297353CC}">
+              <c16:uniqueId val="{00000004-8090-479E-BF1A-EA59472E2D6D}"/>
+            </c:ext>
+          </c:extLst>
+        </c:ser>
+        <c:ser>
+          <c:idx val="3"/>
+          <c:order val="2"/>
+          <c:tx>
+            <c:strRef>
+              <c:f>Sheet1!$A$8</c:f>
+              <c:strCache>
+                <c:ptCount val="1"/>
+                <c:pt idx="0">
+                  <c:v>   Design, Development, &amp; Testing in four 2-week and 1 1-week sprints</c:v>
+                </c:pt>
+              </c:strCache>
+            </c:strRef>
+          </c:tx>
+          <c:spPr>
+            <a:ln w="50800">
+              <a:solidFill>
+                <a:srgbClr val="00B0F0"/>
+              </a:solidFill>
+            </a:ln>
+          </c:spPr>
+          <c:marker>
+            <c:symbol val="none"/>
+          </c:marker>
+          <c:dLbls>
+            <c:dLbl>
+              <c:idx val="0"/>
+              <c:delete val="1"/>
+              <c:extLst>
+                <c:ext xmlns:c15="http://schemas.microsoft.com/office/drawing/2012/chart" uri="{CE6537A1-D6FC-4f65-9D91-7224C49458BB}"/>
+                <c:ext xmlns:c16="http://schemas.microsoft.com/office/drawing/2014/chart" uri="{C3380CC4-5D6E-409C-BE32-E72D297353CC}">
+                  <c16:uniqueId val="{00000005-8090-479E-BF1A-EA59472E2D6D}"/>
+                </c:ext>
+              </c:extLst>
+            </c:dLbl>
+            <c:dLbl>
+              <c:idx val="1"/>
+              <c:layout>
+                <c:manualLayout>
+                  <c:x val="-0.39961293936693981"/>
+                  <c:y val="-5.2602134675647054E-2"/>
+                </c:manualLayout>
+              </c:layout>
+              <c:tx>
+                <c:rich>
+                  <a:bodyPr/>
+                  <a:lstStyle/>
+                  <a:p>
+                    <a:fld id="{55CA6244-06BB-467A-BBD0-1230BABDEC5A}" type="SERIESNAME">
+                      <a:rPr lang="en-US" smtClean="0"/>
+                      <a:pPr/>
+                      <a:t>[SERIES NAME]</a:t>
+                    </a:fld>
+                    <a:r>
+                      <a:rPr lang="en-US" sz="1200" b="0" i="0" u="none" strike="noStrike" kern="1200" baseline="0" dirty="0">
+                        <a:solidFill>
+                          <a:prstClr val="black"/>
+                        </a:solidFill>
+                      </a:rPr>
+                      <a:t>†</a:t>
+                    </a:r>
+                  </a:p>
+                </c:rich>
+              </c:tx>
+              <c:dLblPos val="r"/>
+              <c:showLegendKey val="0"/>
+              <c:showVal val="0"/>
+              <c:showCatName val="0"/>
+              <c:showSerName val="1"/>
+              <c:showPercent val="0"/>
+              <c:showBubbleSize val="0"/>
+              <c:extLst>
+                <c:ext xmlns:c15="http://schemas.microsoft.com/office/drawing/2012/chart" uri="{CE6537A1-D6FC-4f65-9D91-7224C49458BB}">
+                  <c15:dlblFieldTable/>
+                  <c15:showDataLabelsRange val="0"/>
+                </c:ext>
+                <c:ext xmlns:c16="http://schemas.microsoft.com/office/drawing/2014/chart" uri="{C3380CC4-5D6E-409C-BE32-E72D297353CC}">
+                  <c16:uniqueId val="{00000006-8090-479E-BF1A-EA59472E2D6D}"/>
+                </c:ext>
+              </c:extLst>
+            </c:dLbl>
+            <c:spPr>
+              <a:noFill/>
+              <a:ln>
+                <a:noFill/>
+              </a:ln>
+              <a:effectLst/>
+            </c:spPr>
+            <c:dLblPos val="t"/>
+            <c:showLegendKey val="0"/>
+            <c:showVal val="0"/>
+            <c:showCatName val="0"/>
+            <c:showSerName val="1"/>
+            <c:showPercent val="0"/>
+            <c:showBubbleSize val="0"/>
+            <c:showLeaderLines val="0"/>
+            <c:extLst>
+              <c:ext xmlns:c15="http://schemas.microsoft.com/office/drawing/2012/chart" uri="{CE6537A1-D6FC-4f65-9D91-7224C49458BB}">
+                <c15:showLeaderLines val="0"/>
+              </c:ext>
+            </c:extLst>
+          </c:dLbls>
+          <c:xVal>
+            <c:numRef>
+              <c:f>(Sheet1!$C$8,Sheet1!$E$8)</c:f>
+              <c:numCache>
+                <c:formatCode>m/d/yyyy</c:formatCode>
+                <c:ptCount val="2"/>
+                <c:pt idx="0">
+                  <c:v>42461</c:v>
+                </c:pt>
+                <c:pt idx="1">
+                  <c:v>42481</c:v>
+                </c:pt>
+              </c:numCache>
+            </c:numRef>
+          </c:xVal>
+          <c:yVal>
+            <c:numRef>
+              <c:f>(Sheet1!$D$8,Sheet1!$F$8)</c:f>
+              <c:numCache>
+                <c:formatCode>0.00</c:formatCode>
+                <c:ptCount val="2"/>
+                <c:pt idx="0">
+                  <c:v>4</c:v>
+                </c:pt>
+                <c:pt idx="1">
+                  <c:v>4</c:v>
+                </c:pt>
+              </c:numCache>
+            </c:numRef>
+          </c:yVal>
+          <c:smooth val="0"/>
+          <c:extLst>
+            <c:ext xmlns:c16="http://schemas.microsoft.com/office/drawing/2014/chart" uri="{C3380CC4-5D6E-409C-BE32-E72D297353CC}">
+              <c16:uniqueId val="{00000007-8090-479E-BF1A-EA59472E2D6D}"/>
+            </c:ext>
+          </c:extLst>
+        </c:ser>
+        <c:ser>
+          <c:idx val="7"/>
+          <c:order val="3"/>
+          <c:tx>
+            <c:strRef>
+              <c:f>Sheet1!$A$14</c:f>
+              <c:strCache>
+                <c:ptCount val="1"/>
+                <c:pt idx="0">
+                  <c:v>   Deployment</c:v>
+                </c:pt>
+              </c:strCache>
+            </c:strRef>
+          </c:tx>
+          <c:spPr>
+            <a:ln w="50800">
+              <a:solidFill>
+                <a:srgbClr val="7030A0"/>
+              </a:solidFill>
+            </a:ln>
+          </c:spPr>
+          <c:marker>
+            <c:symbol val="none"/>
+          </c:marker>
+          <c:dLbls>
+            <c:dLbl>
+              <c:idx val="0"/>
+              <c:layout>
+                <c:manualLayout>
+                  <c:x val="-4.2797484950995716E-2"/>
+                  <c:y val="-3.8626457641849819E-2"/>
+                </c:manualLayout>
+              </c:layout>
+              <c:tx>
+                <c:rich>
+                  <a:bodyPr/>
+                  <a:lstStyle/>
+                  <a:p>
+                    <a:fld id="{2B90158A-C81A-4E6D-9E99-F96447E96911}" type="SERIESNAME">
+                      <a:rPr lang="en-US" smtClean="0"/>
+                      <a:pPr/>
+                      <a:t>[SERIES NAME]</a:t>
+                    </a:fld>
+                    <a:r>
+                      <a:rPr lang="en-US" sz="1200" b="0" i="0" u="none" strike="noStrike" kern="1200" baseline="0" dirty="0">
+                        <a:solidFill>
+                          <a:prstClr val="black"/>
+                        </a:solidFill>
+                      </a:rPr>
+                      <a:t>†</a:t>
+                    </a:r>
+                  </a:p>
+                </c:rich>
+              </c:tx>
+              <c:dLblPos val="r"/>
+              <c:showLegendKey val="0"/>
+              <c:showVal val="0"/>
+              <c:showCatName val="0"/>
+              <c:showSerName val="1"/>
+              <c:showPercent val="0"/>
+              <c:showBubbleSize val="0"/>
+              <c:extLst>
+                <c:ext xmlns:c15="http://schemas.microsoft.com/office/drawing/2012/chart" uri="{CE6537A1-D6FC-4f65-9D91-7224C49458BB}">
+                  <c15:dlblFieldTable/>
+                  <c15:showDataLabelsRange val="0"/>
+                </c:ext>
+                <c:ext xmlns:c16="http://schemas.microsoft.com/office/drawing/2014/chart" uri="{C3380CC4-5D6E-409C-BE32-E72D297353CC}">
+                  <c16:uniqueId val="{00000008-8090-479E-BF1A-EA59472E2D6D}"/>
+                </c:ext>
+              </c:extLst>
+            </c:dLbl>
+            <c:dLbl>
+              <c:idx val="1"/>
+              <c:delete val="1"/>
+              <c:extLst>
+                <c:ext xmlns:c15="http://schemas.microsoft.com/office/drawing/2012/chart" uri="{CE6537A1-D6FC-4f65-9D91-7224C49458BB}"/>
+                <c:ext xmlns:c16="http://schemas.microsoft.com/office/drawing/2014/chart" uri="{C3380CC4-5D6E-409C-BE32-E72D297353CC}">
+                  <c16:uniqueId val="{00000009-8090-479E-BF1A-EA59472E2D6D}"/>
+                </c:ext>
+              </c:extLst>
+            </c:dLbl>
+            <c:spPr>
+              <a:noFill/>
+              <a:ln>
+                <a:noFill/>
+              </a:ln>
+              <a:effectLst/>
+            </c:spPr>
+            <c:dLblPos val="t"/>
+            <c:showLegendKey val="0"/>
+            <c:showVal val="0"/>
+            <c:showCatName val="0"/>
+            <c:showSerName val="1"/>
+            <c:showPercent val="0"/>
+            <c:showBubbleSize val="0"/>
+            <c:showLeaderLines val="0"/>
+            <c:extLst>
+              <c:ext xmlns:c15="http://schemas.microsoft.com/office/drawing/2012/chart" uri="{CE6537A1-D6FC-4f65-9D91-7224C49458BB}">
+                <c15:showLeaderLines val="0"/>
+              </c:ext>
+            </c:extLst>
+          </c:dLbls>
+          <c:xVal>
+            <c:numRef>
+              <c:f>(Sheet1!$C$14,Sheet1!$E$14)</c:f>
+              <c:numCache>
+                <c:formatCode>m/d/yyyy</c:formatCode>
+                <c:ptCount val="2"/>
+                <c:pt idx="0">
+                  <c:v>42479</c:v>
+                </c:pt>
+                <c:pt idx="1">
+                  <c:v>42483</c:v>
+                </c:pt>
+              </c:numCache>
+            </c:numRef>
+          </c:xVal>
+          <c:yVal>
+            <c:numRef>
+              <c:f>(Sheet1!$D$14,Sheet1!$F$14)</c:f>
+              <c:numCache>
+                <c:formatCode>0.00</c:formatCode>
+                <c:ptCount val="2"/>
+                <c:pt idx="0">
+                  <c:v>2</c:v>
+                </c:pt>
+                <c:pt idx="1">
+                  <c:v>2</c:v>
+                </c:pt>
+              </c:numCache>
+            </c:numRef>
+          </c:yVal>
+          <c:smooth val="0"/>
+          <c:extLst>
+            <c:ext xmlns:c16="http://schemas.microsoft.com/office/drawing/2014/chart" uri="{C3380CC4-5D6E-409C-BE32-E72D297353CC}">
+              <c16:uniqueId val="{0000000A-8090-479E-BF1A-EA59472E2D6D}"/>
+            </c:ext>
+          </c:extLst>
+        </c:ser>
+        <c:ser>
+          <c:idx val="8"/>
+          <c:order val="4"/>
+          <c:tx>
+            <c:strRef>
+              <c:f>Sheet1!$A$15</c:f>
+              <c:strCache>
+                <c:ptCount val="1"/>
+                <c:pt idx="0">
+                  <c:v>   Post Implementation Review</c:v>
+                </c:pt>
+              </c:strCache>
+            </c:strRef>
+          </c:tx>
+          <c:spPr>
+            <a:ln w="50800">
+              <a:solidFill>
+                <a:srgbClr val="7030A0"/>
+              </a:solidFill>
+            </a:ln>
+          </c:spPr>
+          <c:marker>
+            <c:symbol val="none"/>
+          </c:marker>
+          <c:dLbls>
+            <c:dLbl>
+              <c:idx val="0"/>
+              <c:delete val="1"/>
+              <c:extLst>
+                <c:ext xmlns:c15="http://schemas.microsoft.com/office/drawing/2012/chart" uri="{CE6537A1-D6FC-4f65-9D91-7224C49458BB}"/>
+                <c:ext xmlns:c16="http://schemas.microsoft.com/office/drawing/2014/chart" uri="{C3380CC4-5D6E-409C-BE32-E72D297353CC}">
+                  <c16:uniqueId val="{0000000B-8090-479E-BF1A-EA59472E2D6D}"/>
+                </c:ext>
+              </c:extLst>
+            </c:dLbl>
+            <c:dLbl>
+              <c:idx val="1"/>
+              <c:tx>
+                <c:rich>
+                  <a:bodyPr/>
+                  <a:lstStyle/>
+                  <a:p>
+                    <a:fld id="{40D7815C-5310-4710-B0DE-B3197E4F9A47}" type="SERIESNAME">
+                      <a:rPr lang="en-US" smtClean="0"/>
+                      <a:pPr/>
+                      <a:t>[SERIES NAME]</a:t>
+                    </a:fld>
+                    <a:r>
+                      <a:rPr lang="en-US"/>
+                      <a:t>*</a:t>
+                    </a:r>
+                  </a:p>
+                </c:rich>
+              </c:tx>
+              <c:dLblPos val="t"/>
+              <c:showLegendKey val="0"/>
+              <c:showVal val="0"/>
+              <c:showCatName val="0"/>
+              <c:showSerName val="1"/>
+              <c:showPercent val="0"/>
+              <c:showBubbleSize val="0"/>
+              <c:extLst>
+                <c:ext xmlns:c15="http://schemas.microsoft.com/office/drawing/2012/chart" uri="{CE6537A1-D6FC-4f65-9D91-7224C49458BB}">
+                  <c15:dlblFieldTable/>
+                  <c15:showDataLabelsRange val="0"/>
+                </c:ext>
+                <c:ext xmlns:c16="http://schemas.microsoft.com/office/drawing/2014/chart" uri="{C3380CC4-5D6E-409C-BE32-E72D297353CC}">
+                  <c16:uniqueId val="{00000020-8090-479E-BF1A-EA59472E2D6D}"/>
+                </c:ext>
+              </c:extLst>
+            </c:dLbl>
+            <c:spPr>
+              <a:noFill/>
+              <a:ln>
+                <a:noFill/>
+              </a:ln>
+              <a:effectLst/>
+            </c:spPr>
+            <c:dLblPos val="t"/>
+            <c:showLegendKey val="0"/>
+            <c:showVal val="0"/>
+            <c:showCatName val="0"/>
+            <c:showSerName val="1"/>
+            <c:showPercent val="0"/>
+            <c:showBubbleSize val="0"/>
+            <c:showLeaderLines val="0"/>
+            <c:extLst>
+              <c:ext xmlns:c15="http://schemas.microsoft.com/office/drawing/2012/chart" uri="{CE6537A1-D6FC-4f65-9D91-7224C49458BB}">
+                <c15:showLeaderLines val="0"/>
+              </c:ext>
+            </c:extLst>
+          </c:dLbls>
+          <c:xVal>
+            <c:numRef>
+              <c:f>(Sheet1!$C$15,Sheet1!$E$15)</c:f>
+              <c:numCache>
+                <c:formatCode>m/d/yyyy</c:formatCode>
+                <c:ptCount val="2"/>
+                <c:pt idx="0">
+                  <c:v>42483</c:v>
+                </c:pt>
+                <c:pt idx="1">
+                  <c:v>42486</c:v>
+                </c:pt>
+              </c:numCache>
+            </c:numRef>
+          </c:xVal>
+          <c:yVal>
+            <c:numRef>
+              <c:f>(Sheet1!$D$15,Sheet1!$F$15)</c:f>
+              <c:numCache>
+                <c:formatCode>0.00</c:formatCode>
+                <c:ptCount val="2"/>
+                <c:pt idx="0">
+                  <c:v>1</c:v>
+                </c:pt>
+                <c:pt idx="1">
+                  <c:v>1</c:v>
+                </c:pt>
+              </c:numCache>
+            </c:numRef>
+          </c:yVal>
+          <c:smooth val="0"/>
+          <c:extLst>
+            <c:ext xmlns:c16="http://schemas.microsoft.com/office/drawing/2014/chart" uri="{C3380CC4-5D6E-409C-BE32-E72D297353CC}">
+              <c16:uniqueId val="{0000000C-8090-479E-BF1A-EA59472E2D6D}"/>
+            </c:ext>
+          </c:extLst>
+        </c:ser>
+        <c:ser>
+          <c:idx val="9"/>
+          <c:order val="5"/>
+          <c:tx>
+            <c:strRef>
+              <c:f>Sheet1!$A$16</c:f>
+              <c:strCache>
+                <c:ptCount val="1"/>
+                <c:pt idx="0">
+                  <c:v>   Project Due</c:v>
+                </c:pt>
+              </c:strCache>
+            </c:strRef>
+          </c:tx>
+          <c:spPr>
+            <a:ln>
+              <a:noFill/>
+            </a:ln>
+          </c:spPr>
+          <c:marker>
+            <c:symbol val="diamond"/>
+            <c:size val="9"/>
+            <c:spPr>
+              <a:solidFill>
+                <a:srgbClr val="002060"/>
+              </a:solidFill>
+            </c:spPr>
+          </c:marker>
+          <c:dLbls>
+            <c:dLbl>
+              <c:idx val="0"/>
+              <c:layout>
+                <c:manualLayout>
+                  <c:x val="-6.3857036269730424E-2"/>
+                  <c:y val="4.3542811051658803E-2"/>
+                </c:manualLayout>
+              </c:layout>
+              <c:dLblPos val="r"/>
+              <c:showLegendKey val="0"/>
+              <c:showVal val="0"/>
+              <c:showCatName val="0"/>
+              <c:showSerName val="1"/>
+              <c:showPercent val="0"/>
+              <c:showBubbleSize val="0"/>
+              <c:extLst>
+                <c:ext xmlns:c15="http://schemas.microsoft.com/office/drawing/2012/chart" uri="{CE6537A1-D6FC-4f65-9D91-7224C49458BB}"/>
+                <c:ext xmlns:c16="http://schemas.microsoft.com/office/drawing/2014/chart" uri="{C3380CC4-5D6E-409C-BE32-E72D297353CC}">
+                  <c16:uniqueId val="{0000000D-8090-479E-BF1A-EA59472E2D6D}"/>
+                </c:ext>
+              </c:extLst>
+            </c:dLbl>
+            <c:dLbl>
+              <c:idx val="1"/>
+              <c:delete val="1"/>
+              <c:extLst>
+                <c:ext xmlns:c15="http://schemas.microsoft.com/office/drawing/2012/chart" uri="{CE6537A1-D6FC-4f65-9D91-7224C49458BB}"/>
+                <c:ext xmlns:c16="http://schemas.microsoft.com/office/drawing/2014/chart" uri="{C3380CC4-5D6E-409C-BE32-E72D297353CC}">
+                  <c16:uniqueId val="{0000000E-8090-479E-BF1A-EA59472E2D6D}"/>
+                </c:ext>
+              </c:extLst>
+            </c:dLbl>
+            <c:spPr>
+              <a:noFill/>
+              <a:ln>
+                <a:noFill/>
+              </a:ln>
+              <a:effectLst/>
+            </c:spPr>
+            <c:dLblPos val="t"/>
+            <c:showLegendKey val="0"/>
+            <c:showVal val="0"/>
+            <c:showCatName val="0"/>
+            <c:showSerName val="1"/>
+            <c:showPercent val="0"/>
+            <c:showBubbleSize val="0"/>
+            <c:showLeaderLines val="0"/>
+            <c:extLst>
+              <c:ext xmlns:c15="http://schemas.microsoft.com/office/drawing/2012/chart" uri="{CE6537A1-D6FC-4f65-9D91-7224C49458BB}">
+                <c15:showLeaderLines val="0"/>
+              </c:ext>
+            </c:extLst>
+          </c:dLbls>
+          <c:xVal>
+            <c:numRef>
+              <c:f>(Sheet1!$C$16,Sheet1!$E$16)</c:f>
+              <c:numCache>
+                <c:formatCode>m/d/yyyy</c:formatCode>
+                <c:ptCount val="2"/>
+                <c:pt idx="0">
+                  <c:v>42490</c:v>
+                </c:pt>
+                <c:pt idx="1">
+                  <c:v>42490</c:v>
+                </c:pt>
+              </c:numCache>
+            </c:numRef>
+          </c:xVal>
+          <c:yVal>
+            <c:numRef>
+              <c:f>(Sheet1!$D$16,Sheet1!$F$16)</c:f>
+              <c:numCache>
+                <c:formatCode>0.00</c:formatCode>
+                <c:ptCount val="2"/>
+                <c:pt idx="0">
+                  <c:v>1</c:v>
+                </c:pt>
+                <c:pt idx="1">
+                  <c:v>1</c:v>
+                </c:pt>
+              </c:numCache>
+            </c:numRef>
+          </c:yVal>
+          <c:smooth val="0"/>
+          <c:extLst>
+            <c:ext xmlns:c16="http://schemas.microsoft.com/office/drawing/2014/chart" uri="{C3380CC4-5D6E-409C-BE32-E72D297353CC}">
+              <c16:uniqueId val="{0000000F-8090-479E-BF1A-EA59472E2D6D}"/>
+            </c:ext>
+          </c:extLst>
+        </c:ser>
+        <c:ser>
+          <c:idx val="10"/>
+          <c:order val="6"/>
+          <c:tx>
+            <c:strRef>
+              <c:f>Sheet1!$A$6</c:f>
+              <c:strCache>
+                <c:ptCount val="1"/>
+                <c:pt idx="0">
+                  <c:v>   Analysis/Software Requirements</c:v>
+                </c:pt>
+              </c:strCache>
+            </c:strRef>
+          </c:tx>
+          <c:spPr>
+            <a:ln w="50800">
+              <a:solidFill>
+                <a:srgbClr val="7030A0"/>
+              </a:solidFill>
+            </a:ln>
+          </c:spPr>
+          <c:marker>
+            <c:symbol val="none"/>
+          </c:marker>
+          <c:dLbls>
+            <c:delete val="1"/>
+          </c:dLbls>
+          <c:xVal>
+            <c:numRef>
+              <c:f>(Sheet1!$C$6,Sheet1!$E$6)</c:f>
+              <c:numCache>
+                <c:formatCode>m/d/yyyy</c:formatCode>
+                <c:ptCount val="2"/>
+                <c:pt idx="0">
+                  <c:v>42418</c:v>
+                </c:pt>
+                <c:pt idx="1">
+                  <c:v>42462</c:v>
+                </c:pt>
+              </c:numCache>
+            </c:numRef>
+          </c:xVal>
+          <c:yVal>
+            <c:numRef>
+              <c:f>(Sheet1!$D$7,Sheet1!$F$7)</c:f>
+              <c:numCache>
+                <c:formatCode>0.00</c:formatCode>
+                <c:ptCount val="2"/>
+                <c:pt idx="0">
+                  <c:v>5</c:v>
+                </c:pt>
+                <c:pt idx="1">
+                  <c:v>5</c:v>
+                </c:pt>
+              </c:numCache>
+            </c:numRef>
+          </c:yVal>
+          <c:smooth val="0"/>
+          <c:extLst>
+            <c:ext xmlns:c16="http://schemas.microsoft.com/office/drawing/2014/chart" uri="{C3380CC4-5D6E-409C-BE32-E72D297353CC}">
+              <c16:uniqueId val="{00000010-8090-479E-BF1A-EA59472E2D6D}"/>
+            </c:ext>
+          </c:extLst>
+        </c:ser>
+        <c:ser>
+          <c:idx val="2"/>
+          <c:order val="7"/>
+          <c:tx>
+            <c:strRef>
+              <c:f>Sheet1!$A$7</c:f>
+              <c:strCache>
+                <c:ptCount val="1"/>
+                <c:pt idx="0">
+                  <c:v>   Project Topic Presentation Due</c:v>
+                </c:pt>
+              </c:strCache>
+            </c:strRef>
+          </c:tx>
+          <c:marker>
+            <c:symbol val="diamond"/>
+            <c:size val="11"/>
+            <c:spPr>
+              <a:solidFill>
+                <a:srgbClr val="002060"/>
+              </a:solidFill>
+            </c:spPr>
+          </c:marker>
+          <c:dLbls>
+            <c:dLbl>
+              <c:idx val="0"/>
+              <c:delete val="1"/>
+              <c:extLst>
+                <c:ext xmlns:c15="http://schemas.microsoft.com/office/drawing/2012/chart" uri="{CE6537A1-D6FC-4f65-9D91-7224C49458BB}"/>
+                <c:ext xmlns:c16="http://schemas.microsoft.com/office/drawing/2014/chart" uri="{C3380CC4-5D6E-409C-BE32-E72D297353CC}">
+                  <c16:uniqueId val="{00000011-8090-479E-BF1A-EA59472E2D6D}"/>
+                </c:ext>
+              </c:extLst>
+            </c:dLbl>
+            <c:dLbl>
+              <c:idx val="1"/>
+              <c:layout>
+                <c:manualLayout>
+                  <c:x val="-8.7960072148295168E-2"/>
+                  <c:y val="4.9020762297892713E-2"/>
+                </c:manualLayout>
+              </c:layout>
+              <c:dLblPos val="r"/>
+              <c:showLegendKey val="0"/>
+              <c:showVal val="0"/>
+              <c:showCatName val="0"/>
+              <c:showSerName val="1"/>
+              <c:showPercent val="0"/>
+              <c:showBubbleSize val="0"/>
+              <c:extLst>
+                <c:ext xmlns:c15="http://schemas.microsoft.com/office/drawing/2012/chart" uri="{CE6537A1-D6FC-4f65-9D91-7224C49458BB}"/>
+                <c:ext xmlns:c16="http://schemas.microsoft.com/office/drawing/2014/chart" uri="{C3380CC4-5D6E-409C-BE32-E72D297353CC}">
+                  <c16:uniqueId val="{00000012-8090-479E-BF1A-EA59472E2D6D}"/>
+                </c:ext>
+              </c:extLst>
+            </c:dLbl>
+            <c:spPr>
+              <a:noFill/>
+              <a:ln>
+                <a:noFill/>
+              </a:ln>
+              <a:effectLst/>
+            </c:spPr>
+            <c:dLblPos val="t"/>
+            <c:showLegendKey val="0"/>
+            <c:showVal val="0"/>
+            <c:showCatName val="0"/>
+            <c:showSerName val="1"/>
+            <c:showPercent val="0"/>
+            <c:showBubbleSize val="0"/>
+            <c:showLeaderLines val="0"/>
+            <c:extLst>
+              <c:ext xmlns:c15="http://schemas.microsoft.com/office/drawing/2012/chart" uri="{CE6537A1-D6FC-4f65-9D91-7224C49458BB}">
+                <c15:showLeaderLines val="0"/>
+              </c:ext>
+            </c:extLst>
+          </c:dLbls>
+          <c:xVal>
+            <c:numRef>
+              <c:f>(Sheet1!$C$7,Sheet1!$E$7)</c:f>
+              <c:numCache>
+                <c:formatCode>m/d/yyyy</c:formatCode>
+                <c:ptCount val="2"/>
+                <c:pt idx="0">
+                  <c:v>42421</c:v>
+                </c:pt>
+                <c:pt idx="1">
+                  <c:v>42421</c:v>
+                </c:pt>
+              </c:numCache>
+            </c:numRef>
+          </c:xVal>
+          <c:yVal>
+            <c:numRef>
+              <c:f>(Sheet1!$D$7,Sheet1!$F$7)</c:f>
+              <c:numCache>
+                <c:formatCode>0.00</c:formatCode>
+                <c:ptCount val="2"/>
+                <c:pt idx="0">
+                  <c:v>5</c:v>
+                </c:pt>
+                <c:pt idx="1">
+                  <c:v>5</c:v>
+                </c:pt>
+              </c:numCache>
+            </c:numRef>
+          </c:yVal>
+          <c:smooth val="0"/>
+          <c:extLst>
+            <c:ext xmlns:c16="http://schemas.microsoft.com/office/drawing/2014/chart" uri="{C3380CC4-5D6E-409C-BE32-E72D297353CC}">
+              <c16:uniqueId val="{00000013-8090-479E-BF1A-EA59472E2D6D}"/>
+            </c:ext>
+          </c:extLst>
+        </c:ser>
+        <c:ser>
+          <c:idx val="11"/>
+          <c:order val="8"/>
+          <c:tx>
+            <c:strRef>
+              <c:f>Sheet1!$A$9</c:f>
+              <c:strCache>
+                <c:ptCount val="1"/>
+                <c:pt idx="0">
+                  <c:v>   Design, Development, &amp; Testing in four 2-week sprints - complete</c:v>
+                </c:pt>
+              </c:strCache>
+            </c:strRef>
+          </c:tx>
+          <c:spPr>
+            <a:ln w="50800">
+              <a:solidFill>
+                <a:srgbClr val="7030A0"/>
+              </a:solidFill>
+            </a:ln>
+          </c:spPr>
+          <c:marker>
+            <c:symbol val="none"/>
+          </c:marker>
+          <c:dLbls>
+            <c:delete val="1"/>
+          </c:dLbls>
+          <c:xVal>
+            <c:numRef>
+              <c:f>(Sheet1!$C$9,Sheet1!$E$9)</c:f>
+              <c:numCache>
+                <c:formatCode>m/d/yyyy</c:formatCode>
+                <c:ptCount val="2"/>
+                <c:pt idx="0">
+                  <c:v>42425</c:v>
+                </c:pt>
+                <c:pt idx="1">
+                  <c:v>42481</c:v>
+                </c:pt>
+              </c:numCache>
+            </c:numRef>
+          </c:xVal>
+          <c:yVal>
+            <c:numRef>
+              <c:f>(Sheet1!$D$9,Sheet1!$F$9)</c:f>
+              <c:numCache>
+                <c:formatCode>0.00</c:formatCode>
+                <c:ptCount val="2"/>
+                <c:pt idx="0">
+                  <c:v>4</c:v>
+                </c:pt>
+                <c:pt idx="1">
+                  <c:v>4</c:v>
+                </c:pt>
+              </c:numCache>
+            </c:numRef>
+          </c:yVal>
+          <c:smooth val="0"/>
+          <c:extLst>
+            <c:ext xmlns:c16="http://schemas.microsoft.com/office/drawing/2014/chart" uri="{C3380CC4-5D6E-409C-BE32-E72D297353CC}">
+              <c16:uniqueId val="{00000014-8090-479E-BF1A-EA59472E2D6D}"/>
+            </c:ext>
+          </c:extLst>
+        </c:ser>
+        <c:ser>
+          <c:idx val="5"/>
+          <c:order val="9"/>
+          <c:tx>
+            <c:strRef>
+              <c:f>Sheet1!$A$12</c:f>
+              <c:strCache>
+                <c:ptCount val="1"/>
+                <c:pt idx="0">
+                  <c:v>   Documentation</c:v>
+                </c:pt>
+              </c:strCache>
+            </c:strRef>
+          </c:tx>
+          <c:spPr>
+            <a:ln w="50800">
+              <a:solidFill>
+                <a:srgbClr val="00B0F0"/>
+              </a:solidFill>
+            </a:ln>
+          </c:spPr>
+          <c:marker>
+            <c:symbol val="none"/>
+          </c:marker>
+          <c:dLbls>
+            <c:dLbl>
+              <c:idx val="0"/>
+              <c:layout>
+                <c:manualLayout>
+                  <c:x val="2.6659736760135951E-2"/>
+                  <c:y val="-4.1365433264966778E-2"/>
+                </c:manualLayout>
+              </c:layout>
+              <c:tx>
+                <c:rich>
+                  <a:bodyPr/>
+                  <a:lstStyle/>
+                  <a:p>
+                    <a:fld id="{61FA6130-CCBD-4C1C-9A96-97848B3DA8B7}" type="SERIESNAME">
+                      <a:rPr lang="en-US" smtClean="0"/>
+                      <a:pPr/>
+                      <a:t>[SERIES NAME]</a:t>
+                    </a:fld>
+                    <a:r>
+                      <a:rPr lang="en-US" sz="1200" b="0" i="0" u="none" strike="noStrike" kern="1200" baseline="0" dirty="0">
+                        <a:solidFill>
+                          <a:prstClr val="black"/>
+                        </a:solidFill>
+                      </a:rPr>
+                      <a:t>‡</a:t>
+                    </a:r>
+                  </a:p>
+                </c:rich>
+              </c:tx>
+              <c:dLblPos val="r"/>
+              <c:showLegendKey val="0"/>
+              <c:showVal val="0"/>
+              <c:showCatName val="0"/>
+              <c:showSerName val="1"/>
+              <c:showPercent val="0"/>
+              <c:showBubbleSize val="0"/>
+              <c:extLst>
+                <c:ext xmlns:c15="http://schemas.microsoft.com/office/drawing/2012/chart" uri="{CE6537A1-D6FC-4f65-9D91-7224C49458BB}">
+                  <c15:dlblFieldTable/>
+                  <c15:showDataLabelsRange val="0"/>
+                </c:ext>
+                <c:ext xmlns:c16="http://schemas.microsoft.com/office/drawing/2014/chart" uri="{C3380CC4-5D6E-409C-BE32-E72D297353CC}">
+                  <c16:uniqueId val="{00000015-8090-479E-BF1A-EA59472E2D6D}"/>
+                </c:ext>
+              </c:extLst>
+            </c:dLbl>
+            <c:dLbl>
+              <c:idx val="1"/>
+              <c:delete val="1"/>
+              <c:extLst>
+                <c:ext xmlns:c15="http://schemas.microsoft.com/office/drawing/2012/chart" uri="{CE6537A1-D6FC-4f65-9D91-7224C49458BB}"/>
+                <c:ext xmlns:c16="http://schemas.microsoft.com/office/drawing/2014/chart" uri="{C3380CC4-5D6E-409C-BE32-E72D297353CC}">
+                  <c16:uniqueId val="{00000016-8090-479E-BF1A-EA59472E2D6D}"/>
+                </c:ext>
+              </c:extLst>
+            </c:dLbl>
+            <c:spPr>
+              <a:noFill/>
+              <a:ln>
+                <a:noFill/>
+              </a:ln>
+              <a:effectLst/>
+            </c:spPr>
+            <c:dLblPos val="t"/>
+            <c:showLegendKey val="0"/>
+            <c:showVal val="0"/>
+            <c:showCatName val="0"/>
+            <c:showSerName val="1"/>
+            <c:showPercent val="0"/>
+            <c:showBubbleSize val="0"/>
+            <c:showLeaderLines val="0"/>
+            <c:extLst>
+              <c:ext xmlns:c15="http://schemas.microsoft.com/office/drawing/2012/chart" uri="{CE6537A1-D6FC-4f65-9D91-7224C49458BB}">
+                <c15:showLeaderLines val="0"/>
+              </c:ext>
+            </c:extLst>
+          </c:dLbls>
+          <c:xVal>
+            <c:numRef>
+              <c:f>(Sheet1!$C$12,Sheet1!$E$12)</c:f>
+              <c:numCache>
+                <c:formatCode>m/d/yyyy</c:formatCode>
+                <c:ptCount val="2"/>
+                <c:pt idx="0">
+                  <c:v>42461</c:v>
+                </c:pt>
+                <c:pt idx="1">
+                  <c:v>42478</c:v>
+                </c:pt>
+              </c:numCache>
+            </c:numRef>
+          </c:xVal>
+          <c:yVal>
+            <c:numRef>
+              <c:f>(Sheet1!$D$12,Sheet1!$F$12)</c:f>
+              <c:numCache>
+                <c:formatCode>0.00</c:formatCode>
+                <c:ptCount val="2"/>
+                <c:pt idx="0">
+                  <c:v>3</c:v>
+                </c:pt>
+                <c:pt idx="1">
+                  <c:v>3</c:v>
+                </c:pt>
+              </c:numCache>
+            </c:numRef>
+          </c:yVal>
+          <c:smooth val="0"/>
+          <c:extLst>
+            <c:ext xmlns:c16="http://schemas.microsoft.com/office/drawing/2014/chart" uri="{C3380CC4-5D6E-409C-BE32-E72D297353CC}">
+              <c16:uniqueId val="{00000017-8090-479E-BF1A-EA59472E2D6D}"/>
+            </c:ext>
+          </c:extLst>
+        </c:ser>
+        <c:ser>
+          <c:idx val="12"/>
+          <c:order val="10"/>
+          <c:tx>
+            <c:strRef>
+              <c:f>Sheet1!$A$11</c:f>
+              <c:strCache>
+                <c:ptCount val="1"/>
+                <c:pt idx="0">
+                  <c:v>   Documentation</c:v>
+                </c:pt>
+              </c:strCache>
+            </c:strRef>
+          </c:tx>
+          <c:spPr>
+            <a:ln w="50800">
+              <a:solidFill>
+                <a:srgbClr val="7030A0"/>
+              </a:solidFill>
+            </a:ln>
+          </c:spPr>
+          <c:marker>
+            <c:symbol val="none"/>
+          </c:marker>
+          <c:dLbls>
+            <c:delete val="1"/>
+          </c:dLbls>
+          <c:xVal>
+            <c:numRef>
+              <c:f>(Sheet1!$C$11,Sheet1!$E$11)</c:f>
+              <c:numCache>
+                <c:formatCode>m/d/yyyy</c:formatCode>
+                <c:ptCount val="2"/>
+                <c:pt idx="0">
+                  <c:v>42452</c:v>
+                </c:pt>
+                <c:pt idx="1">
+                  <c:v>42478</c:v>
+                </c:pt>
+              </c:numCache>
+            </c:numRef>
+          </c:xVal>
+          <c:yVal>
+            <c:numRef>
+              <c:f>(Sheet1!$D$11,Sheet1!$F$11)</c:f>
+              <c:numCache>
+                <c:formatCode>0.00</c:formatCode>
+                <c:ptCount val="2"/>
+                <c:pt idx="0">
+                  <c:v>3</c:v>
+                </c:pt>
+                <c:pt idx="1">
+                  <c:v>3</c:v>
+                </c:pt>
+              </c:numCache>
+            </c:numRef>
+          </c:yVal>
+          <c:smooth val="0"/>
+          <c:extLst>
+            <c:ext xmlns:c16="http://schemas.microsoft.com/office/drawing/2014/chart" uri="{C3380CC4-5D6E-409C-BE32-E72D297353CC}">
+              <c16:uniqueId val="{00000018-8090-479E-BF1A-EA59472E2D6D}"/>
+            </c:ext>
+          </c:extLst>
+        </c:ser>
+        <c:ser>
+          <c:idx val="6"/>
+          <c:order val="11"/>
+          <c:tx>
+            <c:strRef>
+              <c:f>Sheet1!$A$13</c:f>
+              <c:strCache>
+                <c:ptCount val="1"/>
+                <c:pt idx="0">
+                  <c:v>   Project Progress Report Due</c:v>
+                </c:pt>
+              </c:strCache>
+            </c:strRef>
+          </c:tx>
+          <c:marker>
+            <c:symbol val="diamond"/>
+            <c:size val="11"/>
+            <c:spPr>
+              <a:solidFill>
+                <a:srgbClr val="002060"/>
+              </a:solidFill>
+            </c:spPr>
+          </c:marker>
+          <c:dLbls>
+            <c:dLbl>
+              <c:idx val="0"/>
+              <c:delete val="1"/>
+              <c:extLst>
+                <c:ext xmlns:c15="http://schemas.microsoft.com/office/drawing/2012/chart" uri="{CE6537A1-D6FC-4f65-9D91-7224C49458BB}"/>
+                <c:ext xmlns:c16="http://schemas.microsoft.com/office/drawing/2014/chart" uri="{C3380CC4-5D6E-409C-BE32-E72D297353CC}">
+                  <c16:uniqueId val="{00000019-8090-479E-BF1A-EA59472E2D6D}"/>
+                </c:ext>
+              </c:extLst>
+            </c:dLbl>
+            <c:dLbl>
+              <c:idx val="1"/>
+              <c:layout>
+                <c:manualLayout>
+                  <c:x val="-0.12108635339625785"/>
+                  <c:y val="5.6847546891478334E-2"/>
+                </c:manualLayout>
+              </c:layout>
+              <c:dLblPos val="r"/>
+              <c:showLegendKey val="0"/>
+              <c:showVal val="0"/>
+              <c:showCatName val="0"/>
+              <c:showSerName val="1"/>
+              <c:showPercent val="0"/>
+              <c:showBubbleSize val="0"/>
+              <c:extLst>
+                <c:ext xmlns:c15="http://schemas.microsoft.com/office/drawing/2012/chart" uri="{CE6537A1-D6FC-4f65-9D91-7224C49458BB}"/>
+                <c:ext xmlns:c16="http://schemas.microsoft.com/office/drawing/2014/chart" uri="{C3380CC4-5D6E-409C-BE32-E72D297353CC}">
+                  <c16:uniqueId val="{0000001A-8090-479E-BF1A-EA59472E2D6D}"/>
+                </c:ext>
+              </c:extLst>
+            </c:dLbl>
+            <c:spPr>
+              <a:noFill/>
+              <a:ln>
+                <a:noFill/>
+              </a:ln>
+              <a:effectLst/>
+            </c:spPr>
+            <c:dLblPos val="b"/>
+            <c:showLegendKey val="0"/>
+            <c:showVal val="0"/>
+            <c:showCatName val="0"/>
+            <c:showSerName val="1"/>
+            <c:showPercent val="0"/>
+            <c:showBubbleSize val="0"/>
+            <c:showLeaderLines val="0"/>
+            <c:extLst>
+              <c:ext xmlns:c15="http://schemas.microsoft.com/office/drawing/2012/chart" uri="{CE6537A1-D6FC-4f65-9D91-7224C49458BB}">
+                <c15:showLeaderLines val="0"/>
+              </c:ext>
+            </c:extLst>
+          </c:dLbls>
+          <c:xVal>
+            <c:numRef>
+              <c:f>(Sheet1!$C$13,Sheet1!$E$13)</c:f>
+              <c:numCache>
+                <c:formatCode>m/d/yyyy</c:formatCode>
+                <c:ptCount val="2"/>
+                <c:pt idx="0">
+                  <c:v>42471</c:v>
+                </c:pt>
+                <c:pt idx="1">
+                  <c:v>42471</c:v>
+                </c:pt>
+              </c:numCache>
+            </c:numRef>
+          </c:xVal>
+          <c:yVal>
+            <c:numRef>
+              <c:f>(Sheet1!$D$13,Sheet1!$F$13)</c:f>
+              <c:numCache>
+                <c:formatCode>0.00</c:formatCode>
+                <c:ptCount val="2"/>
+                <c:pt idx="0">
+                  <c:v>3</c:v>
+                </c:pt>
+                <c:pt idx="1">
+                  <c:v>3</c:v>
+                </c:pt>
+              </c:numCache>
+            </c:numRef>
+          </c:yVal>
+          <c:smooth val="0"/>
+          <c:extLst>
+            <c:ext xmlns:c16="http://schemas.microsoft.com/office/drawing/2014/chart" uri="{C3380CC4-5D6E-409C-BE32-E72D297353CC}">
+              <c16:uniqueId val="{0000001B-8090-479E-BF1A-EA59472E2D6D}"/>
+            </c:ext>
+          </c:extLst>
+        </c:ser>
+        <c:ser>
+          <c:idx val="4"/>
+          <c:order val="12"/>
+          <c:tx>
+            <c:strRef>
+              <c:f>Sheet1!$A$10</c:f>
+              <c:strCache>
+                <c:ptCount val="1"/>
+                <c:pt idx="0">
+                  <c:v>   Project Progress Report Due</c:v>
+                </c:pt>
+              </c:strCache>
+            </c:strRef>
+          </c:tx>
+          <c:marker>
+            <c:symbol val="diamond"/>
+            <c:size val="11"/>
+            <c:spPr>
+              <a:solidFill>
+                <a:srgbClr val="002060"/>
+              </a:solidFill>
+            </c:spPr>
+          </c:marker>
+          <c:dLbls>
+            <c:dLbl>
+              <c:idx val="0"/>
+              <c:delete val="1"/>
+              <c:extLst>
+                <c:ext xmlns:c15="http://schemas.microsoft.com/office/drawing/2012/chart" uri="{CE6537A1-D6FC-4f65-9D91-7224C49458BB}"/>
+                <c:ext xmlns:c16="http://schemas.microsoft.com/office/drawing/2014/chart" uri="{C3380CC4-5D6E-409C-BE32-E72D297353CC}">
+                  <c16:uniqueId val="{0000001C-8090-479E-BF1A-EA59472E2D6D}"/>
+                </c:ext>
+              </c:extLst>
+            </c:dLbl>
+            <c:spPr>
+              <a:noFill/>
+              <a:ln>
+                <a:noFill/>
+              </a:ln>
+              <a:effectLst/>
+            </c:spPr>
+            <c:dLblPos val="b"/>
+            <c:showLegendKey val="0"/>
+            <c:showVal val="0"/>
+            <c:showCatName val="0"/>
+            <c:showSerName val="1"/>
+            <c:showPercent val="0"/>
+            <c:showBubbleSize val="0"/>
+            <c:showLeaderLines val="0"/>
+            <c:extLst>
+              <c:ext xmlns:c15="http://schemas.microsoft.com/office/drawing/2012/chart" uri="{CE6537A1-D6FC-4f65-9D91-7224C49458BB}">
+                <c15:showLeaderLines val="0"/>
+              </c:ext>
+            </c:extLst>
+          </c:dLbls>
+          <c:xVal>
+            <c:numRef>
+              <c:f>(Sheet1!$C$10,Sheet1!$E$10)</c:f>
+              <c:numCache>
+                <c:formatCode>m/d/yyyy</c:formatCode>
+                <c:ptCount val="2"/>
+                <c:pt idx="0">
+                  <c:v>42435</c:v>
+                </c:pt>
+                <c:pt idx="1">
+                  <c:v>42435</c:v>
+                </c:pt>
+              </c:numCache>
+            </c:numRef>
+          </c:xVal>
+          <c:yVal>
+            <c:numRef>
+              <c:f>(Sheet1!$D$10,Sheet1!$F$10)</c:f>
+              <c:numCache>
+                <c:formatCode>0.00</c:formatCode>
+                <c:ptCount val="2"/>
+                <c:pt idx="0">
+                  <c:v>4</c:v>
+                </c:pt>
+                <c:pt idx="1">
+                  <c:v>4</c:v>
+                </c:pt>
+              </c:numCache>
+            </c:numRef>
+          </c:yVal>
+          <c:smooth val="0"/>
+          <c:extLst>
+            <c:ext xmlns:c16="http://schemas.microsoft.com/office/drawing/2014/chart" uri="{C3380CC4-5D6E-409C-BE32-E72D297353CC}">
+              <c16:uniqueId val="{0000001E-8090-479E-BF1A-EA59472E2D6D}"/>
+            </c:ext>
+          </c:extLst>
+        </c:ser>
+        <c:dLbls>
+          <c:dLblPos val="t"/>
+          <c:showLegendKey val="0"/>
+          <c:showVal val="1"/>
+          <c:showCatName val="0"/>
+          <c:showSerName val="0"/>
+          <c:showPercent val="0"/>
+          <c:showBubbleSize val="0"/>
+        </c:dLbls>
+        <c:axId val="879849408"/>
+        <c:axId val="879847104"/>
+      </c:scatterChart>
+      <c:valAx>
+        <c:axId val="879849408"/>
+        <c:scaling>
+          <c:orientation val="minMax"/>
+        </c:scaling>
+        <c:delete val="0"/>
+        <c:axPos val="b"/>
+        <c:numFmt formatCode="m/d/yyyy" sourceLinked="1"/>
+        <c:majorTickMark val="out"/>
+        <c:minorTickMark val="none"/>
+        <c:tickLblPos val="nextTo"/>
+        <c:spPr>
+          <a:noFill/>
+        </c:spPr>
+        <c:txPr>
+          <a:bodyPr rot="5400000" vert="horz"/>
+          <a:lstStyle/>
+          <a:p>
+            <a:pPr>
+              <a:defRPr/>
+            </a:pPr>
+            <a:endParaRPr lang="en-US"/>
+          </a:p>
+        </c:txPr>
+        <c:crossAx val="879847104"/>
+        <c:crosses val="autoZero"/>
+        <c:crossBetween val="midCat"/>
+      </c:valAx>
+      <c:valAx>
+        <c:axId val="879847104"/>
+        <c:scaling>
+          <c:orientation val="minMax"/>
+        </c:scaling>
+        <c:delete val="1"/>
+        <c:axPos val="l"/>
+        <c:majorGridlines>
+          <c:spPr>
+            <a:ln>
+              <a:noFill/>
+            </a:ln>
+          </c:spPr>
+        </c:majorGridlines>
+        <c:numFmt formatCode="0.00" sourceLinked="1"/>
+        <c:majorTickMark val="out"/>
+        <c:minorTickMark val="none"/>
+        <c:tickLblPos val="nextTo"/>
+        <c:crossAx val="879849408"/>
+        <c:crosses val="autoZero"/>
+        <c:crossBetween val="midCat"/>
+      </c:valAx>
+      <c:spPr>
+        <a:noFill/>
+        <a:ln>
+          <a:noFill/>
+        </a:ln>
+      </c:spPr>
+    </c:plotArea>
+    <c:plotVisOnly val="1"/>
+    <c:dispBlanksAs val="gap"/>
+    <c:showDLblsOverMax val="0"/>
+  </c:chart>
+  <c:txPr>
+    <a:bodyPr/>
+    <a:lstStyle/>
+    <a:p>
+      <a:pPr>
+        <a:defRPr sz="1200"/>
+      </a:pPr>
+      <a:endParaRPr lang="en-US"/>
+    </a:p>
+  </c:txPr>
+  <c:externalData r:id="rId1">
+    <c:autoUpdate val="0"/>
+  </c:externalData>
+</c:chartSpace>
+</file>
+
 <file path=ppt/notesMasters/notesMaster1.xml><?xml version="1.0" encoding="utf-8"?>
 <p:notesMaster xmlns:a="http://schemas.openxmlformats.org/drawingml/2006/main" xmlns:r="http://schemas.openxmlformats.org/officeDocument/2006/relationships" xmlns:p="http://schemas.openxmlformats.org/presentationml/2006/main">
   <p:cSld>
@@ -292,38 +1856,37 @@
           <a:p>
             <a:pPr lvl="0"/>
             <a:r>
-              <a:rPr lang="en-US" smtClean="0"/>
+              <a:rPr lang="en-US"/>
               <a:t>Edit Master text styles</a:t>
             </a:r>
           </a:p>
           <a:p>
             <a:pPr lvl="1"/>
             <a:r>
-              <a:rPr lang="en-US" smtClean="0"/>
+              <a:rPr lang="en-US"/>
               <a:t>Second level</a:t>
             </a:r>
           </a:p>
           <a:p>
             <a:pPr lvl="2"/>
             <a:r>
-              <a:rPr lang="en-US" smtClean="0"/>
+              <a:rPr lang="en-US"/>
               <a:t>Third level</a:t>
             </a:r>
           </a:p>
           <a:p>
             <a:pPr lvl="3"/>
             <a:r>
-              <a:rPr lang="en-US" smtClean="0"/>
+              <a:rPr lang="en-US"/>
               <a:t>Fourth level</a:t>
             </a:r>
           </a:p>
           <a:p>
             <a:pPr lvl="4"/>
             <a:r>
-              <a:rPr lang="en-US" smtClean="0"/>
+              <a:rPr lang="en-US"/>
               <a:t>Fifth level</a:t>
             </a:r>
-            <a:endParaRPr lang="en-US"/>
           </a:p>
         </p:txBody>
       </p:sp>
@@ -541,18 +2104,17 @@
           <a:lstStyle/>
           <a:p>
             <a:r>
-              <a:rPr lang="en-US" dirty="0" smtClean="0"/>
+              <a:rPr lang="en-US" dirty="0"/>
               <a:t>This presentation describes RADV, the Risk Adjustment Data Validation tool developed by team </a:t>
             </a:r>
             <a:r>
-              <a:rPr lang="en-US" dirty="0" err="1" smtClean="0"/>
+              <a:rPr lang="en-US" dirty="0" err="1"/>
               <a:t>FHIRed</a:t>
             </a:r>
             <a:r>
-              <a:rPr lang="en-US" dirty="0" smtClean="0"/>
+              <a:rPr lang="en-US" dirty="0"/>
               <a:t> Up.</a:t>
             </a:r>
-            <a:endParaRPr lang="en-US" dirty="0"/>
           </a:p>
         </p:txBody>
       </p:sp>
@@ -640,11 +2202,11 @@
               <a:defRPr/>
             </a:pPr>
             <a:r>
-              <a:rPr lang="en-US" sz="900" dirty="0" smtClean="0"/>
+              <a:rPr lang="en-US" sz="900" dirty="0"/>
               <a:t>The Affordable Care Act requires health insurance</a:t>
             </a:r>
             <a:r>
-              <a:rPr lang="en-US" sz="900" baseline="0" dirty="0" smtClean="0"/>
+              <a:rPr lang="en-US" sz="900" baseline="0" dirty="0"/>
               <a:t> companies to offer insurance to people with pre-existing conditions.  By only offering policies with high co-pays and high-deductibles, insurance companies can discourage ill patients from purchasing their products.  Risk adjustment prevents this by transferring premiums from insurers with healthy members to those organizations that are insuring for a more ill population.</a:t>
             </a:r>
           </a:p>
@@ -652,18 +2214,18 @@
             <a:pPr defTabSz="931774">
               <a:defRPr/>
             </a:pPr>
-            <a:endParaRPr lang="en-US" sz="900" dirty="0" smtClean="0"/>
+            <a:endParaRPr lang="en-US" sz="900" dirty="0"/>
           </a:p>
           <a:p>
             <a:pPr defTabSz="931774">
               <a:defRPr/>
             </a:pPr>
             <a:r>
-              <a:rPr lang="en-US" sz="900" dirty="0" smtClean="0"/>
+              <a:rPr lang="en-US" sz="900" dirty="0"/>
               <a:t>Risk</a:t>
             </a:r>
             <a:r>
-              <a:rPr lang="en-US" sz="900" baseline="0" dirty="0" smtClean="0"/>
+              <a:rPr lang="en-US" sz="900" baseline="0" dirty="0"/>
               <a:t> scores are use to determine the average level of illness in an insurers population. A risk score is calculated using the list of diagnoses recorded for a patient during the previous calendar year.  This gives providers and insurers a strong financial interest in making medical records accurate and complete.</a:t>
             </a:r>
           </a:p>
@@ -671,14 +2233,14 @@
             <a:pPr defTabSz="931774">
               <a:defRPr/>
             </a:pPr>
-            <a:endParaRPr lang="en-US" sz="900" baseline="0" dirty="0" smtClean="0"/>
+            <a:endParaRPr lang="en-US" sz="900" baseline="0" dirty="0"/>
           </a:p>
           <a:p>
             <a:pPr defTabSz="931774">
               <a:defRPr/>
             </a:pPr>
             <a:r>
-              <a:rPr lang="en-US" sz="900" baseline="0" dirty="0" smtClean="0"/>
+              <a:rPr lang="en-US" sz="900" baseline="0" dirty="0"/>
               <a:t>The RADV tool was designed to help providers validate medical records, by identifying health care conditions that may be missing from a patients recent medical record.</a:t>
             </a:r>
             <a:endParaRPr lang="en-US" sz="900" dirty="0"/>
@@ -765,7 +2327,7 @@
           <a:bodyPr/>
           <a:lstStyle/>
           <a:p>
-            <a:endParaRPr lang="en-US" dirty="0" smtClean="0"/>
+            <a:endParaRPr lang="en-US" dirty="0"/>
           </a:p>
         </p:txBody>
       </p:sp>
@@ -849,7 +2411,7 @@
           <a:bodyPr/>
           <a:lstStyle/>
           <a:p>
-            <a:endParaRPr lang="en-US" dirty="0" smtClean="0"/>
+            <a:endParaRPr lang="en-US" dirty="0"/>
           </a:p>
         </p:txBody>
       </p:sp>
@@ -1018,11 +2580,11 @@
           <a:lstStyle/>
           <a:p>
             <a:r>
-              <a:rPr lang="en-US" dirty="0" smtClean="0"/>
+              <a:rPr lang="en-US" dirty="0"/>
               <a:t>This final slide shows</a:t>
             </a:r>
             <a:r>
-              <a:rPr lang="en-US" baseline="0" dirty="0" smtClean="0"/>
+              <a:rPr lang="en-US" baseline="0" dirty="0"/>
               <a:t> the web address of the RADV tool.  You can use this username and password to view the final version of the software.</a:t>
             </a:r>
             <a:endParaRPr lang="en-US" dirty="0"/>
@@ -1235,10 +2797,9 @@
           </a:lstStyle>
           <a:p>
             <a:r>
-              <a:rPr kumimoji="0" lang="en-US" smtClean="0"/>
+              <a:rPr kumimoji="0" lang="en-US"/>
               <a:t>Click to edit Master subtitle style</a:t>
             </a:r>
-            <a:endParaRPr kumimoji="0" lang="en-US"/>
           </a:p>
         </p:txBody>
       </p:sp>
@@ -1488,10 +3049,9 @@
           </a:lstStyle>
           <a:p>
             <a:r>
-              <a:rPr kumimoji="0" lang="en-US" smtClean="0"/>
+              <a:rPr kumimoji="0" lang="en-US"/>
               <a:t>Click to edit Master title style</a:t>
             </a:r>
-            <a:endParaRPr kumimoji="0" lang="en-US"/>
           </a:p>
         </p:txBody>
       </p:sp>
@@ -1536,10 +3096,9 @@
           <a:lstStyle/>
           <a:p>
             <a:r>
-              <a:rPr kumimoji="0" lang="en-US" smtClean="0"/>
+              <a:rPr kumimoji="0" lang="en-US"/>
               <a:t>Click to edit Master title style</a:t>
             </a:r>
-            <a:endParaRPr kumimoji="0" lang="en-US"/>
           </a:p>
         </p:txBody>
       </p:sp>
@@ -1560,35 +3119,35 @@
           <a:p>
             <a:pPr lvl="0" eaLnBrk="1" latinLnBrk="0" hangingPunct="1"/>
             <a:r>
-              <a:rPr lang="en-US" smtClean="0"/>
+              <a:rPr lang="en-US"/>
               <a:t>Click to edit Master text styles</a:t>
             </a:r>
           </a:p>
           <a:p>
             <a:pPr lvl="1" eaLnBrk="1" latinLnBrk="0" hangingPunct="1"/>
             <a:r>
-              <a:rPr lang="en-US" smtClean="0"/>
+              <a:rPr lang="en-US"/>
               <a:t>Second level</a:t>
             </a:r>
           </a:p>
           <a:p>
             <a:pPr lvl="2" eaLnBrk="1" latinLnBrk="0" hangingPunct="1"/>
             <a:r>
-              <a:rPr lang="en-US" smtClean="0"/>
+              <a:rPr lang="en-US"/>
               <a:t>Third level</a:t>
             </a:r>
           </a:p>
           <a:p>
             <a:pPr lvl="3" eaLnBrk="1" latinLnBrk="0" hangingPunct="1"/>
             <a:r>
-              <a:rPr lang="en-US" smtClean="0"/>
+              <a:rPr lang="en-US"/>
               <a:t>Fourth level</a:t>
             </a:r>
           </a:p>
           <a:p>
             <a:pPr lvl="4" eaLnBrk="1" latinLnBrk="0" hangingPunct="1"/>
             <a:r>
-              <a:rPr lang="en-US" smtClean="0"/>
+              <a:rPr lang="en-US"/>
               <a:t>Fifth level</a:t>
             </a:r>
             <a:endParaRPr kumimoji="0" lang="en-US"/>
@@ -1706,10 +3265,9 @@
           <a:lstStyle/>
           <a:p>
             <a:r>
-              <a:rPr kumimoji="0" lang="en-US" smtClean="0"/>
+              <a:rPr kumimoji="0" lang="en-US"/>
               <a:t>Click to edit Master title style</a:t>
             </a:r>
-            <a:endParaRPr kumimoji="0" lang="en-US"/>
           </a:p>
         </p:txBody>
       </p:sp>
@@ -1735,35 +3293,35 @@
           <a:p>
             <a:pPr lvl="0" eaLnBrk="1" latinLnBrk="0" hangingPunct="1"/>
             <a:r>
-              <a:rPr lang="en-US" smtClean="0"/>
+              <a:rPr lang="en-US"/>
               <a:t>Click to edit Master text styles</a:t>
             </a:r>
           </a:p>
           <a:p>
             <a:pPr lvl="1" eaLnBrk="1" latinLnBrk="0" hangingPunct="1"/>
             <a:r>
-              <a:rPr lang="en-US" smtClean="0"/>
+              <a:rPr lang="en-US"/>
               <a:t>Second level</a:t>
             </a:r>
           </a:p>
           <a:p>
             <a:pPr lvl="2" eaLnBrk="1" latinLnBrk="0" hangingPunct="1"/>
             <a:r>
-              <a:rPr lang="en-US" smtClean="0"/>
+              <a:rPr lang="en-US"/>
               <a:t>Third level</a:t>
             </a:r>
           </a:p>
           <a:p>
             <a:pPr lvl="3" eaLnBrk="1" latinLnBrk="0" hangingPunct="1"/>
             <a:r>
-              <a:rPr lang="en-US" smtClean="0"/>
+              <a:rPr lang="en-US"/>
               <a:t>Fourth level</a:t>
             </a:r>
           </a:p>
           <a:p>
             <a:pPr lvl="4" eaLnBrk="1" latinLnBrk="0" hangingPunct="1"/>
             <a:r>
-              <a:rPr lang="en-US" smtClean="0"/>
+              <a:rPr lang="en-US"/>
               <a:t>Fifth level</a:t>
             </a:r>
             <a:endParaRPr kumimoji="0" lang="en-US"/>
@@ -1876,10 +3434,9 @@
           <a:lstStyle/>
           <a:p>
             <a:r>
-              <a:rPr kumimoji="0" lang="en-US" smtClean="0"/>
+              <a:rPr kumimoji="0" lang="en-US"/>
               <a:t>Click to edit Master title style</a:t>
             </a:r>
-            <a:endParaRPr kumimoji="0" lang="en-US"/>
           </a:p>
         </p:txBody>
       </p:sp>
@@ -1970,35 +3527,35 @@
           <a:p>
             <a:pPr lvl="0" eaLnBrk="1" latinLnBrk="0" hangingPunct="1"/>
             <a:r>
-              <a:rPr lang="en-US" smtClean="0"/>
+              <a:rPr lang="en-US"/>
               <a:t>Click to edit Master text styles</a:t>
             </a:r>
           </a:p>
           <a:p>
             <a:pPr lvl="1" eaLnBrk="1" latinLnBrk="0" hangingPunct="1"/>
             <a:r>
-              <a:rPr lang="en-US" smtClean="0"/>
+              <a:rPr lang="en-US"/>
               <a:t>Second level</a:t>
             </a:r>
           </a:p>
           <a:p>
             <a:pPr lvl="2" eaLnBrk="1" latinLnBrk="0" hangingPunct="1"/>
             <a:r>
-              <a:rPr lang="en-US" smtClean="0"/>
+              <a:rPr lang="en-US"/>
               <a:t>Third level</a:t>
             </a:r>
           </a:p>
           <a:p>
             <a:pPr lvl="3" eaLnBrk="1" latinLnBrk="0" hangingPunct="1"/>
             <a:r>
-              <a:rPr lang="en-US" smtClean="0"/>
+              <a:rPr lang="en-US"/>
               <a:t>Fourth level</a:t>
             </a:r>
           </a:p>
           <a:p>
             <a:pPr lvl="4" eaLnBrk="1" latinLnBrk="0" hangingPunct="1"/>
             <a:r>
-              <a:rPr lang="en-US" smtClean="0"/>
+              <a:rPr lang="en-US"/>
               <a:t>Fifth level</a:t>
             </a:r>
             <a:endParaRPr kumimoji="0" lang="en-US"/>
@@ -2155,10 +3712,9 @@
           </a:lstStyle>
           <a:p>
             <a:r>
-              <a:rPr kumimoji="0" lang="en-US" smtClean="0"/>
+              <a:rPr kumimoji="0" lang="en-US"/>
               <a:t>Click to edit Master title style</a:t>
             </a:r>
-            <a:endParaRPr kumimoji="0" lang="en-US"/>
           </a:p>
         </p:txBody>
       </p:sp>
@@ -2235,7 +3791,7 @@
           <a:p>
             <a:pPr lvl="0" eaLnBrk="1" latinLnBrk="0" hangingPunct="1"/>
             <a:r>
-              <a:rPr kumimoji="0" lang="en-US" smtClean="0"/>
+              <a:rPr kumimoji="0" lang="en-US"/>
               <a:t>Click to edit Master text styles</a:t>
             </a:r>
           </a:p>
@@ -2499,10 +4055,9 @@
           <a:lstStyle/>
           <a:p>
             <a:r>
-              <a:rPr kumimoji="0" lang="en-US" smtClean="0"/>
+              <a:rPr kumimoji="0" lang="en-US"/>
               <a:t>Click to edit Master title style</a:t>
             </a:r>
-            <a:endParaRPr kumimoji="0" lang="en-US"/>
           </a:p>
         </p:txBody>
       </p:sp>
@@ -2593,35 +4148,35 @@
           <a:p>
             <a:pPr lvl="0" eaLnBrk="1" latinLnBrk="0" hangingPunct="1"/>
             <a:r>
-              <a:rPr lang="en-US" smtClean="0"/>
+              <a:rPr lang="en-US"/>
               <a:t>Click to edit Master text styles</a:t>
             </a:r>
           </a:p>
           <a:p>
             <a:pPr lvl="1" eaLnBrk="1" latinLnBrk="0" hangingPunct="1"/>
             <a:r>
-              <a:rPr lang="en-US" smtClean="0"/>
+              <a:rPr lang="en-US"/>
               <a:t>Second level</a:t>
             </a:r>
           </a:p>
           <a:p>
             <a:pPr lvl="2" eaLnBrk="1" latinLnBrk="0" hangingPunct="1"/>
             <a:r>
-              <a:rPr lang="en-US" smtClean="0"/>
+              <a:rPr lang="en-US"/>
               <a:t>Third level</a:t>
             </a:r>
           </a:p>
           <a:p>
             <a:pPr lvl="3" eaLnBrk="1" latinLnBrk="0" hangingPunct="1"/>
             <a:r>
-              <a:rPr lang="en-US" smtClean="0"/>
+              <a:rPr lang="en-US"/>
               <a:t>Fourth level</a:t>
             </a:r>
           </a:p>
           <a:p>
             <a:pPr lvl="4" eaLnBrk="1" latinLnBrk="0" hangingPunct="1"/>
             <a:r>
-              <a:rPr lang="en-US" smtClean="0"/>
+              <a:rPr lang="en-US"/>
               <a:t>Fifth level</a:t>
             </a:r>
             <a:endParaRPr kumimoji="0" lang="en-US"/>
@@ -2650,35 +4205,35 @@
           <a:p>
             <a:pPr lvl="0" eaLnBrk="1" latinLnBrk="0" hangingPunct="1"/>
             <a:r>
-              <a:rPr lang="en-US" smtClean="0"/>
+              <a:rPr lang="en-US"/>
               <a:t>Click to edit Master text styles</a:t>
             </a:r>
           </a:p>
           <a:p>
             <a:pPr lvl="1" eaLnBrk="1" latinLnBrk="0" hangingPunct="1"/>
             <a:r>
-              <a:rPr lang="en-US" smtClean="0"/>
+              <a:rPr lang="en-US"/>
               <a:t>Second level</a:t>
             </a:r>
           </a:p>
           <a:p>
             <a:pPr lvl="2" eaLnBrk="1" latinLnBrk="0" hangingPunct="1"/>
             <a:r>
-              <a:rPr lang="en-US" smtClean="0"/>
+              <a:rPr lang="en-US"/>
               <a:t>Third level</a:t>
             </a:r>
           </a:p>
           <a:p>
             <a:pPr lvl="3" eaLnBrk="1" latinLnBrk="0" hangingPunct="1"/>
             <a:r>
-              <a:rPr lang="en-US" smtClean="0"/>
+              <a:rPr lang="en-US"/>
               <a:t>Fourth level</a:t>
             </a:r>
           </a:p>
           <a:p>
             <a:pPr lvl="4" eaLnBrk="1" latinLnBrk="0" hangingPunct="1"/>
             <a:r>
-              <a:rPr lang="en-US" smtClean="0"/>
+              <a:rPr lang="en-US"/>
               <a:t>Fifth level</a:t>
             </a:r>
             <a:endParaRPr kumimoji="0" lang="en-US"/>
@@ -2735,10 +4290,9 @@
           </a:lstStyle>
           <a:p>
             <a:r>
-              <a:rPr kumimoji="0" lang="en-US" smtClean="0"/>
+              <a:rPr kumimoji="0" lang="en-US"/>
               <a:t>Click to edit Master title style</a:t>
             </a:r>
-            <a:endParaRPr kumimoji="0" lang="en-US"/>
           </a:p>
         </p:txBody>
       </p:sp>
@@ -2799,7 +4353,7 @@
           <a:p>
             <a:pPr lvl="0" eaLnBrk="1" latinLnBrk="0" hangingPunct="1"/>
             <a:r>
-              <a:rPr kumimoji="0" lang="en-US" smtClean="0"/>
+              <a:rPr kumimoji="0" lang="en-US"/>
               <a:t>Click to edit Master text styles</a:t>
             </a:r>
           </a:p>
@@ -2862,7 +4416,7 @@
           <a:p>
             <a:pPr lvl="0" eaLnBrk="1" latinLnBrk="0" hangingPunct="1"/>
             <a:r>
-              <a:rPr kumimoji="0" lang="en-US" smtClean="0"/>
+              <a:rPr kumimoji="0" lang="en-US"/>
               <a:t>Click to edit Master text styles</a:t>
             </a:r>
           </a:p>
@@ -2955,35 +4509,35 @@
           <a:p>
             <a:pPr lvl="0" eaLnBrk="1" latinLnBrk="0" hangingPunct="1"/>
             <a:r>
-              <a:rPr lang="en-US" smtClean="0"/>
+              <a:rPr lang="en-US"/>
               <a:t>Click to edit Master text styles</a:t>
             </a:r>
           </a:p>
           <a:p>
             <a:pPr lvl="1" eaLnBrk="1" latinLnBrk="0" hangingPunct="1"/>
             <a:r>
-              <a:rPr lang="en-US" smtClean="0"/>
+              <a:rPr lang="en-US"/>
               <a:t>Second level</a:t>
             </a:r>
           </a:p>
           <a:p>
             <a:pPr lvl="2" eaLnBrk="1" latinLnBrk="0" hangingPunct="1"/>
             <a:r>
-              <a:rPr lang="en-US" smtClean="0"/>
+              <a:rPr lang="en-US"/>
               <a:t>Third level</a:t>
             </a:r>
           </a:p>
           <a:p>
             <a:pPr lvl="3" eaLnBrk="1" latinLnBrk="0" hangingPunct="1"/>
             <a:r>
-              <a:rPr lang="en-US" smtClean="0"/>
+              <a:rPr lang="en-US"/>
               <a:t>Fourth level</a:t>
             </a:r>
           </a:p>
           <a:p>
             <a:pPr lvl="4" eaLnBrk="1" latinLnBrk="0" hangingPunct="1"/>
             <a:r>
-              <a:rPr lang="en-US" smtClean="0"/>
+              <a:rPr lang="en-US"/>
               <a:t>Fifth level</a:t>
             </a:r>
             <a:endParaRPr kumimoji="0" lang="en-US"/>
@@ -3012,35 +4566,35 @@
           <a:p>
             <a:pPr lvl="0" eaLnBrk="1" latinLnBrk="0" hangingPunct="1"/>
             <a:r>
-              <a:rPr lang="en-US" smtClean="0"/>
+              <a:rPr lang="en-US"/>
               <a:t>Click to edit Master text styles</a:t>
             </a:r>
           </a:p>
           <a:p>
             <a:pPr lvl="1" eaLnBrk="1" latinLnBrk="0" hangingPunct="1"/>
             <a:r>
-              <a:rPr lang="en-US" smtClean="0"/>
+              <a:rPr lang="en-US"/>
               <a:t>Second level</a:t>
             </a:r>
           </a:p>
           <a:p>
             <a:pPr lvl="2" eaLnBrk="1" latinLnBrk="0" hangingPunct="1"/>
             <a:r>
-              <a:rPr lang="en-US" smtClean="0"/>
+              <a:rPr lang="en-US"/>
               <a:t>Third level</a:t>
             </a:r>
           </a:p>
           <a:p>
             <a:pPr lvl="3" eaLnBrk="1" latinLnBrk="0" hangingPunct="1"/>
             <a:r>
-              <a:rPr lang="en-US" smtClean="0"/>
+              <a:rPr lang="en-US"/>
               <a:t>Fourth level</a:t>
             </a:r>
           </a:p>
           <a:p>
             <a:pPr lvl="4" eaLnBrk="1" latinLnBrk="0" hangingPunct="1"/>
             <a:r>
-              <a:rPr lang="en-US" smtClean="0"/>
+              <a:rPr lang="en-US"/>
               <a:t>Fifth level</a:t>
             </a:r>
             <a:endParaRPr kumimoji="0" lang="en-US"/>
@@ -3088,10 +4642,9 @@
           <a:lstStyle/>
           <a:p>
             <a:r>
-              <a:rPr kumimoji="0" lang="en-US" smtClean="0"/>
+              <a:rPr kumimoji="0" lang="en-US"/>
               <a:t>Click to edit Master title style</a:t>
             </a:r>
-            <a:endParaRPr kumimoji="0" lang="en-US"/>
           </a:p>
         </p:txBody>
       </p:sp>
@@ -3396,10 +4949,9 @@
           </a:lstStyle>
           <a:p>
             <a:r>
-              <a:rPr kumimoji="0" lang="en-US" smtClean="0"/>
+              <a:rPr kumimoji="0" lang="en-US"/>
               <a:t>Click to edit Master title style</a:t>
             </a:r>
-            <a:endParaRPr kumimoji="0" lang="en-US"/>
           </a:p>
         </p:txBody>
       </p:sp>
@@ -3446,7 +4998,7 @@
           <a:p>
             <a:pPr lvl="0" eaLnBrk="1" latinLnBrk="0" hangingPunct="1"/>
             <a:r>
-              <a:rPr kumimoji="0" lang="en-US" smtClean="0"/>
+              <a:rPr kumimoji="0" lang="en-US"/>
               <a:t>Click to edit Master text styles</a:t>
             </a:r>
           </a:p>
@@ -3539,35 +5091,35 @@
           <a:p>
             <a:pPr lvl="0" eaLnBrk="1" latinLnBrk="0" hangingPunct="1"/>
             <a:r>
-              <a:rPr lang="en-US" smtClean="0"/>
+              <a:rPr lang="en-US"/>
               <a:t>Click to edit Master text styles</a:t>
             </a:r>
           </a:p>
           <a:p>
             <a:pPr lvl="1" eaLnBrk="1" latinLnBrk="0" hangingPunct="1"/>
             <a:r>
-              <a:rPr lang="en-US" smtClean="0"/>
+              <a:rPr lang="en-US"/>
               <a:t>Second level</a:t>
             </a:r>
           </a:p>
           <a:p>
             <a:pPr lvl="2" eaLnBrk="1" latinLnBrk="0" hangingPunct="1"/>
             <a:r>
-              <a:rPr lang="en-US" smtClean="0"/>
+              <a:rPr lang="en-US"/>
               <a:t>Third level</a:t>
             </a:r>
           </a:p>
           <a:p>
             <a:pPr lvl="3" eaLnBrk="1" latinLnBrk="0" hangingPunct="1"/>
             <a:r>
-              <a:rPr lang="en-US" smtClean="0"/>
+              <a:rPr lang="en-US"/>
               <a:t>Fourth level</a:t>
             </a:r>
           </a:p>
           <a:p>
             <a:pPr lvl="4" eaLnBrk="1" latinLnBrk="0" hangingPunct="1"/>
             <a:r>
-              <a:rPr lang="en-US" smtClean="0"/>
+              <a:rPr lang="en-US"/>
               <a:t>Fifth level</a:t>
             </a:r>
             <a:endParaRPr kumimoji="0" lang="en-US"/>
@@ -3627,10 +5179,9 @@
           </a:lstStyle>
           <a:p>
             <a:r>
-              <a:rPr kumimoji="0" lang="en-US" smtClean="0"/>
+              <a:rPr kumimoji="0" lang="en-US"/>
               <a:t>Click to edit Master title style</a:t>
             </a:r>
-            <a:endParaRPr kumimoji="0" lang="en-US"/>
           </a:p>
         </p:txBody>
       </p:sp>
@@ -3674,7 +5225,7 @@
           <a:p>
             <a:pPr lvl="0" eaLnBrk="1" latinLnBrk="0" hangingPunct="1"/>
             <a:r>
-              <a:rPr kumimoji="0" lang="en-US" smtClean="0"/>
+              <a:rPr kumimoji="0" lang="en-US"/>
               <a:t>Click to edit Master text styles</a:t>
             </a:r>
           </a:p>
@@ -3937,7 +5488,7 @@
           </a:lstStyle>
           <a:p>
             <a:r>
-              <a:rPr kumimoji="0" lang="en-US" smtClean="0"/>
+              <a:rPr kumimoji="0" lang="en-US"/>
               <a:t>Click icon to add picture</a:t>
             </a:r>
             <a:endParaRPr kumimoji="0" lang="en-US" dirty="0"/>
@@ -4094,10 +5645,9 @@
           <a:lstStyle/>
           <a:p>
             <a:r>
-              <a:rPr kumimoji="0" lang="en-US" smtClean="0"/>
+              <a:rPr kumimoji="0" lang="en-US"/>
               <a:t>Click to edit Master title style</a:t>
             </a:r>
-            <a:endParaRPr kumimoji="0" lang="en-US"/>
           </a:p>
         </p:txBody>
       </p:sp>
@@ -4128,38 +5678,37 @@
           <a:p>
             <a:pPr lvl="0" eaLnBrk="1" latinLnBrk="0" hangingPunct="1"/>
             <a:r>
-              <a:rPr kumimoji="0" lang="en-US" smtClean="0"/>
+              <a:rPr kumimoji="0" lang="en-US"/>
               <a:t>Click to edit Master text styles</a:t>
             </a:r>
           </a:p>
           <a:p>
             <a:pPr lvl="1" eaLnBrk="1" latinLnBrk="0" hangingPunct="1"/>
             <a:r>
-              <a:rPr kumimoji="0" lang="en-US" smtClean="0"/>
+              <a:rPr kumimoji="0" lang="en-US"/>
               <a:t>Second level</a:t>
             </a:r>
           </a:p>
           <a:p>
             <a:pPr lvl="2" eaLnBrk="1" latinLnBrk="0" hangingPunct="1"/>
             <a:r>
-              <a:rPr kumimoji="0" lang="en-US" smtClean="0"/>
+              <a:rPr kumimoji="0" lang="en-US"/>
               <a:t>Third level</a:t>
             </a:r>
           </a:p>
           <a:p>
             <a:pPr lvl="3" eaLnBrk="1" latinLnBrk="0" hangingPunct="1"/>
             <a:r>
-              <a:rPr kumimoji="0" lang="en-US" smtClean="0"/>
+              <a:rPr kumimoji="0" lang="en-US"/>
               <a:t>Fourth level</a:t>
             </a:r>
           </a:p>
           <a:p>
             <a:pPr lvl="4" eaLnBrk="1" latinLnBrk="0" hangingPunct="1"/>
             <a:r>
-              <a:rPr kumimoji="0" lang="en-US" smtClean="0"/>
+              <a:rPr kumimoji="0" lang="en-US"/>
               <a:t>Fifth level</a:t>
             </a:r>
-            <a:endParaRPr kumimoji="0" lang="en-US"/>
           </a:p>
         </p:txBody>
       </p:sp>
@@ -4623,80 +6172,56 @@
           <a:lstStyle/>
           <a:p>
             <a:r>
-              <a:rPr lang="en-US" b="1" dirty="0" err="1" smtClean="0"/>
+              <a:rPr lang="en-US" b="1" dirty="0" err="1"/>
               <a:t>FHIRed</a:t>
             </a:r>
             <a:r>
-              <a:rPr lang="en-US" b="1" dirty="0" smtClean="0"/>
+              <a:rPr lang="en-US" b="1" dirty="0"/>
               <a:t> UP</a:t>
             </a:r>
           </a:p>
           <a:p>
             <a:r>
-              <a:rPr lang="en-US" dirty="0" smtClean="0"/>
-              <a:t>Augusto </a:t>
-            </a:r>
-            <a:r>
               <a:rPr lang="en-US" dirty="0"/>
-              <a:t>Burgos </a:t>
-            </a:r>
-            <a:r>
-              <a:rPr lang="en-US" dirty="0" smtClean="0">
+              <a:t>Augusto Burgos </a:t>
+            </a:r>
+            <a:r>
+              <a:rPr lang="en-US" dirty="0">
                 <a:hlinkClick r:id="rId5"/>
               </a:rPr>
               <a:t>aburgos3@gatech.edu</a:t>
             </a:r>
-            <a:r>
-              <a:rPr lang="en-US" dirty="0"/>
-              <a:t/>
-            </a:r>
             <a:br>
               <a:rPr lang="en-US" dirty="0"/>
             </a:br>
             <a:r>
-              <a:rPr lang="en-US" dirty="0" smtClean="0"/>
-              <a:t>Spiro </a:t>
-            </a:r>
-            <a:r>
               <a:rPr lang="en-US" dirty="0"/>
-              <a:t>Ganas </a:t>
-            </a:r>
-            <a:r>
-              <a:rPr lang="en-US" dirty="0" smtClean="0">
+              <a:t>Spiro Ganas </a:t>
+            </a:r>
+            <a:r>
+              <a:rPr lang="en-US" dirty="0">
                 <a:hlinkClick r:id="rId6"/>
               </a:rPr>
               <a:t>spiroganas@gmail.com</a:t>
             </a:r>
-            <a:r>
-              <a:rPr lang="en-US" dirty="0" smtClean="0"/>
-              <a:t/>
-            </a:r>
             <a:br>
-              <a:rPr lang="en-US" dirty="0" smtClean="0"/>
+              <a:rPr lang="en-US" dirty="0"/>
             </a:br>
             <a:r>
-              <a:rPr lang="en-US" dirty="0" smtClean="0"/>
-              <a:t>Anja </a:t>
-            </a:r>
-            <a:r>
               <a:rPr lang="en-US" dirty="0"/>
-              <a:t>Guillory </a:t>
-            </a:r>
-            <a:r>
-              <a:rPr lang="en-US" dirty="0" smtClean="0">
+              <a:t>Anja Guillory </a:t>
+            </a:r>
+            <a:r>
+              <a:rPr lang="en-US" dirty="0">
                 <a:hlinkClick r:id="rId7"/>
               </a:rPr>
               <a:t>anjag1993@gmail.com</a:t>
             </a:r>
-            <a:r>
-              <a:rPr lang="en-US" dirty="0" smtClean="0"/>
-              <a:t/>
-            </a:r>
             <a:br>
-              <a:rPr lang="en-US" dirty="0" smtClean="0"/>
+              <a:rPr lang="en-US" dirty="0"/>
             </a:br>
             <a:r>
-              <a:rPr lang="en-US" dirty="0" smtClean="0"/>
+              <a:rPr lang="en-US" dirty="0"/>
               <a:t>Jamie </a:t>
             </a:r>
             <a:r>
@@ -4708,20 +6233,16 @@
               <a:t> </a:t>
             </a:r>
             <a:r>
-              <a:rPr lang="en-US" dirty="0" smtClean="0">
+              <a:rPr lang="en-US" dirty="0">
                 <a:hlinkClick r:id="rId8"/>
               </a:rPr>
               <a:t>jrichgels3@gatech.edu</a:t>
             </a:r>
-            <a:r>
-              <a:rPr lang="en-US" dirty="0"/>
-              <a:t/>
-            </a:r>
             <a:br>
               <a:rPr lang="en-US" dirty="0"/>
             </a:br>
             <a:r>
-              <a:rPr lang="en-US" dirty="0" smtClean="0"/>
+              <a:rPr lang="en-US" dirty="0"/>
               <a:t>Daniel </a:t>
             </a:r>
             <a:r>
@@ -4733,32 +6254,28 @@
               <a:t> </a:t>
             </a:r>
             <a:r>
-              <a:rPr lang="en-US" dirty="0" smtClean="0">
+              <a:rPr lang="en-US" dirty="0">
                 <a:hlinkClick r:id="rId9"/>
               </a:rPr>
               <a:t>dstoneburner3@gatech.edu</a:t>
             </a:r>
-            <a:r>
-              <a:rPr lang="en-US" dirty="0"/>
-              <a:t/>
-            </a:r>
             <a:br>
               <a:rPr lang="en-US" dirty="0"/>
             </a:br>
             <a:r>
-              <a:rPr lang="en-US" dirty="0" smtClean="0"/>
+              <a:rPr lang="en-US" dirty="0"/>
               <a:t>Tala </a:t>
             </a:r>
             <a:r>
-              <a:rPr lang="en-US" dirty="0" err="1" smtClean="0"/>
+              <a:rPr lang="en-US" dirty="0" err="1"/>
               <a:t>Suidan</a:t>
             </a:r>
             <a:r>
-              <a:rPr lang="en-US" dirty="0" smtClean="0"/>
+              <a:rPr lang="en-US" dirty="0"/>
               <a:t> </a:t>
             </a:r>
             <a:r>
-              <a:rPr lang="en-US" dirty="0" smtClean="0">
+              <a:rPr lang="en-US" dirty="0">
                 <a:hlinkClick r:id="rId10"/>
               </a:rPr>
               <a:t>tmsuidan@gatech.edu</a:t>
@@ -4785,7 +6302,7 @@
           <a:lstStyle/>
           <a:p>
             <a:r>
-              <a:rPr lang="en-US" dirty="0" smtClean="0">
+              <a:rPr lang="en-US" dirty="0">
                 <a:solidFill>
                   <a:schemeClr val="bg2"/>
                 </a:solidFill>
@@ -4793,14 +6310,14 @@
               <a:t>RADV</a:t>
             </a:r>
             <a:br>
-              <a:rPr lang="en-US" dirty="0" smtClean="0">
+              <a:rPr lang="en-US" dirty="0">
                 <a:solidFill>
                   <a:schemeClr val="bg2"/>
                 </a:solidFill>
               </a:rPr>
             </a:br>
             <a:r>
-              <a:rPr lang="en-US" dirty="0" smtClean="0">
+              <a:rPr lang="en-US" dirty="0">
                 <a:solidFill>
                   <a:schemeClr val="bg2"/>
                 </a:solidFill>
@@ -4854,11 +6371,11 @@
   <p:clrMapOvr>
     <a:masterClrMapping/>
   </p:clrMapOvr>
-  <mc:AlternateContent xmlns:mc="http://schemas.openxmlformats.org/markup-compatibility/2006">
-    <mc:Choice xmlns:p14="http://schemas.microsoft.com/office/powerpoint/2010/main" Requires="p14">
+  <mc:AlternateContent xmlns:mc="http://schemas.openxmlformats.org/markup-compatibility/2006" xmlns:p14="http://schemas.microsoft.com/office/powerpoint/2010/main">
+    <mc:Choice Requires="p14">
       <p:transition p14:dur="250" advTm="7027"/>
     </mc:Choice>
-    <mc:Fallback>
+    <mc:Fallback xmlns="">
       <p:transition advTm="7027"/>
     </mc:Fallback>
   </mc:AlternateContent>
@@ -5011,7 +6528,7 @@
           </a:lstStyle>
           <a:p>
             <a:r>
-              <a:rPr lang="en-US" sz="3600" dirty="0" smtClean="0"/>
+              <a:rPr lang="en-US" sz="3600" dirty="0"/>
               <a:t>QA Testing</a:t>
             </a:r>
             <a:endParaRPr lang="en-US" sz="3200" dirty="0"/>
@@ -5036,13 +6553,6 @@
       <p:transition spd="slow" advTm="21610"/>
     </mc:Fallback>
   </mc:AlternateContent>
-  <p:timing>
-    <p:tnLst>
-      <p:par>
-        <p:cTn id="1" dur="indefinite" restart="never" nodeType="tmRoot"/>
-      </p:par>
-    </p:tnLst>
-  </p:timing>
   <p:extLst mod="1">
     <p:ext uri="{E180D4A7-C9FB-4DFB-919C-405C955672EB}">
       <p14:showEvtLst xmlns:p14="http://schemas.microsoft.com/office/powerpoint/2010/main">
@@ -5094,7 +6604,7 @@
           <a:lstStyle/>
           <a:p>
             <a:r>
-              <a:rPr lang="en-US" sz="3600" dirty="0" smtClean="0"/>
+              <a:rPr lang="en-US" sz="3600" dirty="0"/>
               <a:t>Final Version of the RADV Tool</a:t>
             </a:r>
             <a:endParaRPr lang="en-US" dirty="0"/>
@@ -5119,57 +6629,37 @@
           <a:lstStyle/>
           <a:p>
             <a:pPr lvl="1"/>
-            <a:endParaRPr lang="en-US" sz="1600" dirty="0" smtClean="0">
+            <a:endParaRPr lang="en-US" sz="1600" dirty="0">
               <a:hlinkClick r:id="rId3"/>
             </a:endParaRPr>
           </a:p>
           <a:p>
             <a:pPr lvl="1"/>
-            <a:r>
-              <a:rPr lang="en-US" dirty="0" smtClean="0">
-                <a:hlinkClick r:id="rId3"/>
-              </a:rPr>
-              <a:t>https</a:t>
-            </a:r>
             <a:r>
               <a:rPr lang="en-US" dirty="0">
                 <a:hlinkClick r:id="rId3"/>
               </a:rPr>
-              <a:t>://</a:t>
-            </a:r>
-            <a:r>
-              <a:rPr lang="en-US" dirty="0" smtClean="0">
-                <a:hlinkClick r:id="rId3"/>
-              </a:rPr>
-              <a:t>focus-appliance-122323.appspot.com/login</a:t>
-            </a:r>
-            <a:endParaRPr lang="en-US" dirty="0" smtClean="0"/>
+              <a:t>https://focus-appliance-122323.appspot.com/login</a:t>
+            </a:r>
+            <a:endParaRPr lang="en-US" dirty="0"/>
           </a:p>
           <a:p>
             <a:pPr lvl="1"/>
             <a:r>
-              <a:rPr lang="en-US" dirty="0" smtClean="0"/>
-              <a:t>Login</a:t>
-            </a:r>
-            <a:r>
               <a:rPr lang="en-US" dirty="0"/>
-              <a:t>:  </a:t>
-            </a:r>
-            <a:r>
-              <a:rPr lang="en-US" dirty="0" err="1" smtClean="0"/>
+              <a:t>Login:  </a:t>
+            </a:r>
+            <a:r>
+              <a:rPr lang="en-US" dirty="0" err="1"/>
               <a:t>FHIRedUp</a:t>
             </a:r>
-            <a:endParaRPr lang="en-US" dirty="0" smtClean="0"/>
+            <a:endParaRPr lang="en-US" dirty="0"/>
           </a:p>
           <a:p>
             <a:pPr lvl="1"/>
             <a:r>
-              <a:rPr lang="en-US" dirty="0" smtClean="0"/>
-              <a:t>Password: </a:t>
-            </a:r>
-            <a:r>
               <a:rPr lang="en-US" dirty="0"/>
-              <a:t> PjV7kGTD</a:t>
+              <a:t>Password:  PjV7kGTD</a:t>
             </a:r>
           </a:p>
           <a:p>
@@ -5195,13 +6685,6 @@
       <p:transition advTm="10350"/>
     </mc:Fallback>
   </mc:AlternateContent>
-  <p:timing>
-    <p:tnLst>
-      <p:par>
-        <p:cTn id="1" dur="indefinite" restart="never" nodeType="tmRoot"/>
-      </p:par>
-    </p:tnLst>
-  </p:timing>
   <p:extLst mod="1">
     <p:ext uri="{E180D4A7-C9FB-4DFB-919C-405C955672EB}">
       <p14:showEvtLst xmlns:p14="http://schemas.microsoft.com/office/powerpoint/2010/main">
@@ -5248,10 +6731,9 @@
           <a:lstStyle/>
           <a:p>
             <a:r>
-              <a:rPr lang="en-US" sz="3600" dirty="0" smtClean="0"/>
+              <a:rPr lang="en-US" sz="3600" dirty="0"/>
               <a:t>Project Post-Mortem</a:t>
             </a:r>
-            <a:endParaRPr lang="en-US" sz="3600" dirty="0"/>
           </a:p>
         </p:txBody>
       </p:sp>
@@ -5327,10 +6809,9 @@
           <a:lstStyle/>
           <a:p>
             <a:r>
-              <a:rPr lang="en-US" sz="3600" dirty="0" smtClean="0"/>
+              <a:rPr lang="en-US" sz="3600" dirty="0"/>
               <a:t>Executive Summary</a:t>
             </a:r>
-            <a:endParaRPr lang="en-US" sz="3600" dirty="0"/>
           </a:p>
         </p:txBody>
       </p:sp>
@@ -5529,10 +7010,9 @@
               <a:buChar char="•"/>
             </a:pPr>
             <a:r>
-              <a:rPr lang="en-US" dirty="0" smtClean="0"/>
+              <a:rPr lang="en-US" dirty="0"/>
               <a:t>Under ACA Risk Adjustment, missing or inaccurate data leads to lower provider reimbursement.</a:t>
             </a:r>
-            <a:endParaRPr lang="en-US" dirty="0"/>
           </a:p>
         </p:txBody>
       </p:sp>
@@ -5546,11 +7026,11 @@
   <p:clrMapOvr>
     <a:masterClrMapping/>
   </p:clrMapOvr>
-  <mc:AlternateContent xmlns:mc="http://schemas.openxmlformats.org/markup-compatibility/2006">
-    <mc:Choice xmlns:p14="http://schemas.microsoft.com/office/powerpoint/2010/main" Requires="p14">
+  <mc:AlternateContent xmlns:mc="http://schemas.openxmlformats.org/markup-compatibility/2006" xmlns:p14="http://schemas.microsoft.com/office/powerpoint/2010/main">
+    <mc:Choice Requires="p14">
       <p:transition spd="slow" p14:dur="2000" advTm="56676"/>
     </mc:Choice>
-    <mc:Fallback>
+    <mc:Fallback xmlns="">
       <p:transition spd="slow" advTm="56676"/>
     </mc:Fallback>
   </mc:AlternateContent>
@@ -5780,13 +7260,6 @@
   <p:clrMapOvr>
     <a:masterClrMapping/>
   </p:clrMapOvr>
-  <p:timing>
-    <p:tnLst>
-      <p:par>
-        <p:cTn id="1" dur="indefinite" restart="never" nodeType="tmRoot"/>
-      </p:par>
-    </p:tnLst>
-  </p:timing>
 </p:sld>
 </file>
 
@@ -5849,10 +7322,73 @@
           </a:lstStyle>
           <a:p>
             <a:r>
-              <a:rPr lang="en-US" sz="3600" dirty="0" smtClean="0"/>
+              <a:rPr lang="en-US" sz="3600" dirty="0"/>
               <a:t>Updated Gantt Chart</a:t>
             </a:r>
-            <a:endParaRPr lang="en-US" sz="3600" dirty="0"/>
+          </a:p>
+        </p:txBody>
+      </p:sp>
+      <p:graphicFrame>
+        <p:nvGraphicFramePr>
+          <p:cNvPr id="3" name="Chart 2"/>
+          <p:cNvGraphicFramePr>
+            <a:graphicFrameLocks/>
+          </p:cNvGraphicFramePr>
+          <p:nvPr>
+            <p:extLst>
+              <p:ext uri="{D42A27DB-BD31-4B8C-83A1-F6EECF244321}">
+                <p14:modId xmlns:p14="http://schemas.microsoft.com/office/powerpoint/2010/main" val="3762813489"/>
+              </p:ext>
+            </p:extLst>
+          </p:nvPr>
+        </p:nvGraphicFramePr>
+        <p:xfrm>
+          <a:off x="447634" y="342900"/>
+          <a:ext cx="8282940" cy="4636770"/>
+        </p:xfrm>
+        <a:graphic>
+          <a:graphicData uri="http://schemas.openxmlformats.org/drawingml/2006/chart">
+            <c:chart xmlns:c="http://schemas.openxmlformats.org/drawingml/2006/chart" xmlns:r="http://schemas.openxmlformats.org/officeDocument/2006/relationships" r:id="rId3"/>
+          </a:graphicData>
+        </a:graphic>
+      </p:graphicFrame>
+      <p:sp>
+        <p:nvSpPr>
+          <p:cNvPr id="4" name="TextBox 3"/>
+          <p:cNvSpPr txBox="1"/>
+          <p:nvPr/>
+        </p:nvSpPr>
+        <p:spPr>
+          <a:xfrm>
+            <a:off x="152400" y="4947800"/>
+            <a:ext cx="8991600" cy="584775"/>
+          </a:xfrm>
+          <a:prstGeom prst="rect">
+            <a:avLst/>
+          </a:prstGeom>
+          <a:noFill/>
+        </p:spPr>
+        <p:txBody>
+          <a:bodyPr wrap="square" rtlCol="0">
+            <a:spAutoFit/>
+          </a:bodyPr>
+          <a:lstStyle/>
+          <a:p>
+            <a:r>
+              <a:rPr lang="en-US" sz="1600" dirty="0">
+                <a:latin typeface="+mj-lt"/>
+              </a:rPr>
+              <a:t>*  All team members involved 	† - Developers and testers involved      ‡ - Business Analysts involved</a:t>
+            </a:r>
+          </a:p>
+          <a:p>
+            <a:pPr algn="ctr"/>
+            <a:r>
+              <a:rPr lang="en-US" sz="1600" dirty="0">
+                <a:latin typeface="+mj-lt"/>
+              </a:rPr>
+              <a:t>All items are complete. </a:t>
+            </a:r>
           </a:p>
         </p:txBody>
       </p:sp>
@@ -5866,21 +7402,14 @@
   <p:clrMapOvr>
     <a:masterClrMapping/>
   </p:clrMapOvr>
-  <mc:AlternateContent xmlns:mc="http://schemas.openxmlformats.org/markup-compatibility/2006">
-    <mc:Choice xmlns:p14="http://schemas.microsoft.com/office/powerpoint/2010/main" Requires="p14">
+  <mc:AlternateContent xmlns:mc="http://schemas.openxmlformats.org/markup-compatibility/2006" xmlns:p14="http://schemas.microsoft.com/office/powerpoint/2010/main">
+    <mc:Choice Requires="p14">
       <p:transition p14:dur="250" advTm="1894"/>
     </mc:Choice>
-    <mc:Fallback>
+    <mc:Fallback xmlns="">
       <p:transition advTm="1894"/>
     </mc:Fallback>
   </mc:AlternateContent>
-  <p:timing>
-    <p:tnLst>
-      <p:par>
-        <p:cTn id="1" dur="indefinite" restart="never" nodeType="tmRoot"/>
-      </p:par>
-    </p:tnLst>
-  </p:timing>
 </p:sld>
 </file>
 
@@ -5943,10 +7472,9 @@
           </a:lstStyle>
           <a:p>
             <a:r>
-              <a:rPr lang="en-US" sz="3600" dirty="0" smtClean="0"/>
+              <a:rPr lang="en-US" sz="3600" dirty="0"/>
               <a:t>Updated RADV Architecture</a:t>
             </a:r>
-            <a:endParaRPr lang="en-US" sz="3600" dirty="0"/>
           </a:p>
         </p:txBody>
       </p:sp>
@@ -5968,13 +7496,6 @@
       <p:transition advTm="32958"/>
     </mc:Fallback>
   </mc:AlternateContent>
-  <p:timing>
-    <p:tnLst>
-      <p:par>
-        <p:cTn id="1" dur="indefinite" restart="never" nodeType="tmRoot"/>
-      </p:par>
-    </p:tnLst>
-  </p:timing>
 </p:sld>
 </file>
 
@@ -6019,17 +7540,16 @@
           <a:p>
             <a:pPr algn="ctr"/>
             <a:r>
-              <a:rPr lang="en-US" sz="5400" dirty="0" smtClean="0"/>
+              <a:rPr lang="en-US" sz="5400" dirty="0"/>
               <a:t>RADV Application </a:t>
             </a:r>
             <a:br>
-              <a:rPr lang="en-US" sz="5400" dirty="0" smtClean="0"/>
+              <a:rPr lang="en-US" sz="5400" dirty="0"/>
             </a:br>
             <a:r>
-              <a:rPr lang="en-US" sz="5400" dirty="0" smtClean="0"/>
+              <a:rPr lang="en-US" sz="5400" dirty="0"/>
               <a:t>Walk-Through</a:t>
             </a:r>
-            <a:endParaRPr lang="en-US" sz="5400" dirty="0"/>
           </a:p>
         </p:txBody>
       </p:sp>
@@ -6051,13 +7571,6 @@
       <p:transition spd="slow" advTm="2000"/>
     </mc:Fallback>
   </mc:AlternateContent>
-  <p:timing>
-    <p:tnLst>
-      <p:par>
-        <p:cTn id="1" dur="indefinite" restart="never" nodeType="tmRoot"/>
-      </p:par>
-    </p:tnLst>
-  </p:timing>
 </p:sld>
 </file>
 

</xml_diff>

<commit_message>
Added updated architecture diagram to presentation
</commit_message>
<xml_diff>
--- a/Team Deliverable 4/Final Presentation - FHIRed Up.pptx
+++ b/Team Deliverable 4/Final Presentation - FHIRed Up.pptx
@@ -147,7 +147,7 @@
 </file>
 
 <file path=ppt/charts/chart1.xml><?xml version="1.0" encoding="utf-8"?>
-<c:chartSpace xmlns:c="http://schemas.openxmlformats.org/drawingml/2006/chart" xmlns:a="http://schemas.openxmlformats.org/drawingml/2006/main" xmlns:r="http://schemas.openxmlformats.org/officeDocument/2006/relationships" xmlns:c16r2="http://schemas.microsoft.com/office/drawing/2015/06/chart">
+<c:chartSpace xmlns:c="http://schemas.openxmlformats.org/drawingml/2006/chart" xmlns:a="http://schemas.openxmlformats.org/drawingml/2006/main" xmlns:r="http://schemas.openxmlformats.org/officeDocument/2006/relationships">
   <c:date1904 val="0"/>
   <c:lang val="en-US"/>
   <c:roundedCorners val="0"/>
@@ -203,6 +203,7 @@
           <c:dLbls>
             <c:dLbl>
               <c:idx val="0"/>
+              <c:layout/>
               <c:tx>
                 <c:rich>
                   <a:bodyPr/>
@@ -227,24 +228,25 @@
               <c:showSerName val="1"/>
               <c:showPercent val="0"/>
               <c:showBubbleSize val="0"/>
-              <c:extLst>
+              <c:extLst xmlns:c16r2="http://schemas.microsoft.com/office/drawing/2015/06/chart">
+                <c:ext xmlns:c16="http://schemas.microsoft.com/office/drawing/2014/chart" uri="{C3380CC4-5D6E-409C-BE32-E72D297353CC}">
+                  <c16:uniqueId val="{0000001F-8090-479E-BF1A-EA59472E2D6D}"/>
+                </c:ext>
                 <c:ext xmlns:c15="http://schemas.microsoft.com/office/drawing/2012/chart" uri="{CE6537A1-D6FC-4f65-9D91-7224C49458BB}">
+                  <c15:layout/>
                   <c15:dlblFieldTable/>
                   <c15:showDataLabelsRange val="0"/>
-                </c:ext>
-                <c:ext xmlns:c16="http://schemas.microsoft.com/office/drawing/2014/chart" uri="{C3380CC4-5D6E-409C-BE32-E72D297353CC}">
-                  <c16:uniqueId val="{0000001F-8090-479E-BF1A-EA59472E2D6D}"/>
                 </c:ext>
               </c:extLst>
             </c:dLbl>
             <c:dLbl>
               <c:idx val="1"/>
               <c:delete val="1"/>
-              <c:extLst>
-                <c:ext xmlns:c15="http://schemas.microsoft.com/office/drawing/2012/chart" uri="{CE6537A1-D6FC-4f65-9D91-7224C49458BB}"/>
+              <c:extLst xmlns:c16r2="http://schemas.microsoft.com/office/drawing/2015/06/chart">
                 <c:ext xmlns:c16="http://schemas.microsoft.com/office/drawing/2014/chart" uri="{C3380CC4-5D6E-409C-BE32-E72D297353CC}">
                   <c16:uniqueId val="{00000000-8090-479E-BF1A-EA59472E2D6D}"/>
                 </c:ext>
+                <c:ext xmlns:c15="http://schemas.microsoft.com/office/drawing/2012/chart" uri="{CE6537A1-D6FC-4f65-9D91-7224C49458BB}"/>
               </c:extLst>
             </c:dLbl>
             <c:spPr>
@@ -262,7 +264,7 @@
             <c:showPercent val="0"/>
             <c:showBubbleSize val="0"/>
             <c:showLeaderLines val="0"/>
-            <c:extLst>
+            <c:extLst xmlns:c16r2="http://schemas.microsoft.com/office/drawing/2015/06/chart">
               <c:ext xmlns:c15="http://schemas.microsoft.com/office/drawing/2012/chart" uri="{CE6537A1-D6FC-4f65-9D91-7224C49458BB}">
                 <c15:showLeaderLines val="0"/>
               </c:ext>
@@ -299,7 +301,7 @@
             </c:numRef>
           </c:yVal>
           <c:smooth val="0"/>
-          <c:extLst>
+          <c:extLst xmlns:c16r2="http://schemas.microsoft.com/office/drawing/2015/06/chart">
             <c:ext xmlns:c16="http://schemas.microsoft.com/office/drawing/2014/chart" uri="{C3380CC4-5D6E-409C-BE32-E72D297353CC}">
               <c16:uniqueId val="{00000001-8090-479E-BF1A-EA59472E2D6D}"/>
             </c:ext>
@@ -366,24 +368,25 @@
               <c:showSerName val="1"/>
               <c:showPercent val="0"/>
               <c:showBubbleSize val="0"/>
-              <c:extLst>
+              <c:extLst xmlns:c16r2="http://schemas.microsoft.com/office/drawing/2015/06/chart">
+                <c:ext xmlns:c16="http://schemas.microsoft.com/office/drawing/2014/chart" uri="{C3380CC4-5D6E-409C-BE32-E72D297353CC}">
+                  <c16:uniqueId val="{00000002-8090-479E-BF1A-EA59472E2D6D}"/>
+                </c:ext>
                 <c:ext xmlns:c15="http://schemas.microsoft.com/office/drawing/2012/chart" uri="{CE6537A1-D6FC-4f65-9D91-7224C49458BB}">
+                  <c15:layout/>
                   <c15:dlblFieldTable/>
                   <c15:showDataLabelsRange val="0"/>
-                </c:ext>
-                <c:ext xmlns:c16="http://schemas.microsoft.com/office/drawing/2014/chart" uri="{C3380CC4-5D6E-409C-BE32-E72D297353CC}">
-                  <c16:uniqueId val="{00000002-8090-479E-BF1A-EA59472E2D6D}"/>
                 </c:ext>
               </c:extLst>
             </c:dLbl>
             <c:dLbl>
               <c:idx val="1"/>
               <c:delete val="1"/>
-              <c:extLst>
-                <c:ext xmlns:c15="http://schemas.microsoft.com/office/drawing/2012/chart" uri="{CE6537A1-D6FC-4f65-9D91-7224C49458BB}"/>
+              <c:extLst xmlns:c16r2="http://schemas.microsoft.com/office/drawing/2015/06/chart">
                 <c:ext xmlns:c16="http://schemas.microsoft.com/office/drawing/2014/chart" uri="{C3380CC4-5D6E-409C-BE32-E72D297353CC}">
                   <c16:uniqueId val="{00000003-8090-479E-BF1A-EA59472E2D6D}"/>
                 </c:ext>
+                <c:ext xmlns:c15="http://schemas.microsoft.com/office/drawing/2012/chart" uri="{CE6537A1-D6FC-4f65-9D91-7224C49458BB}"/>
               </c:extLst>
             </c:dLbl>
             <c:spPr>
@@ -401,7 +404,7 @@
             <c:showPercent val="0"/>
             <c:showBubbleSize val="0"/>
             <c:showLeaderLines val="0"/>
-            <c:extLst>
+            <c:extLst xmlns:c16r2="http://schemas.microsoft.com/office/drawing/2015/06/chart">
               <c:ext xmlns:c15="http://schemas.microsoft.com/office/drawing/2012/chart" uri="{CE6537A1-D6FC-4f65-9D91-7224C49458BB}">
                 <c15:showLeaderLines val="0"/>
               </c:ext>
@@ -438,7 +441,7 @@
             </c:numRef>
           </c:yVal>
           <c:smooth val="0"/>
-          <c:extLst>
+          <c:extLst xmlns:c16r2="http://schemas.microsoft.com/office/drawing/2015/06/chart">
             <c:ext xmlns:c16="http://schemas.microsoft.com/office/drawing/2014/chart" uri="{C3380CC4-5D6E-409C-BE32-E72D297353CC}">
               <c16:uniqueId val="{00000004-8090-479E-BF1A-EA59472E2D6D}"/>
             </c:ext>
@@ -472,11 +475,11 @@
             <c:dLbl>
               <c:idx val="0"/>
               <c:delete val="1"/>
-              <c:extLst>
-                <c:ext xmlns:c15="http://schemas.microsoft.com/office/drawing/2012/chart" uri="{CE6537A1-D6FC-4f65-9D91-7224C49458BB}"/>
+              <c:extLst xmlns:c16r2="http://schemas.microsoft.com/office/drawing/2015/06/chart">
                 <c:ext xmlns:c16="http://schemas.microsoft.com/office/drawing/2014/chart" uri="{C3380CC4-5D6E-409C-BE32-E72D297353CC}">
                   <c16:uniqueId val="{00000005-8090-479E-BF1A-EA59472E2D6D}"/>
                 </c:ext>
+                <c:ext xmlns:c15="http://schemas.microsoft.com/office/drawing/2012/chart" uri="{CE6537A1-D6FC-4f65-9D91-7224C49458BB}"/>
               </c:extLst>
             </c:dLbl>
             <c:dLbl>
@@ -515,13 +518,14 @@
               <c:showSerName val="1"/>
               <c:showPercent val="0"/>
               <c:showBubbleSize val="0"/>
-              <c:extLst>
+              <c:extLst xmlns:c16r2="http://schemas.microsoft.com/office/drawing/2015/06/chart">
+                <c:ext xmlns:c16="http://schemas.microsoft.com/office/drawing/2014/chart" uri="{C3380CC4-5D6E-409C-BE32-E72D297353CC}">
+                  <c16:uniqueId val="{00000006-8090-479E-BF1A-EA59472E2D6D}"/>
+                </c:ext>
                 <c:ext xmlns:c15="http://schemas.microsoft.com/office/drawing/2012/chart" uri="{CE6537A1-D6FC-4f65-9D91-7224C49458BB}">
+                  <c15:layout/>
                   <c15:dlblFieldTable/>
                   <c15:showDataLabelsRange val="0"/>
-                </c:ext>
-                <c:ext xmlns:c16="http://schemas.microsoft.com/office/drawing/2014/chart" uri="{C3380CC4-5D6E-409C-BE32-E72D297353CC}">
-                  <c16:uniqueId val="{00000006-8090-479E-BF1A-EA59472E2D6D}"/>
                 </c:ext>
               </c:extLst>
             </c:dLbl>
@@ -540,7 +544,7 @@
             <c:showPercent val="0"/>
             <c:showBubbleSize val="0"/>
             <c:showLeaderLines val="0"/>
-            <c:extLst>
+            <c:extLst xmlns:c16r2="http://schemas.microsoft.com/office/drawing/2015/06/chart">
               <c:ext xmlns:c15="http://schemas.microsoft.com/office/drawing/2012/chart" uri="{CE6537A1-D6FC-4f65-9D91-7224C49458BB}">
                 <c15:showLeaderLines val="0"/>
               </c:ext>
@@ -577,7 +581,7 @@
             </c:numRef>
           </c:yVal>
           <c:smooth val="0"/>
-          <c:extLst>
+          <c:extLst xmlns:c16r2="http://schemas.microsoft.com/office/drawing/2015/06/chart">
             <c:ext xmlns:c16="http://schemas.microsoft.com/office/drawing/2014/chart" uri="{C3380CC4-5D6E-409C-BE32-E72D297353CC}">
               <c16:uniqueId val="{00000007-8090-479E-BF1A-EA59472E2D6D}"/>
             </c:ext>
@@ -644,24 +648,25 @@
               <c:showSerName val="1"/>
               <c:showPercent val="0"/>
               <c:showBubbleSize val="0"/>
-              <c:extLst>
+              <c:extLst xmlns:c16r2="http://schemas.microsoft.com/office/drawing/2015/06/chart">
+                <c:ext xmlns:c16="http://schemas.microsoft.com/office/drawing/2014/chart" uri="{C3380CC4-5D6E-409C-BE32-E72D297353CC}">
+                  <c16:uniqueId val="{00000008-8090-479E-BF1A-EA59472E2D6D}"/>
+                </c:ext>
                 <c:ext xmlns:c15="http://schemas.microsoft.com/office/drawing/2012/chart" uri="{CE6537A1-D6FC-4f65-9D91-7224C49458BB}">
+                  <c15:layout/>
                   <c15:dlblFieldTable/>
                   <c15:showDataLabelsRange val="0"/>
-                </c:ext>
-                <c:ext xmlns:c16="http://schemas.microsoft.com/office/drawing/2014/chart" uri="{C3380CC4-5D6E-409C-BE32-E72D297353CC}">
-                  <c16:uniqueId val="{00000008-8090-479E-BF1A-EA59472E2D6D}"/>
                 </c:ext>
               </c:extLst>
             </c:dLbl>
             <c:dLbl>
               <c:idx val="1"/>
               <c:delete val="1"/>
-              <c:extLst>
-                <c:ext xmlns:c15="http://schemas.microsoft.com/office/drawing/2012/chart" uri="{CE6537A1-D6FC-4f65-9D91-7224C49458BB}"/>
+              <c:extLst xmlns:c16r2="http://schemas.microsoft.com/office/drawing/2015/06/chart">
                 <c:ext xmlns:c16="http://schemas.microsoft.com/office/drawing/2014/chart" uri="{C3380CC4-5D6E-409C-BE32-E72D297353CC}">
                   <c16:uniqueId val="{00000009-8090-479E-BF1A-EA59472E2D6D}"/>
                 </c:ext>
+                <c:ext xmlns:c15="http://schemas.microsoft.com/office/drawing/2012/chart" uri="{CE6537A1-D6FC-4f65-9D91-7224C49458BB}"/>
               </c:extLst>
             </c:dLbl>
             <c:spPr>
@@ -679,7 +684,7 @@
             <c:showPercent val="0"/>
             <c:showBubbleSize val="0"/>
             <c:showLeaderLines val="0"/>
-            <c:extLst>
+            <c:extLst xmlns:c16r2="http://schemas.microsoft.com/office/drawing/2015/06/chart">
               <c:ext xmlns:c15="http://schemas.microsoft.com/office/drawing/2012/chart" uri="{CE6537A1-D6FC-4f65-9D91-7224C49458BB}">
                 <c15:showLeaderLines val="0"/>
               </c:ext>
@@ -716,7 +721,7 @@
             </c:numRef>
           </c:yVal>
           <c:smooth val="0"/>
-          <c:extLst>
+          <c:extLst xmlns:c16r2="http://schemas.microsoft.com/office/drawing/2015/06/chart">
             <c:ext xmlns:c16="http://schemas.microsoft.com/office/drawing/2014/chart" uri="{C3380CC4-5D6E-409C-BE32-E72D297353CC}">
               <c16:uniqueId val="{0000000A-8090-479E-BF1A-EA59472E2D6D}"/>
             </c:ext>
@@ -750,15 +755,16 @@
             <c:dLbl>
               <c:idx val="0"/>
               <c:delete val="1"/>
-              <c:extLst>
-                <c:ext xmlns:c15="http://schemas.microsoft.com/office/drawing/2012/chart" uri="{CE6537A1-D6FC-4f65-9D91-7224C49458BB}"/>
+              <c:extLst xmlns:c16r2="http://schemas.microsoft.com/office/drawing/2015/06/chart">
                 <c:ext xmlns:c16="http://schemas.microsoft.com/office/drawing/2014/chart" uri="{C3380CC4-5D6E-409C-BE32-E72D297353CC}">
                   <c16:uniqueId val="{0000000B-8090-479E-BF1A-EA59472E2D6D}"/>
                 </c:ext>
+                <c:ext xmlns:c15="http://schemas.microsoft.com/office/drawing/2012/chart" uri="{CE6537A1-D6FC-4f65-9D91-7224C49458BB}"/>
               </c:extLst>
             </c:dLbl>
             <c:dLbl>
               <c:idx val="1"/>
+              <c:layout/>
               <c:tx>
                 <c:rich>
                   <a:bodyPr/>
@@ -783,13 +789,14 @@
               <c:showSerName val="1"/>
               <c:showPercent val="0"/>
               <c:showBubbleSize val="0"/>
-              <c:extLst>
+              <c:extLst xmlns:c16r2="http://schemas.microsoft.com/office/drawing/2015/06/chart">
+                <c:ext xmlns:c16="http://schemas.microsoft.com/office/drawing/2014/chart" uri="{C3380CC4-5D6E-409C-BE32-E72D297353CC}">
+                  <c16:uniqueId val="{00000020-8090-479E-BF1A-EA59472E2D6D}"/>
+                </c:ext>
                 <c:ext xmlns:c15="http://schemas.microsoft.com/office/drawing/2012/chart" uri="{CE6537A1-D6FC-4f65-9D91-7224C49458BB}">
+                  <c15:layout/>
                   <c15:dlblFieldTable/>
                   <c15:showDataLabelsRange val="0"/>
-                </c:ext>
-                <c:ext xmlns:c16="http://schemas.microsoft.com/office/drawing/2014/chart" uri="{C3380CC4-5D6E-409C-BE32-E72D297353CC}">
-                  <c16:uniqueId val="{00000020-8090-479E-BF1A-EA59472E2D6D}"/>
                 </c:ext>
               </c:extLst>
             </c:dLbl>
@@ -808,7 +815,7 @@
             <c:showPercent val="0"/>
             <c:showBubbleSize val="0"/>
             <c:showLeaderLines val="0"/>
-            <c:extLst>
+            <c:extLst xmlns:c16r2="http://schemas.microsoft.com/office/drawing/2015/06/chart">
               <c:ext xmlns:c15="http://schemas.microsoft.com/office/drawing/2012/chart" uri="{CE6537A1-D6FC-4f65-9D91-7224C49458BB}">
                 <c15:showLeaderLines val="0"/>
               </c:ext>
@@ -845,7 +852,7 @@
             </c:numRef>
           </c:yVal>
           <c:smooth val="0"/>
-          <c:extLst>
+          <c:extLst xmlns:c16r2="http://schemas.microsoft.com/office/drawing/2015/06/chart">
             <c:ext xmlns:c16="http://schemas.microsoft.com/office/drawing/2014/chart" uri="{C3380CC4-5D6E-409C-BE32-E72D297353CC}">
               <c16:uniqueId val="{0000000C-8090-479E-BF1A-EA59472E2D6D}"/>
             </c:ext>
@@ -895,21 +902,23 @@
               <c:showSerName val="1"/>
               <c:showPercent val="0"/>
               <c:showBubbleSize val="0"/>
-              <c:extLst>
-                <c:ext xmlns:c15="http://schemas.microsoft.com/office/drawing/2012/chart" uri="{CE6537A1-D6FC-4f65-9D91-7224C49458BB}"/>
+              <c:extLst xmlns:c16r2="http://schemas.microsoft.com/office/drawing/2015/06/chart">
                 <c:ext xmlns:c16="http://schemas.microsoft.com/office/drawing/2014/chart" uri="{C3380CC4-5D6E-409C-BE32-E72D297353CC}">
                   <c16:uniqueId val="{0000000D-8090-479E-BF1A-EA59472E2D6D}"/>
+                </c:ext>
+                <c:ext xmlns:c15="http://schemas.microsoft.com/office/drawing/2012/chart" uri="{CE6537A1-D6FC-4f65-9D91-7224C49458BB}">
+                  <c15:layout/>
                 </c:ext>
               </c:extLst>
             </c:dLbl>
             <c:dLbl>
               <c:idx val="1"/>
               <c:delete val="1"/>
-              <c:extLst>
-                <c:ext xmlns:c15="http://schemas.microsoft.com/office/drawing/2012/chart" uri="{CE6537A1-D6FC-4f65-9D91-7224C49458BB}"/>
+              <c:extLst xmlns:c16r2="http://schemas.microsoft.com/office/drawing/2015/06/chart">
                 <c:ext xmlns:c16="http://schemas.microsoft.com/office/drawing/2014/chart" uri="{C3380CC4-5D6E-409C-BE32-E72D297353CC}">
                   <c16:uniqueId val="{0000000E-8090-479E-BF1A-EA59472E2D6D}"/>
                 </c:ext>
+                <c:ext xmlns:c15="http://schemas.microsoft.com/office/drawing/2012/chart" uri="{CE6537A1-D6FC-4f65-9D91-7224C49458BB}"/>
               </c:extLst>
             </c:dLbl>
             <c:spPr>
@@ -927,7 +936,7 @@
             <c:showPercent val="0"/>
             <c:showBubbleSize val="0"/>
             <c:showLeaderLines val="0"/>
-            <c:extLst>
+            <c:extLst xmlns:c16r2="http://schemas.microsoft.com/office/drawing/2015/06/chart">
               <c:ext xmlns:c15="http://schemas.microsoft.com/office/drawing/2012/chart" uri="{CE6537A1-D6FC-4f65-9D91-7224C49458BB}">
                 <c15:showLeaderLines val="0"/>
               </c:ext>
@@ -964,7 +973,7 @@
             </c:numRef>
           </c:yVal>
           <c:smooth val="0"/>
-          <c:extLst>
+          <c:extLst xmlns:c16r2="http://schemas.microsoft.com/office/drawing/2015/06/chart">
             <c:ext xmlns:c16="http://schemas.microsoft.com/office/drawing/2014/chart" uri="{C3380CC4-5D6E-409C-BE32-E72D297353CC}">
               <c16:uniqueId val="{0000000F-8090-479E-BF1A-EA59472E2D6D}"/>
             </c:ext>
@@ -1028,7 +1037,7 @@
             </c:numRef>
           </c:yVal>
           <c:smooth val="0"/>
-          <c:extLst>
+          <c:extLst xmlns:c16r2="http://schemas.microsoft.com/office/drawing/2015/06/chart">
             <c:ext xmlns:c16="http://schemas.microsoft.com/office/drawing/2014/chart" uri="{C3380CC4-5D6E-409C-BE32-E72D297353CC}">
               <c16:uniqueId val="{00000010-8090-479E-BF1A-EA59472E2D6D}"/>
             </c:ext>
@@ -1061,11 +1070,11 @@
             <c:dLbl>
               <c:idx val="0"/>
               <c:delete val="1"/>
-              <c:extLst>
-                <c:ext xmlns:c15="http://schemas.microsoft.com/office/drawing/2012/chart" uri="{CE6537A1-D6FC-4f65-9D91-7224C49458BB}"/>
+              <c:extLst xmlns:c16r2="http://schemas.microsoft.com/office/drawing/2015/06/chart">
                 <c:ext xmlns:c16="http://schemas.microsoft.com/office/drawing/2014/chart" uri="{C3380CC4-5D6E-409C-BE32-E72D297353CC}">
                   <c16:uniqueId val="{00000011-8090-479E-BF1A-EA59472E2D6D}"/>
                 </c:ext>
+                <c:ext xmlns:c15="http://schemas.microsoft.com/office/drawing/2012/chart" uri="{CE6537A1-D6FC-4f65-9D91-7224C49458BB}"/>
               </c:extLst>
             </c:dLbl>
             <c:dLbl>
@@ -1083,10 +1092,12 @@
               <c:showSerName val="1"/>
               <c:showPercent val="0"/>
               <c:showBubbleSize val="0"/>
-              <c:extLst>
-                <c:ext xmlns:c15="http://schemas.microsoft.com/office/drawing/2012/chart" uri="{CE6537A1-D6FC-4f65-9D91-7224C49458BB}"/>
+              <c:extLst xmlns:c16r2="http://schemas.microsoft.com/office/drawing/2015/06/chart">
                 <c:ext xmlns:c16="http://schemas.microsoft.com/office/drawing/2014/chart" uri="{C3380CC4-5D6E-409C-BE32-E72D297353CC}">
                   <c16:uniqueId val="{00000012-8090-479E-BF1A-EA59472E2D6D}"/>
+                </c:ext>
+                <c:ext xmlns:c15="http://schemas.microsoft.com/office/drawing/2012/chart" uri="{CE6537A1-D6FC-4f65-9D91-7224C49458BB}">
+                  <c15:layout/>
                 </c:ext>
               </c:extLst>
             </c:dLbl>
@@ -1105,7 +1116,7 @@
             <c:showPercent val="0"/>
             <c:showBubbleSize val="0"/>
             <c:showLeaderLines val="0"/>
-            <c:extLst>
+            <c:extLst xmlns:c16r2="http://schemas.microsoft.com/office/drawing/2015/06/chart">
               <c:ext xmlns:c15="http://schemas.microsoft.com/office/drawing/2012/chart" uri="{CE6537A1-D6FC-4f65-9D91-7224C49458BB}">
                 <c15:showLeaderLines val="0"/>
               </c:ext>
@@ -1142,7 +1153,7 @@
             </c:numRef>
           </c:yVal>
           <c:smooth val="0"/>
-          <c:extLst>
+          <c:extLst xmlns:c16r2="http://schemas.microsoft.com/office/drawing/2015/06/chart">
             <c:ext xmlns:c16="http://schemas.microsoft.com/office/drawing/2014/chart" uri="{C3380CC4-5D6E-409C-BE32-E72D297353CC}">
               <c16:uniqueId val="{00000013-8090-479E-BF1A-EA59472E2D6D}"/>
             </c:ext>
@@ -1206,7 +1217,7 @@
             </c:numRef>
           </c:yVal>
           <c:smooth val="0"/>
-          <c:extLst>
+          <c:extLst xmlns:c16r2="http://schemas.microsoft.com/office/drawing/2015/06/chart">
             <c:ext xmlns:c16="http://schemas.microsoft.com/office/drawing/2014/chart" uri="{C3380CC4-5D6E-409C-BE32-E72D297353CC}">
               <c16:uniqueId val="{00000014-8090-479E-BF1A-EA59472E2D6D}"/>
             </c:ext>
@@ -1273,24 +1284,25 @@
               <c:showSerName val="1"/>
               <c:showPercent val="0"/>
               <c:showBubbleSize val="0"/>
-              <c:extLst>
+              <c:extLst xmlns:c16r2="http://schemas.microsoft.com/office/drawing/2015/06/chart">
+                <c:ext xmlns:c16="http://schemas.microsoft.com/office/drawing/2014/chart" uri="{C3380CC4-5D6E-409C-BE32-E72D297353CC}">
+                  <c16:uniqueId val="{00000015-8090-479E-BF1A-EA59472E2D6D}"/>
+                </c:ext>
                 <c:ext xmlns:c15="http://schemas.microsoft.com/office/drawing/2012/chart" uri="{CE6537A1-D6FC-4f65-9D91-7224C49458BB}">
+                  <c15:layout/>
                   <c15:dlblFieldTable/>
                   <c15:showDataLabelsRange val="0"/>
-                </c:ext>
-                <c:ext xmlns:c16="http://schemas.microsoft.com/office/drawing/2014/chart" uri="{C3380CC4-5D6E-409C-BE32-E72D297353CC}">
-                  <c16:uniqueId val="{00000015-8090-479E-BF1A-EA59472E2D6D}"/>
                 </c:ext>
               </c:extLst>
             </c:dLbl>
             <c:dLbl>
               <c:idx val="1"/>
               <c:delete val="1"/>
-              <c:extLst>
-                <c:ext xmlns:c15="http://schemas.microsoft.com/office/drawing/2012/chart" uri="{CE6537A1-D6FC-4f65-9D91-7224C49458BB}"/>
+              <c:extLst xmlns:c16r2="http://schemas.microsoft.com/office/drawing/2015/06/chart">
                 <c:ext xmlns:c16="http://schemas.microsoft.com/office/drawing/2014/chart" uri="{C3380CC4-5D6E-409C-BE32-E72D297353CC}">
                   <c16:uniqueId val="{00000016-8090-479E-BF1A-EA59472E2D6D}"/>
                 </c:ext>
+                <c:ext xmlns:c15="http://schemas.microsoft.com/office/drawing/2012/chart" uri="{CE6537A1-D6FC-4f65-9D91-7224C49458BB}"/>
               </c:extLst>
             </c:dLbl>
             <c:spPr>
@@ -1308,7 +1320,7 @@
             <c:showPercent val="0"/>
             <c:showBubbleSize val="0"/>
             <c:showLeaderLines val="0"/>
-            <c:extLst>
+            <c:extLst xmlns:c16r2="http://schemas.microsoft.com/office/drawing/2015/06/chart">
               <c:ext xmlns:c15="http://schemas.microsoft.com/office/drawing/2012/chart" uri="{CE6537A1-D6FC-4f65-9D91-7224C49458BB}">
                 <c15:showLeaderLines val="0"/>
               </c:ext>
@@ -1345,7 +1357,7 @@
             </c:numRef>
           </c:yVal>
           <c:smooth val="0"/>
-          <c:extLst>
+          <c:extLst xmlns:c16r2="http://schemas.microsoft.com/office/drawing/2015/06/chart">
             <c:ext xmlns:c16="http://schemas.microsoft.com/office/drawing/2014/chart" uri="{C3380CC4-5D6E-409C-BE32-E72D297353CC}">
               <c16:uniqueId val="{00000017-8090-479E-BF1A-EA59472E2D6D}"/>
             </c:ext>
@@ -1409,7 +1421,7 @@
             </c:numRef>
           </c:yVal>
           <c:smooth val="0"/>
-          <c:extLst>
+          <c:extLst xmlns:c16r2="http://schemas.microsoft.com/office/drawing/2015/06/chart">
             <c:ext xmlns:c16="http://schemas.microsoft.com/office/drawing/2014/chart" uri="{C3380CC4-5D6E-409C-BE32-E72D297353CC}">
               <c16:uniqueId val="{00000018-8090-479E-BF1A-EA59472E2D6D}"/>
             </c:ext>
@@ -1442,11 +1454,11 @@
             <c:dLbl>
               <c:idx val="0"/>
               <c:delete val="1"/>
-              <c:extLst>
-                <c:ext xmlns:c15="http://schemas.microsoft.com/office/drawing/2012/chart" uri="{CE6537A1-D6FC-4f65-9D91-7224C49458BB}"/>
+              <c:extLst xmlns:c16r2="http://schemas.microsoft.com/office/drawing/2015/06/chart">
                 <c:ext xmlns:c16="http://schemas.microsoft.com/office/drawing/2014/chart" uri="{C3380CC4-5D6E-409C-BE32-E72D297353CC}">
                   <c16:uniqueId val="{00000019-8090-479E-BF1A-EA59472E2D6D}"/>
                 </c:ext>
+                <c:ext xmlns:c15="http://schemas.microsoft.com/office/drawing/2012/chart" uri="{CE6537A1-D6FC-4f65-9D91-7224C49458BB}"/>
               </c:extLst>
             </c:dLbl>
             <c:dLbl>
@@ -1464,10 +1476,12 @@
               <c:showSerName val="1"/>
               <c:showPercent val="0"/>
               <c:showBubbleSize val="0"/>
-              <c:extLst>
-                <c:ext xmlns:c15="http://schemas.microsoft.com/office/drawing/2012/chart" uri="{CE6537A1-D6FC-4f65-9D91-7224C49458BB}"/>
+              <c:extLst xmlns:c16r2="http://schemas.microsoft.com/office/drawing/2015/06/chart">
                 <c:ext xmlns:c16="http://schemas.microsoft.com/office/drawing/2014/chart" uri="{C3380CC4-5D6E-409C-BE32-E72D297353CC}">
                   <c16:uniqueId val="{0000001A-8090-479E-BF1A-EA59472E2D6D}"/>
+                </c:ext>
+                <c:ext xmlns:c15="http://schemas.microsoft.com/office/drawing/2012/chart" uri="{CE6537A1-D6FC-4f65-9D91-7224C49458BB}">
+                  <c15:layout/>
                 </c:ext>
               </c:extLst>
             </c:dLbl>
@@ -1486,7 +1500,7 @@
             <c:showPercent val="0"/>
             <c:showBubbleSize val="0"/>
             <c:showLeaderLines val="0"/>
-            <c:extLst>
+            <c:extLst xmlns:c16r2="http://schemas.microsoft.com/office/drawing/2015/06/chart">
               <c:ext xmlns:c15="http://schemas.microsoft.com/office/drawing/2012/chart" uri="{CE6537A1-D6FC-4f65-9D91-7224C49458BB}">
                 <c15:showLeaderLines val="0"/>
               </c:ext>
@@ -1523,7 +1537,7 @@
             </c:numRef>
           </c:yVal>
           <c:smooth val="0"/>
-          <c:extLst>
+          <c:extLst xmlns:c16r2="http://schemas.microsoft.com/office/drawing/2015/06/chart">
             <c:ext xmlns:c16="http://schemas.microsoft.com/office/drawing/2014/chart" uri="{C3380CC4-5D6E-409C-BE32-E72D297353CC}">
               <c16:uniqueId val="{0000001B-8090-479E-BF1A-EA59472E2D6D}"/>
             </c:ext>
@@ -1556,11 +1570,11 @@
             <c:dLbl>
               <c:idx val="0"/>
               <c:delete val="1"/>
-              <c:extLst>
-                <c:ext xmlns:c15="http://schemas.microsoft.com/office/drawing/2012/chart" uri="{CE6537A1-D6FC-4f65-9D91-7224C49458BB}"/>
+              <c:extLst xmlns:c16r2="http://schemas.microsoft.com/office/drawing/2015/06/chart">
                 <c:ext xmlns:c16="http://schemas.microsoft.com/office/drawing/2014/chart" uri="{C3380CC4-5D6E-409C-BE32-E72D297353CC}">
                   <c16:uniqueId val="{0000001C-8090-479E-BF1A-EA59472E2D6D}"/>
                 </c:ext>
+                <c:ext xmlns:c15="http://schemas.microsoft.com/office/drawing/2012/chart" uri="{CE6537A1-D6FC-4f65-9D91-7224C49458BB}"/>
               </c:extLst>
             </c:dLbl>
             <c:spPr>
@@ -1578,8 +1592,9 @@
             <c:showPercent val="0"/>
             <c:showBubbleSize val="0"/>
             <c:showLeaderLines val="0"/>
-            <c:extLst>
+            <c:extLst xmlns:c16r2="http://schemas.microsoft.com/office/drawing/2015/06/chart">
               <c:ext xmlns:c15="http://schemas.microsoft.com/office/drawing/2012/chart" uri="{CE6537A1-D6FC-4f65-9D91-7224C49458BB}">
+                <c15:layout/>
                 <c15:showLeaderLines val="0"/>
               </c:ext>
             </c:extLst>
@@ -1615,7 +1630,7 @@
             </c:numRef>
           </c:yVal>
           <c:smooth val="0"/>
-          <c:extLst>
+          <c:extLst xmlns:c16r2="http://schemas.microsoft.com/office/drawing/2015/06/chart">
             <c:ext xmlns:c16="http://schemas.microsoft.com/office/drawing/2014/chart" uri="{C3380CC4-5D6E-409C-BE32-E72D297353CC}">
               <c16:uniqueId val="{0000001E-8090-479E-BF1A-EA59472E2D6D}"/>
             </c:ext>
@@ -1630,11 +1645,11 @@
           <c:showPercent val="0"/>
           <c:showBubbleSize val="0"/>
         </c:dLbls>
-        <c:axId val="879849408"/>
-        <c:axId val="879847104"/>
+        <c:axId val="-1186406976"/>
+        <c:axId val="-1186411328"/>
       </c:scatterChart>
       <c:valAx>
-        <c:axId val="879849408"/>
+        <c:axId val="-1186406976"/>
         <c:scaling>
           <c:orientation val="minMax"/>
         </c:scaling>
@@ -1657,12 +1672,12 @@
             <a:endParaRPr lang="en-US"/>
           </a:p>
         </c:txPr>
-        <c:crossAx val="879847104"/>
+        <c:crossAx val="-1186411328"/>
         <c:crosses val="autoZero"/>
         <c:crossBetween val="midCat"/>
       </c:valAx>
       <c:valAx>
-        <c:axId val="879847104"/>
+        <c:axId val="-1186411328"/>
         <c:scaling>
           <c:orientation val="minMax"/>
         </c:scaling>
@@ -1679,7 +1694,7 @@
         <c:majorTickMark val="out"/>
         <c:minorTickMark val="none"/>
         <c:tickLblPos val="nextTo"/>
-        <c:crossAx val="879849408"/>
+        <c:crossAx val="-1186406976"/>
         <c:crosses val="autoZero"/>
         <c:crossBetween val="midCat"/>
       </c:valAx>
@@ -1792,7 +1807,7 @@
           <a:p>
             <a:fld id="{82AF1EC4-0AE9-4ABA-827F-84879B727577}" type="datetimeFigureOut">
               <a:rPr lang="en-US" smtClean="0"/>
-              <a:t>4/18/2016</a:t>
+              <a:t>4/21/2016</a:t>
             </a:fld>
             <a:endParaRPr lang="en-US"/>
           </a:p>
@@ -2820,7 +2835,7 @@
           <a:p>
             <a:fld id="{3EAEFB75-4DE4-4DFC-B956-52D01254B927}" type="datetimeFigureOut">
               <a:rPr lang="en-US" smtClean="0"/>
-              <a:t>4/18/2016</a:t>
+              <a:t>4/21/2016</a:t>
             </a:fld>
             <a:endParaRPr lang="en-US"/>
           </a:p>
@@ -3171,7 +3186,7 @@
           <a:p>
             <a:fld id="{3EAEFB75-4DE4-4DFC-B956-52D01254B927}" type="datetimeFigureOut">
               <a:rPr lang="en-US" smtClean="0"/>
-              <a:t>4/18/2016</a:t>
+              <a:t>4/21/2016</a:t>
             </a:fld>
             <a:endParaRPr lang="en-US"/>
           </a:p>
@@ -3345,7 +3360,7 @@
           <a:p>
             <a:fld id="{3EAEFB75-4DE4-4DFC-B956-52D01254B927}" type="datetimeFigureOut">
               <a:rPr lang="en-US" smtClean="0"/>
-              <a:t>4/18/2016</a:t>
+              <a:t>4/21/2016</a:t>
             </a:fld>
             <a:endParaRPr lang="en-US"/>
           </a:p>
@@ -3457,7 +3472,7 @@
           <a:p>
             <a:fld id="{3EAEFB75-4DE4-4DFC-B956-52D01254B927}" type="datetimeFigureOut">
               <a:rPr lang="en-US" smtClean="0"/>
-              <a:t>4/18/2016</a:t>
+              <a:t>4/21/2016</a:t>
             </a:fld>
             <a:endParaRPr lang="en-US"/>
           </a:p>
@@ -3814,7 +3829,7 @@
           <a:p>
             <a:fld id="{3EAEFB75-4DE4-4DFC-B956-52D01254B927}" type="datetimeFigureOut">
               <a:rPr lang="en-US" smtClean="0"/>
-              <a:t>4/18/2016</a:t>
+              <a:t>4/21/2016</a:t>
             </a:fld>
             <a:endParaRPr lang="en-US"/>
           </a:p>
@@ -4078,7 +4093,7 @@
           <a:p>
             <a:fld id="{3EAEFB75-4DE4-4DFC-B956-52D01254B927}" type="datetimeFigureOut">
               <a:rPr lang="en-US" smtClean="0"/>
-              <a:t>4/18/2016</a:t>
+              <a:t>4/21/2016</a:t>
             </a:fld>
             <a:endParaRPr lang="en-US"/>
           </a:p>
@@ -4439,7 +4454,7 @@
           <a:p>
             <a:fld id="{3EAEFB75-4DE4-4DFC-B956-52D01254B927}" type="datetimeFigureOut">
               <a:rPr lang="en-US" smtClean="0"/>
-              <a:t>4/18/2016</a:t>
+              <a:t>4/21/2016</a:t>
             </a:fld>
             <a:endParaRPr lang="en-US"/>
           </a:p>
@@ -4665,7 +4680,7 @@
           <a:p>
             <a:fld id="{3EAEFB75-4DE4-4DFC-B956-52D01254B927}" type="datetimeFigureOut">
               <a:rPr lang="en-US" smtClean="0"/>
-              <a:t>4/18/2016</a:t>
+              <a:t>4/21/2016</a:t>
             </a:fld>
             <a:endParaRPr lang="en-US"/>
           </a:p>
@@ -4755,7 +4770,7 @@
           <a:p>
             <a:fld id="{3EAEFB75-4DE4-4DFC-B956-52D01254B927}" type="datetimeFigureOut">
               <a:rPr lang="en-US" smtClean="0"/>
-              <a:t>4/18/2016</a:t>
+              <a:t>4/21/2016</a:t>
             </a:fld>
             <a:endParaRPr lang="en-US"/>
           </a:p>
@@ -5021,7 +5036,7 @@
           <a:p>
             <a:fld id="{3EAEFB75-4DE4-4DFC-B956-52D01254B927}" type="datetimeFigureOut">
               <a:rPr lang="en-US" smtClean="0"/>
-              <a:t>4/18/2016</a:t>
+              <a:t>4/21/2016</a:t>
             </a:fld>
             <a:endParaRPr lang="en-US"/>
           </a:p>
@@ -5248,7 +5263,7 @@
           <a:p>
             <a:fld id="{3EAEFB75-4DE4-4DFC-B956-52D01254B927}" type="datetimeFigureOut">
               <a:rPr lang="en-US" smtClean="0"/>
-              <a:t>4/18/2016</a:t>
+              <a:t>4/21/2016</a:t>
             </a:fld>
             <a:endParaRPr lang="en-US"/>
           </a:p>
@@ -5745,7 +5760,7 @@
           <a:p>
             <a:fld id="{3EAEFB75-4DE4-4DFC-B956-52D01254B927}" type="datetimeFigureOut">
               <a:rPr lang="en-US" smtClean="0"/>
-              <a:t>4/18/2016</a:t>
+              <a:t>4/21/2016</a:t>
             </a:fld>
             <a:endParaRPr lang="en-US"/>
           </a:p>
@@ -6191,6 +6206,10 @@
               </a:rPr>
               <a:t>aburgos3@gatech.edu</a:t>
             </a:r>
+            <a:r>
+              <a:rPr lang="en-US" dirty="0"/>
+              <a:t/>
+            </a:r>
             <a:br>
               <a:rPr lang="en-US" dirty="0"/>
             </a:br>
@@ -6204,6 +6223,10 @@
               </a:rPr>
               <a:t>spiroganas@gmail.com</a:t>
             </a:r>
+            <a:r>
+              <a:rPr lang="en-US" dirty="0"/>
+              <a:t/>
+            </a:r>
             <a:br>
               <a:rPr lang="en-US" dirty="0"/>
             </a:br>
@@ -6217,6 +6240,10 @@
               </a:rPr>
               <a:t>anjag1993@gmail.com</a:t>
             </a:r>
+            <a:r>
+              <a:rPr lang="en-US" dirty="0"/>
+              <a:t/>
+            </a:r>
             <a:br>
               <a:rPr lang="en-US" dirty="0"/>
             </a:br>
@@ -6238,6 +6265,10 @@
               </a:rPr>
               <a:t>jrichgels3@gatech.edu</a:t>
             </a:r>
+            <a:r>
+              <a:rPr lang="en-US" dirty="0"/>
+              <a:t/>
+            </a:r>
             <a:br>
               <a:rPr lang="en-US" dirty="0"/>
             </a:br>
@@ -6258,6 +6289,10 @@
                 <a:hlinkClick r:id="rId9"/>
               </a:rPr>
               <a:t>dstoneburner3@gatech.edu</a:t>
+            </a:r>
+            <a:r>
+              <a:rPr lang="en-US" dirty="0"/>
+              <a:t/>
             </a:r>
             <a:br>
               <a:rPr lang="en-US" dirty="0"/>
@@ -7478,6 +7513,36 @@
           </a:p>
         </p:txBody>
       </p:sp>
+      <p:pic>
+        <p:nvPicPr>
+          <p:cNvPr id="2" name="Picture 1"/>
+          <p:cNvPicPr>
+            <a:picLocks noChangeAspect="1"/>
+          </p:cNvPicPr>
+          <p:nvPr/>
+        </p:nvPicPr>
+        <p:blipFill>
+          <a:blip r:embed="rId3">
+            <a:extLst>
+              <a:ext uri="{28A0092B-C50C-407E-A947-70E740481C1C}">
+                <a14:useLocalDpi xmlns:a14="http://schemas.microsoft.com/office/drawing/2010/main" val="0"/>
+              </a:ext>
+            </a:extLst>
+          </a:blip>
+          <a:stretch>
+            <a:fillRect/>
+          </a:stretch>
+        </p:blipFill>
+        <p:spPr>
+          <a:xfrm>
+            <a:off x="1101939" y="800100"/>
+            <a:ext cx="6711522" cy="4741765"/>
+          </a:xfrm>
+          <a:prstGeom prst="rect">
+            <a:avLst/>
+          </a:prstGeom>
+        </p:spPr>
+      </p:pic>
     </p:spTree>
     <p:extLst>
       <p:ext uri="{BB962C8B-B14F-4D97-AF65-F5344CB8AC3E}">

</xml_diff>

<commit_message>
Added Slide for Candidate Risk Score Meter
</commit_message>
<xml_diff>
--- a/Team Deliverable 4/Final Presentation - FHIRed Up.pptx
+++ b/Team Deliverable 4/Final Presentation - FHIRed Up.pptx
@@ -1645,11 +1645,11 @@
           <c:showPercent val="0"/>
           <c:showBubbleSize val="0"/>
         </c:dLbls>
-        <c:axId val="-1186406976"/>
-        <c:axId val="-1186411328"/>
+        <c:axId val="1813779888"/>
+        <c:axId val="1813768464"/>
       </c:scatterChart>
       <c:valAx>
-        <c:axId val="-1186406976"/>
+        <c:axId val="1813779888"/>
         <c:scaling>
           <c:orientation val="minMax"/>
         </c:scaling>
@@ -1672,12 +1672,12 @@
             <a:endParaRPr lang="en-US"/>
           </a:p>
         </c:txPr>
-        <c:crossAx val="-1186411328"/>
+        <c:crossAx val="1813768464"/>
         <c:crosses val="autoZero"/>
         <c:crossBetween val="midCat"/>
       </c:valAx>
       <c:valAx>
-        <c:axId val="-1186411328"/>
+        <c:axId val="1813768464"/>
         <c:scaling>
           <c:orientation val="minMax"/>
         </c:scaling>
@@ -1694,7 +1694,7 @@
         <c:majorTickMark val="out"/>
         <c:minorTickMark val="none"/>
         <c:tickLblPos val="nextTo"/>
-        <c:crossAx val="-1186406976"/>
+        <c:crossAx val="1813779888"/>
         <c:crosses val="autoZero"/>
         <c:crossBetween val="midCat"/>
       </c:valAx>
@@ -1807,7 +1807,7 @@
           <a:p>
             <a:fld id="{82AF1EC4-0AE9-4ABA-827F-84879B727577}" type="datetimeFigureOut">
               <a:rPr lang="en-US" smtClean="0"/>
-              <a:t>4/21/2016</a:t>
+              <a:t>4/25/2016</a:t>
             </a:fld>
             <a:endParaRPr lang="en-US"/>
           </a:p>
@@ -2510,6 +2510,246 @@
           <a:bodyPr/>
           <a:lstStyle/>
           <a:p>
+            <a:pPr marL="0" marR="0" indent="0" algn="l" defTabSz="914400" rtl="0" eaLnBrk="1" fontAlgn="auto" latinLnBrk="0" hangingPunct="1">
+              <a:lnSpc>
+                <a:spcPct val="100000"/>
+              </a:lnSpc>
+              <a:spcBef>
+                <a:spcPts val="0"/>
+              </a:spcBef>
+              <a:spcAft>
+                <a:spcPts val="0"/>
+              </a:spcAft>
+              <a:buClrTx/>
+              <a:buSzTx/>
+              <a:buFontTx/>
+              <a:buNone/>
+              <a:tabLst/>
+              <a:defRPr/>
+            </a:pPr>
+            <a:r>
+              <a:rPr lang="en-US" sz="1200" kern="1200" dirty="0" smtClean="0">
+                <a:solidFill>
+                  <a:schemeClr val="tx1"/>
+                </a:solidFill>
+                <a:effectLst/>
+                <a:latin typeface="+mn-lt"/>
+                <a:ea typeface="+mn-ea"/>
+                <a:cs typeface="+mn-cs"/>
+              </a:rPr>
+              <a:t>The candidate risk score meter (or gauge) indicates the severity of the patient’s candidate risk score relative to their current risk score.  It is used to quickly identify if a patient’s candidate HCCs would make a significant impact to their current risk score if they were added to the patient.</a:t>
+            </a:r>
+          </a:p>
+          <a:p>
+            <a:pPr marL="0" marR="0" indent="0" algn="l" defTabSz="914400" rtl="0" eaLnBrk="1" fontAlgn="auto" latinLnBrk="0" hangingPunct="1">
+              <a:lnSpc>
+                <a:spcPct val="100000"/>
+              </a:lnSpc>
+              <a:spcBef>
+                <a:spcPts val="0"/>
+              </a:spcBef>
+              <a:spcAft>
+                <a:spcPts val="0"/>
+              </a:spcAft>
+              <a:buClrTx/>
+              <a:buSzTx/>
+              <a:buFontTx/>
+              <a:buNone/>
+              <a:tabLst/>
+              <a:defRPr/>
+            </a:pPr>
+            <a:endParaRPr lang="en-US" sz="1200" i="1" kern="1200" dirty="0" smtClean="0">
+              <a:solidFill>
+                <a:schemeClr val="tx1"/>
+              </a:solidFill>
+              <a:effectLst/>
+              <a:latin typeface="+mn-lt"/>
+              <a:ea typeface="+mn-ea"/>
+              <a:cs typeface="+mn-cs"/>
+            </a:endParaRPr>
+          </a:p>
+          <a:p>
+            <a:pPr marL="0" marR="0" indent="0" algn="l" defTabSz="914400" rtl="0" eaLnBrk="1" fontAlgn="auto" latinLnBrk="0" hangingPunct="1">
+              <a:lnSpc>
+                <a:spcPct val="100000"/>
+              </a:lnSpc>
+              <a:spcBef>
+                <a:spcPts val="0"/>
+              </a:spcBef>
+              <a:spcAft>
+                <a:spcPts val="0"/>
+              </a:spcAft>
+              <a:buClrTx/>
+              <a:buSzTx/>
+              <a:buFontTx/>
+              <a:buNone/>
+              <a:tabLst/>
+              <a:defRPr/>
+            </a:pPr>
+            <a:r>
+              <a:rPr lang="en-US" sz="1200" i="1" kern="1200" dirty="0" smtClean="0">
+                <a:solidFill>
+                  <a:schemeClr val="tx1"/>
+                </a:solidFill>
+                <a:effectLst/>
+                <a:latin typeface="+mn-lt"/>
+                <a:ea typeface="+mn-ea"/>
+                <a:cs typeface="+mn-cs"/>
+              </a:rPr>
+              <a:t>Example:</a:t>
+            </a:r>
+          </a:p>
+          <a:p>
+            <a:r>
+              <a:rPr lang="en-US" sz="1200" kern="1200" dirty="0" smtClean="0">
+                <a:solidFill>
+                  <a:schemeClr val="tx1"/>
+                </a:solidFill>
+                <a:effectLst/>
+                <a:latin typeface="+mn-lt"/>
+                <a:ea typeface="+mn-ea"/>
+                <a:cs typeface="+mn-cs"/>
+              </a:rPr>
+              <a:t>If a patient has a Current Risk Score of 0.723 and the sum of their Candidate Risk Scores is 1.687, the candidate risk score meter would register 70, indicating the patient’s current risk score is 70% less then what it would be </a:t>
+            </a:r>
+            <a:r>
+              <a:rPr lang="en-US" sz="1200" kern="1200" smtClean="0">
+                <a:solidFill>
+                  <a:schemeClr val="tx1"/>
+                </a:solidFill>
+                <a:effectLst/>
+                <a:latin typeface="+mn-lt"/>
+                <a:ea typeface="+mn-ea"/>
+                <a:cs typeface="+mn-cs"/>
+              </a:rPr>
+              <a:t>if the candidate </a:t>
+            </a:r>
+            <a:r>
+              <a:rPr lang="en-US" sz="1200" kern="1200" dirty="0" smtClean="0">
+                <a:solidFill>
+                  <a:schemeClr val="tx1"/>
+                </a:solidFill>
+                <a:effectLst/>
+                <a:latin typeface="+mn-lt"/>
+                <a:ea typeface="+mn-ea"/>
+                <a:cs typeface="+mn-cs"/>
+              </a:rPr>
+              <a:t>HCCs where included.</a:t>
+            </a:r>
+          </a:p>
+          <a:p>
+            <a:pPr marL="0" marR="0" indent="0" algn="l" defTabSz="914400" rtl="0" eaLnBrk="1" fontAlgn="auto" latinLnBrk="0" hangingPunct="1">
+              <a:lnSpc>
+                <a:spcPct val="100000"/>
+              </a:lnSpc>
+              <a:spcBef>
+                <a:spcPts val="0"/>
+              </a:spcBef>
+              <a:spcAft>
+                <a:spcPts val="0"/>
+              </a:spcAft>
+              <a:buClrTx/>
+              <a:buSzTx/>
+              <a:buFontTx/>
+              <a:buNone/>
+              <a:tabLst/>
+              <a:defRPr/>
+            </a:pPr>
+            <a:endParaRPr lang="en-US" sz="1200" kern="1200" dirty="0" smtClean="0">
+              <a:solidFill>
+                <a:schemeClr val="tx1"/>
+              </a:solidFill>
+              <a:effectLst/>
+              <a:latin typeface="+mn-lt"/>
+              <a:ea typeface="+mn-ea"/>
+              <a:cs typeface="+mn-cs"/>
+            </a:endParaRPr>
+          </a:p>
+          <a:p>
+            <a:endParaRPr lang="en-US" dirty="0"/>
+          </a:p>
+        </p:txBody>
+      </p:sp>
+      <p:sp>
+        <p:nvSpPr>
+          <p:cNvPr id="4" name="Slide Number Placeholder 3"/>
+          <p:cNvSpPr>
+            <a:spLocks noGrp="1"/>
+          </p:cNvSpPr>
+          <p:nvPr>
+            <p:ph type="sldNum" sz="quarter" idx="10"/>
+          </p:nvPr>
+        </p:nvSpPr>
+        <p:spPr/>
+        <p:txBody>
+          <a:bodyPr/>
+          <a:lstStyle/>
+          <a:p>
+            <a:fld id="{64DBF1C4-A8A4-46A4-960B-68980B6D50C1}" type="slidenum">
+              <a:rPr lang="en-US" smtClean="0"/>
+              <a:t>9</a:t>
+            </a:fld>
+            <a:endParaRPr lang="en-US"/>
+          </a:p>
+        </p:txBody>
+      </p:sp>
+    </p:spTree>
+    <p:extLst>
+      <p:ext uri="{BB962C8B-B14F-4D97-AF65-F5344CB8AC3E}">
+        <p14:creationId xmlns:p14="http://schemas.microsoft.com/office/powerpoint/2010/main" val="563307807"/>
+      </p:ext>
+    </p:extLst>
+  </p:cSld>
+  <p:clrMapOvr>
+    <a:masterClrMapping/>
+  </p:clrMapOvr>
+</p:notes>
+</file>
+
+<file path=ppt/notesSlides/notesSlide6.xml><?xml version="1.0" encoding="utf-8"?>
+<p:notes xmlns:a="http://schemas.openxmlformats.org/drawingml/2006/main" xmlns:r="http://schemas.openxmlformats.org/officeDocument/2006/relationships" xmlns:p="http://schemas.openxmlformats.org/presentationml/2006/main">
+  <p:cSld>
+    <p:spTree>
+      <p:nvGrpSpPr>
+        <p:cNvPr id="1" name=""/>
+        <p:cNvGrpSpPr/>
+        <p:nvPr/>
+      </p:nvGrpSpPr>
+      <p:grpSpPr>
+        <a:xfrm>
+          <a:off x="0" y="0"/>
+          <a:ext cx="0" cy="0"/>
+          <a:chOff x="0" y="0"/>
+          <a:chExt cx="0" cy="0"/>
+        </a:xfrm>
+      </p:grpSpPr>
+      <p:sp>
+        <p:nvSpPr>
+          <p:cNvPr id="2" name="Slide Image Placeholder 1"/>
+          <p:cNvSpPr>
+            <a:spLocks noGrp="1" noRot="1" noChangeAspect="1"/>
+          </p:cNvSpPr>
+          <p:nvPr>
+            <p:ph type="sldImg"/>
+          </p:nvPr>
+        </p:nvSpPr>
+        <p:spPr/>
+      </p:sp>
+      <p:sp>
+        <p:nvSpPr>
+          <p:cNvPr id="3" name="Notes Placeholder 2"/>
+          <p:cNvSpPr>
+            <a:spLocks noGrp="1"/>
+          </p:cNvSpPr>
+          <p:nvPr>
+            <p:ph type="body" idx="1"/>
+          </p:nvPr>
+        </p:nvSpPr>
+        <p:spPr/>
+        <p:txBody>
+          <a:bodyPr/>
+          <a:lstStyle/>
+          <a:p>
             <a:endParaRPr lang="en-US" dirty="0"/>
           </a:p>
         </p:txBody>
@@ -2550,7 +2790,7 @@
 </p:notes>
 </file>
 
-<file path=ppt/notesSlides/notesSlide6.xml><?xml version="1.0" encoding="utf-8"?>
+<file path=ppt/notesSlides/notesSlide7.xml><?xml version="1.0" encoding="utf-8"?>
 <p:notes xmlns:a="http://schemas.openxmlformats.org/drawingml/2006/main" xmlns:r="http://schemas.openxmlformats.org/officeDocument/2006/relationships" xmlns:p="http://schemas.openxmlformats.org/presentationml/2006/main">
   <p:cSld>
     <p:spTree>
@@ -2835,7 +3075,7 @@
           <a:p>
             <a:fld id="{3EAEFB75-4DE4-4DFC-B956-52D01254B927}" type="datetimeFigureOut">
               <a:rPr lang="en-US" smtClean="0"/>
-              <a:t>4/21/2016</a:t>
+              <a:t>4/25/2016</a:t>
             </a:fld>
             <a:endParaRPr lang="en-US"/>
           </a:p>
@@ -3186,7 +3426,7 @@
           <a:p>
             <a:fld id="{3EAEFB75-4DE4-4DFC-B956-52D01254B927}" type="datetimeFigureOut">
               <a:rPr lang="en-US" smtClean="0"/>
-              <a:t>4/21/2016</a:t>
+              <a:t>4/25/2016</a:t>
             </a:fld>
             <a:endParaRPr lang="en-US"/>
           </a:p>
@@ -3360,7 +3600,7 @@
           <a:p>
             <a:fld id="{3EAEFB75-4DE4-4DFC-B956-52D01254B927}" type="datetimeFigureOut">
               <a:rPr lang="en-US" smtClean="0"/>
-              <a:t>4/21/2016</a:t>
+              <a:t>4/25/2016</a:t>
             </a:fld>
             <a:endParaRPr lang="en-US"/>
           </a:p>
@@ -3472,7 +3712,7 @@
           <a:p>
             <a:fld id="{3EAEFB75-4DE4-4DFC-B956-52D01254B927}" type="datetimeFigureOut">
               <a:rPr lang="en-US" smtClean="0"/>
-              <a:t>4/21/2016</a:t>
+              <a:t>4/25/2016</a:t>
             </a:fld>
             <a:endParaRPr lang="en-US"/>
           </a:p>
@@ -3829,7 +4069,7 @@
           <a:p>
             <a:fld id="{3EAEFB75-4DE4-4DFC-B956-52D01254B927}" type="datetimeFigureOut">
               <a:rPr lang="en-US" smtClean="0"/>
-              <a:t>4/21/2016</a:t>
+              <a:t>4/25/2016</a:t>
             </a:fld>
             <a:endParaRPr lang="en-US"/>
           </a:p>
@@ -4093,7 +4333,7 @@
           <a:p>
             <a:fld id="{3EAEFB75-4DE4-4DFC-B956-52D01254B927}" type="datetimeFigureOut">
               <a:rPr lang="en-US" smtClean="0"/>
-              <a:t>4/21/2016</a:t>
+              <a:t>4/25/2016</a:t>
             </a:fld>
             <a:endParaRPr lang="en-US"/>
           </a:p>
@@ -4454,7 +4694,7 @@
           <a:p>
             <a:fld id="{3EAEFB75-4DE4-4DFC-B956-52D01254B927}" type="datetimeFigureOut">
               <a:rPr lang="en-US" smtClean="0"/>
-              <a:t>4/21/2016</a:t>
+              <a:t>4/25/2016</a:t>
             </a:fld>
             <a:endParaRPr lang="en-US"/>
           </a:p>
@@ -4680,7 +4920,7 @@
           <a:p>
             <a:fld id="{3EAEFB75-4DE4-4DFC-B956-52D01254B927}" type="datetimeFigureOut">
               <a:rPr lang="en-US" smtClean="0"/>
-              <a:t>4/21/2016</a:t>
+              <a:t>4/25/2016</a:t>
             </a:fld>
             <a:endParaRPr lang="en-US"/>
           </a:p>
@@ -4770,7 +5010,7 @@
           <a:p>
             <a:fld id="{3EAEFB75-4DE4-4DFC-B956-52D01254B927}" type="datetimeFigureOut">
               <a:rPr lang="en-US" smtClean="0"/>
-              <a:t>4/21/2016</a:t>
+              <a:t>4/25/2016</a:t>
             </a:fld>
             <a:endParaRPr lang="en-US"/>
           </a:p>
@@ -5036,7 +5276,7 @@
           <a:p>
             <a:fld id="{3EAEFB75-4DE4-4DFC-B956-52D01254B927}" type="datetimeFigureOut">
               <a:rPr lang="en-US" smtClean="0"/>
-              <a:t>4/21/2016</a:t>
+              <a:t>4/25/2016</a:t>
             </a:fld>
             <a:endParaRPr lang="en-US"/>
           </a:p>
@@ -5263,7 +5503,7 @@
           <a:p>
             <a:fld id="{3EAEFB75-4DE4-4DFC-B956-52D01254B927}" type="datetimeFigureOut">
               <a:rPr lang="en-US" smtClean="0"/>
-              <a:t>4/21/2016</a:t>
+              <a:t>4/25/2016</a:t>
             </a:fld>
             <a:endParaRPr lang="en-US"/>
           </a:p>
@@ -5760,7 +6000,7 @@
           <a:p>
             <a:fld id="{3EAEFB75-4DE4-4DFC-B956-52D01254B927}" type="datetimeFigureOut">
               <a:rPr lang="en-US" smtClean="0"/>
-              <a:t>4/21/2016</a:t>
+              <a:t>4/25/2016</a:t>
             </a:fld>
             <a:endParaRPr lang="en-US"/>
           </a:p>
@@ -6588,6 +6828,13 @@
       <p:transition spd="slow" advTm="21610"/>
     </mc:Fallback>
   </mc:AlternateContent>
+  <p:timing>
+    <p:tnLst>
+      <p:par>
+        <p:cTn id="1" dur="indefinite" restart="never" nodeType="tmRoot"/>
+      </p:par>
+    </p:tnLst>
+  </p:timing>
   <p:extLst mod="1">
     <p:ext uri="{E180D4A7-C9FB-4DFB-919C-405C955672EB}">
       <p14:showEvtLst xmlns:p14="http://schemas.microsoft.com/office/powerpoint/2010/main">
@@ -7807,29 +8054,512 @@
           <a:bodyPr/>
           <a:lstStyle/>
           <a:p>
-            <a:endParaRPr lang="en-US"/>
-          </a:p>
-        </p:txBody>
-      </p:sp>
-      <p:sp>
-        <p:nvSpPr>
-          <p:cNvPr id="3" name="Content Placeholder 2"/>
-          <p:cNvSpPr>
-            <a:spLocks noGrp="1"/>
-          </p:cNvSpPr>
-          <p:nvPr>
-            <p:ph sz="quarter" idx="1"/>
-          </p:nvPr>
-        </p:nvSpPr>
-        <p:spPr/>
-        <p:txBody>
-          <a:bodyPr/>
-          <a:lstStyle/>
-          <a:p>
-            <a:endParaRPr lang="en-US"/>
-          </a:p>
-        </p:txBody>
-      </p:sp>
+            <a:r>
+              <a:rPr lang="en-US" dirty="0" smtClean="0"/>
+              <a:t>Candidate Risk Score Meter</a:t>
+            </a:r>
+            <a:endParaRPr lang="en-US" dirty="0"/>
+          </a:p>
+        </p:txBody>
+      </p:sp>
+      <mc:AlternateContent xmlns:mc="http://schemas.openxmlformats.org/markup-compatibility/2006">
+        <mc:Choice xmlns:a14="http://schemas.microsoft.com/office/drawing/2010/main" Requires="a14">
+          <p:sp>
+            <p:nvSpPr>
+              <p:cNvPr id="3" name="Content Placeholder 2"/>
+              <p:cNvSpPr>
+                <a:spLocks noGrp="1"/>
+              </p:cNvSpPr>
+              <p:nvPr>
+                <p:ph sz="quarter" idx="1"/>
+              </p:nvPr>
+            </p:nvSpPr>
+            <p:spPr>
+              <a:xfrm>
+                <a:off x="914400" y="1206500"/>
+                <a:ext cx="7772400" cy="4013200"/>
+              </a:xfrm>
+            </p:spPr>
+            <p:txBody>
+              <a:bodyPr>
+                <a:normAutofit/>
+              </a:bodyPr>
+              <a:lstStyle/>
+              <a:p>
+                <a:pPr marL="0" indent="0">
+                  <a:buNone/>
+                </a:pPr>
+                <a:endParaRPr lang="en-US" sz="1800" b="1" dirty="0" smtClean="0"/>
+              </a:p>
+              <a:p>
+                <a:pPr marL="0" indent="0">
+                  <a:buNone/>
+                </a:pPr>
+                <a:r>
+                  <a:rPr lang="en-US" sz="1800" b="1" dirty="0" smtClean="0"/>
+                  <a:t>Formula:</a:t>
+                </a:r>
+                <a:endParaRPr lang="en-US" sz="1800" b="1" dirty="0"/>
+              </a:p>
+              <a:p>
+                <a:pPr marL="0" indent="0">
+                  <a:buNone/>
+                </a:pPr>
+                <a14:m>
+                  <m:oMathPara xmlns:m="http://schemas.openxmlformats.org/officeDocument/2006/math">
+                    <m:oMathParaPr>
+                      <m:jc m:val="centerGroup"/>
+                    </m:oMathParaPr>
+                    <m:oMath xmlns:m="http://schemas.openxmlformats.org/officeDocument/2006/math">
+                      <m:r>
+                        <a:rPr lang="en-US" sz="1200" i="1"/>
+                        <m:t>𝑥</m:t>
+                      </m:r>
+                      <m:r>
+                        <a:rPr lang="en-US" sz="1200" i="1"/>
+                        <m:t>% </m:t>
+                      </m:r>
+                      <m:r>
+                        <a:rPr lang="en-US" sz="1200"/>
+                        <m:t>=</m:t>
+                      </m:r>
+                      <m:d>
+                        <m:dPr>
+                          <m:ctrlPr>
+                            <a:rPr lang="en-US" sz="1200" i="1"/>
+                          </m:ctrlPr>
+                        </m:dPr>
+                        <m:e>
+                          <m:r>
+                            <a:rPr lang="en-US" sz="1200"/>
+                            <m:t>1</m:t>
+                          </m:r>
+                          <m:r>
+                            <a:rPr lang="en-US" sz="1200" i="1"/>
+                            <m:t>−</m:t>
+                          </m:r>
+                          <m:f>
+                            <m:fPr>
+                              <m:ctrlPr>
+                                <a:rPr lang="en-US" sz="1200" i="1"/>
+                              </m:ctrlPr>
+                            </m:fPr>
+                            <m:num>
+                              <m:r>
+                                <m:rPr>
+                                  <m:sty m:val="p"/>
+                                </m:rPr>
+                                <a:rPr lang="en-US" sz="1200"/>
+                                <m:t>Current</m:t>
+                              </m:r>
+                              <m:r>
+                                <a:rPr lang="en-US" sz="1200"/>
+                                <m:t> </m:t>
+                              </m:r>
+                              <m:r>
+                                <m:rPr>
+                                  <m:sty m:val="p"/>
+                                </m:rPr>
+                                <a:rPr lang="en-US" sz="1200"/>
+                                <m:t>Risk</m:t>
+                              </m:r>
+                              <m:r>
+                                <a:rPr lang="en-US" sz="1200"/>
+                                <m:t> </m:t>
+                              </m:r>
+                              <m:r>
+                                <m:rPr>
+                                  <m:sty m:val="p"/>
+                                </m:rPr>
+                                <a:rPr lang="en-US" sz="1200"/>
+                                <m:t>Score</m:t>
+                              </m:r>
+                            </m:num>
+                            <m:den>
+                              <m:r>
+                                <m:rPr>
+                                  <m:sty m:val="p"/>
+                                </m:rPr>
+                                <a:rPr lang="en-US" sz="1200"/>
+                                <m:t>Sum</m:t>
+                              </m:r>
+                              <m:r>
+                                <a:rPr lang="en-US" sz="1200"/>
+                                <m:t> </m:t>
+                              </m:r>
+                              <m:d>
+                                <m:dPr>
+                                  <m:ctrlPr>
+                                    <a:rPr lang="en-US" sz="1200" i="1"/>
+                                  </m:ctrlPr>
+                                </m:dPr>
+                                <m:e>
+                                  <m:r>
+                                    <m:rPr>
+                                      <m:sty m:val="p"/>
+                                    </m:rPr>
+                                    <a:rPr lang="en-US" sz="1200"/>
+                                    <m:t>Candidate</m:t>
+                                  </m:r>
+                                  <m:r>
+                                    <a:rPr lang="en-US" sz="1200"/>
+                                    <m:t> </m:t>
+                                  </m:r>
+                                  <m:r>
+                                    <m:rPr>
+                                      <m:sty m:val="p"/>
+                                    </m:rPr>
+                                    <a:rPr lang="en-US" sz="1200"/>
+                                    <m:t>HCC</m:t>
+                                  </m:r>
+                                  <m:r>
+                                    <a:rPr lang="en-US" sz="1200"/>
+                                    <m:t> </m:t>
+                                  </m:r>
+                                  <m:r>
+                                    <m:rPr>
+                                      <m:sty m:val="p"/>
+                                    </m:rPr>
+                                    <a:rPr lang="en-US" sz="1200"/>
+                                    <m:t>Risk</m:t>
+                                  </m:r>
+                                  <m:r>
+                                    <a:rPr lang="en-US" sz="1200"/>
+                                    <m:t> </m:t>
+                                  </m:r>
+                                  <m:r>
+                                    <m:rPr>
+                                      <m:sty m:val="p"/>
+                                    </m:rPr>
+                                    <a:rPr lang="en-US" sz="1200"/>
+                                    <m:t>Scores</m:t>
+                                  </m:r>
+                                </m:e>
+                              </m:d>
+                              <m:r>
+                                <a:rPr lang="en-US" sz="1200" i="1"/>
+                                <m:t>+</m:t>
+                              </m:r>
+                              <m:r>
+                                <m:rPr>
+                                  <m:sty m:val="p"/>
+                                </m:rPr>
+                                <a:rPr lang="en-US" sz="1200"/>
+                                <m:t>Current</m:t>
+                              </m:r>
+                              <m:r>
+                                <a:rPr lang="en-US" sz="1200"/>
+                                <m:t> </m:t>
+                              </m:r>
+                              <m:r>
+                                <m:rPr>
+                                  <m:sty m:val="p"/>
+                                </m:rPr>
+                                <a:rPr lang="en-US" sz="1200"/>
+                                <m:t>Risk</m:t>
+                              </m:r>
+                              <m:r>
+                                <a:rPr lang="en-US" sz="1200"/>
+                                <m:t> </m:t>
+                              </m:r>
+                              <m:r>
+                                <m:rPr>
+                                  <m:sty m:val="p"/>
+                                </m:rPr>
+                                <a:rPr lang="en-US" sz="1200"/>
+                                <m:t>Score</m:t>
+                              </m:r>
+                            </m:den>
+                          </m:f>
+                        </m:e>
+                      </m:d>
+                      <m:r>
+                        <a:rPr lang="en-US" sz="1200" i="1"/>
+                        <m:t>∗100%</m:t>
+                      </m:r>
+                    </m:oMath>
+                  </m:oMathPara>
+                </a14:m>
+                <a:endParaRPr lang="en-US" sz="1200" dirty="0" smtClean="0"/>
+              </a:p>
+              <a:p>
+                <a:pPr marL="0" indent="0">
+                  <a:buNone/>
+                </a:pPr>
+                <a:endParaRPr lang="en-US" sz="1800" b="1" i="1" dirty="0" smtClean="0"/>
+              </a:p>
+              <a:p>
+                <a:pPr marL="0" indent="0">
+                  <a:buNone/>
+                </a:pPr>
+                <a:r>
+                  <a:rPr lang="en-US" sz="1800" b="1" i="1" dirty="0" smtClean="0"/>
+                  <a:t>Example</a:t>
+                </a:r>
+                <a:r>
+                  <a:rPr lang="en-US" sz="1800" b="1" i="1" dirty="0"/>
+                  <a:t>:</a:t>
+                </a:r>
+                <a:r>
+                  <a:rPr lang="en-US" sz="1800" b="1" dirty="0"/>
+                  <a:t> </a:t>
+                </a:r>
+              </a:p>
+              <a:p>
+                <a:r>
+                  <a:rPr lang="en-US" sz="1600" dirty="0" smtClean="0"/>
+                  <a:t>Given:</a:t>
+                </a:r>
+              </a:p>
+              <a:p>
+                <a:pPr lvl="1"/>
+                <a:r>
+                  <a:rPr lang="en-US" sz="1600" dirty="0" smtClean="0"/>
+                  <a:t>Current </a:t>
+                </a:r>
+                <a:r>
+                  <a:rPr lang="en-US" sz="1600" dirty="0"/>
+                  <a:t>Risk </a:t>
+                </a:r>
+                <a:r>
+                  <a:rPr lang="en-US" sz="1600" dirty="0" smtClean="0"/>
+                  <a:t>Score: </a:t>
+                </a:r>
+                <a:r>
+                  <a:rPr lang="en-US" sz="1600" dirty="0" smtClean="0">
+                    <a:solidFill>
+                      <a:srgbClr val="008000"/>
+                    </a:solidFill>
+                  </a:rPr>
+                  <a:t>0.723</a:t>
+                </a:r>
+                <a:r>
+                  <a:rPr lang="en-US" sz="1600" dirty="0" smtClean="0"/>
+                  <a:t> </a:t>
+                </a:r>
+              </a:p>
+              <a:p>
+                <a:pPr lvl="1"/>
+                <a:r>
+                  <a:rPr lang="en-US" sz="1600" dirty="0" smtClean="0"/>
+                  <a:t>Sum of Candidate </a:t>
+                </a:r>
+                <a:r>
+                  <a:rPr lang="en-US" sz="1600" dirty="0"/>
+                  <a:t>Risk </a:t>
+                </a:r>
+                <a:r>
+                  <a:rPr lang="en-US" sz="1600" dirty="0" smtClean="0"/>
+                  <a:t>Scores:</a:t>
+                </a:r>
+                <a:r>
+                  <a:rPr lang="en-US" sz="1600" dirty="0" smtClean="0">
+                    <a:solidFill>
+                      <a:srgbClr val="002060"/>
+                    </a:solidFill>
+                  </a:rPr>
+                  <a:t>1.687</a:t>
+                </a:r>
+              </a:p>
+              <a:p>
+                <a:r>
+                  <a:rPr lang="en-US" sz="1600" dirty="0" smtClean="0"/>
+                  <a:t>Results:</a:t>
+                </a:r>
+              </a:p>
+              <a:p>
+                <a:pPr lvl="1"/>
+                <a:r>
+                  <a:rPr lang="en-US" sz="1600" dirty="0"/>
+                  <a:t>Risk Score </a:t>
+                </a:r>
+                <a:r>
+                  <a:rPr lang="en-US" sz="1600" dirty="0" smtClean="0"/>
+                  <a:t>Meter: </a:t>
+                </a:r>
+                <a:r>
+                  <a:rPr lang="en-US" sz="1600" dirty="0" smtClean="0">
+                    <a:solidFill>
+                      <a:schemeClr val="accent2">
+                        <a:lumMod val="75000"/>
+                      </a:schemeClr>
+                    </a:solidFill>
+                  </a:rPr>
+                  <a:t>70</a:t>
+                </a:r>
+                <a:br>
+                  <a:rPr lang="en-US" sz="1600" dirty="0" smtClean="0">
+                    <a:solidFill>
+                      <a:schemeClr val="accent2">
+                        <a:lumMod val="75000"/>
+                      </a:schemeClr>
+                    </a:solidFill>
+                  </a:rPr>
+                </a:br>
+                <a:endParaRPr lang="en-US" sz="1200" dirty="0"/>
+              </a:p>
+              <a:p>
+                <a:pPr marL="0" indent="0">
+                  <a:buNone/>
+                </a:pPr>
+                <a14:m>
+                  <m:oMathPara xmlns:m="http://schemas.openxmlformats.org/officeDocument/2006/math">
+                    <m:oMathParaPr>
+                      <m:jc m:val="centerGroup"/>
+                    </m:oMathParaPr>
+                    <m:oMath xmlns:m="http://schemas.openxmlformats.org/officeDocument/2006/math">
+                      <m:r>
+                        <a:rPr lang="en-US" sz="1200" i="1" smtClean="0">
+                          <a:solidFill>
+                            <a:schemeClr val="accent2">
+                              <a:lumMod val="75000"/>
+                            </a:schemeClr>
+                          </a:solidFill>
+                        </a:rPr>
+                        <m:t>70%</m:t>
+                      </m:r>
+                      <m:r>
+                        <a:rPr lang="en-US" sz="1200" i="1"/>
+                        <m:t> </m:t>
+                      </m:r>
+                      <m:r>
+                        <a:rPr lang="en-US" sz="1200"/>
+                        <m:t>=</m:t>
+                      </m:r>
+                      <m:d>
+                        <m:dPr>
+                          <m:ctrlPr>
+                            <a:rPr lang="en-US" sz="1200" i="1"/>
+                          </m:ctrlPr>
+                        </m:dPr>
+                        <m:e>
+                          <m:r>
+                            <a:rPr lang="en-US" sz="1200"/>
+                            <m:t>1</m:t>
+                          </m:r>
+                          <m:r>
+                            <a:rPr lang="en-US" sz="1200" i="1"/>
+                            <m:t>−</m:t>
+                          </m:r>
+                          <m:f>
+                            <m:fPr>
+                              <m:ctrlPr>
+                                <a:rPr lang="en-US" sz="1200" i="1"/>
+                              </m:ctrlPr>
+                            </m:fPr>
+                            <m:num>
+                              <m:r>
+                                <a:rPr lang="en-US" sz="1200" smtClean="0">
+                                  <a:solidFill>
+                                    <a:srgbClr val="008000"/>
+                                  </a:solidFill>
+                                </a:rPr>
+                                <m:t>0.723</m:t>
+                              </m:r>
+                            </m:num>
+                            <m:den>
+                              <m:r>
+                                <a:rPr lang="en-US" sz="1200" smtClean="0">
+                                  <a:solidFill>
+                                    <a:srgbClr val="002060"/>
+                                  </a:solidFill>
+                                </a:rPr>
+                                <m:t>1.687</m:t>
+                              </m:r>
+                              <m:r>
+                                <a:rPr lang="en-US" sz="1200" i="1"/>
+                                <m:t>+</m:t>
+                              </m:r>
+                              <m:r>
+                                <a:rPr lang="en-US" sz="1200" smtClean="0">
+                                  <a:solidFill>
+                                    <a:srgbClr val="008000"/>
+                                  </a:solidFill>
+                                </a:rPr>
+                                <m:t>0.723</m:t>
+                              </m:r>
+                            </m:den>
+                          </m:f>
+                        </m:e>
+                      </m:d>
+                      <m:r>
+                        <a:rPr lang="en-US" sz="1200" i="1"/>
+                        <m:t>∗100%</m:t>
+                      </m:r>
+                    </m:oMath>
+                  </m:oMathPara>
+                </a14:m>
+                <a:endParaRPr lang="en-US" sz="1400" dirty="0"/>
+              </a:p>
+              <a:p>
+                <a:pPr marL="0" indent="0">
+                  <a:buNone/>
+                </a:pPr>
+                <a:endParaRPr lang="en-US" sz="1400" dirty="0"/>
+              </a:p>
+            </p:txBody>
+          </p:sp>
+        </mc:Choice>
+        <mc:Fallback>
+          <p:sp>
+            <p:nvSpPr>
+              <p:cNvPr id="3" name="Content Placeholder 2"/>
+              <p:cNvSpPr>
+                <a:spLocks noGrp="1" noRot="1" noChangeAspect="1" noMove="1" noResize="1" noEditPoints="1" noAdjustHandles="1" noChangeArrowheads="1" noChangeShapeType="1" noTextEdit="1"/>
+              </p:cNvSpPr>
+              <p:nvPr>
+                <p:ph sz="quarter" idx="1"/>
+              </p:nvPr>
+            </p:nvSpPr>
+            <p:spPr>
+              <a:xfrm>
+                <a:off x="914400" y="1206500"/>
+                <a:ext cx="7772400" cy="4013200"/>
+              </a:xfrm>
+              <a:blipFill rotWithShape="0">
+                <a:blip r:embed="rId3"/>
+                <a:stretch>
+                  <a:fillRect l="-627"/>
+                </a:stretch>
+              </a:blipFill>
+            </p:spPr>
+            <p:txBody>
+              <a:bodyPr/>
+              <a:lstStyle/>
+              <a:p>
+                <a:r>
+                  <a:rPr lang="en-US">
+                    <a:noFill/>
+                  </a:rPr>
+                  <a:t> </a:t>
+                </a:r>
+              </a:p>
+            </p:txBody>
+          </p:sp>
+        </mc:Fallback>
+      </mc:AlternateContent>
+      <p:pic>
+        <p:nvPicPr>
+          <p:cNvPr id="4" name="Picture 3"/>
+          <p:cNvPicPr/>
+          <p:nvPr/>
+        </p:nvPicPr>
+        <p:blipFill>
+          <a:blip r:embed="rId4"/>
+          <a:stretch>
+            <a:fillRect/>
+          </a:stretch>
+        </p:blipFill>
+        <p:spPr>
+          <a:xfrm>
+            <a:off x="5486400" y="2705100"/>
+            <a:ext cx="1524000" cy="1589884"/>
+          </a:xfrm>
+          <a:prstGeom prst="rect">
+            <a:avLst/>
+          </a:prstGeom>
+        </p:spPr>
+      </p:pic>
     </p:spTree>
     <p:extLst>
       <p:ext uri="{BB962C8B-B14F-4D97-AF65-F5344CB8AC3E}">
@@ -7840,6 +8570,13 @@
   <p:clrMapOvr>
     <a:masterClrMapping/>
   </p:clrMapOvr>
+  <p:timing>
+    <p:tnLst>
+      <p:par>
+        <p:cTn id="1" dur="indefinite" restart="never" nodeType="tmRoot"/>
+      </p:par>
+    </p:tnLst>
+  </p:timing>
 </p:sld>
 </file>
 

</xml_diff>

<commit_message>
Added audio to the Risk Score Meter slide
</commit_message>
<xml_diff>
--- a/Team Deliverable 4/Final Presentation - FHIRed Up.pptx
+++ b/Team Deliverable 4/Final Presentation - FHIRed Up.pptx
@@ -203,7 +203,6 @@
           <c:dLbls>
             <c:dLbl>
               <c:idx val="0"/>
-              <c:layout/>
               <c:tx>
                 <c:rich>
                   <a:bodyPr/>
@@ -233,7 +232,6 @@
                   <c16:uniqueId val="{0000001F-8090-479E-BF1A-EA59472E2D6D}"/>
                 </c:ext>
                 <c:ext xmlns:c15="http://schemas.microsoft.com/office/drawing/2012/chart" uri="{CE6537A1-D6FC-4f65-9D91-7224C49458BB}">
-                  <c15:layout/>
                   <c15:dlblFieldTable/>
                   <c15:showDataLabelsRange val="0"/>
                 </c:ext>
@@ -373,7 +371,6 @@
                   <c16:uniqueId val="{00000002-8090-479E-BF1A-EA59472E2D6D}"/>
                 </c:ext>
                 <c:ext xmlns:c15="http://schemas.microsoft.com/office/drawing/2012/chart" uri="{CE6537A1-D6FC-4f65-9D91-7224C49458BB}">
-                  <c15:layout/>
                   <c15:dlblFieldTable/>
                   <c15:showDataLabelsRange val="0"/>
                 </c:ext>
@@ -523,7 +520,6 @@
                   <c16:uniqueId val="{00000006-8090-479E-BF1A-EA59472E2D6D}"/>
                 </c:ext>
                 <c:ext xmlns:c15="http://schemas.microsoft.com/office/drawing/2012/chart" uri="{CE6537A1-D6FC-4f65-9D91-7224C49458BB}">
-                  <c15:layout/>
                   <c15:dlblFieldTable/>
                   <c15:showDataLabelsRange val="0"/>
                 </c:ext>
@@ -653,7 +649,6 @@
                   <c16:uniqueId val="{00000008-8090-479E-BF1A-EA59472E2D6D}"/>
                 </c:ext>
                 <c:ext xmlns:c15="http://schemas.microsoft.com/office/drawing/2012/chart" uri="{CE6537A1-D6FC-4f65-9D91-7224C49458BB}">
-                  <c15:layout/>
                   <c15:dlblFieldTable/>
                   <c15:showDataLabelsRange val="0"/>
                 </c:ext>
@@ -764,7 +759,6 @@
             </c:dLbl>
             <c:dLbl>
               <c:idx val="1"/>
-              <c:layout/>
               <c:tx>
                 <c:rich>
                   <a:bodyPr/>
@@ -794,7 +788,6 @@
                   <c16:uniqueId val="{00000020-8090-479E-BF1A-EA59472E2D6D}"/>
                 </c:ext>
                 <c:ext xmlns:c15="http://schemas.microsoft.com/office/drawing/2012/chart" uri="{CE6537A1-D6FC-4f65-9D91-7224C49458BB}">
-                  <c15:layout/>
                   <c15:dlblFieldTable/>
                   <c15:showDataLabelsRange val="0"/>
                 </c:ext>
@@ -906,9 +899,7 @@
                 <c:ext xmlns:c16="http://schemas.microsoft.com/office/drawing/2014/chart" uri="{C3380CC4-5D6E-409C-BE32-E72D297353CC}">
                   <c16:uniqueId val="{0000000D-8090-479E-BF1A-EA59472E2D6D}"/>
                 </c:ext>
-                <c:ext xmlns:c15="http://schemas.microsoft.com/office/drawing/2012/chart" uri="{CE6537A1-D6FC-4f65-9D91-7224C49458BB}">
-                  <c15:layout/>
-                </c:ext>
+                <c:ext xmlns:c15="http://schemas.microsoft.com/office/drawing/2012/chart" uri="{CE6537A1-D6FC-4f65-9D91-7224C49458BB}"/>
               </c:extLst>
             </c:dLbl>
             <c:dLbl>
@@ -1096,9 +1087,7 @@
                 <c:ext xmlns:c16="http://schemas.microsoft.com/office/drawing/2014/chart" uri="{C3380CC4-5D6E-409C-BE32-E72D297353CC}">
                   <c16:uniqueId val="{00000012-8090-479E-BF1A-EA59472E2D6D}"/>
                 </c:ext>
-                <c:ext xmlns:c15="http://schemas.microsoft.com/office/drawing/2012/chart" uri="{CE6537A1-D6FC-4f65-9D91-7224C49458BB}">
-                  <c15:layout/>
-                </c:ext>
+                <c:ext xmlns:c15="http://schemas.microsoft.com/office/drawing/2012/chart" uri="{CE6537A1-D6FC-4f65-9D91-7224C49458BB}"/>
               </c:extLst>
             </c:dLbl>
             <c:spPr>
@@ -1289,7 +1278,6 @@
                   <c16:uniqueId val="{00000015-8090-479E-BF1A-EA59472E2D6D}"/>
                 </c:ext>
                 <c:ext xmlns:c15="http://schemas.microsoft.com/office/drawing/2012/chart" uri="{CE6537A1-D6FC-4f65-9D91-7224C49458BB}">
-                  <c15:layout/>
                   <c15:dlblFieldTable/>
                   <c15:showDataLabelsRange val="0"/>
                 </c:ext>
@@ -1480,9 +1468,7 @@
                 <c:ext xmlns:c16="http://schemas.microsoft.com/office/drawing/2014/chart" uri="{C3380CC4-5D6E-409C-BE32-E72D297353CC}">
                   <c16:uniqueId val="{0000001A-8090-479E-BF1A-EA59472E2D6D}"/>
                 </c:ext>
-                <c:ext xmlns:c15="http://schemas.microsoft.com/office/drawing/2012/chart" uri="{CE6537A1-D6FC-4f65-9D91-7224C49458BB}">
-                  <c15:layout/>
-                </c:ext>
+                <c:ext xmlns:c15="http://schemas.microsoft.com/office/drawing/2012/chart" uri="{CE6537A1-D6FC-4f65-9D91-7224C49458BB}"/>
               </c:extLst>
             </c:dLbl>
             <c:spPr>
@@ -1594,7 +1580,6 @@
             <c:showLeaderLines val="0"/>
             <c:extLst xmlns:c16r2="http://schemas.microsoft.com/office/drawing/2015/06/chart">
               <c:ext xmlns:c15="http://schemas.microsoft.com/office/drawing/2012/chart" uri="{CE6537A1-D6FC-4f65-9D91-7224C49458BB}">
-                <c15:layout/>
                 <c15:showLeaderLines val="0"/>
               </c:ext>
             </c:extLst>
@@ -1645,11 +1630,11 @@
           <c:showPercent val="0"/>
           <c:showBubbleSize val="0"/>
         </c:dLbls>
-        <c:axId val="1813779888"/>
-        <c:axId val="1813768464"/>
+        <c:axId val="230711872"/>
+        <c:axId val="230706976"/>
       </c:scatterChart>
       <c:valAx>
-        <c:axId val="1813779888"/>
+        <c:axId val="230711872"/>
         <c:scaling>
           <c:orientation val="minMax"/>
         </c:scaling>
@@ -1672,12 +1657,12 @@
             <a:endParaRPr lang="en-US"/>
           </a:p>
         </c:txPr>
-        <c:crossAx val="1813768464"/>
+        <c:crossAx val="230706976"/>
         <c:crosses val="autoZero"/>
         <c:crossBetween val="midCat"/>
       </c:valAx>
       <c:valAx>
-        <c:axId val="1813768464"/>
+        <c:axId val="230706976"/>
         <c:scaling>
           <c:orientation val="minMax"/>
         </c:scaling>
@@ -1694,7 +1679,7 @@
         <c:majorTickMark val="out"/>
         <c:minorTickMark val="none"/>
         <c:tickLblPos val="nextTo"/>
-        <c:crossAx val="1813779888"/>
+        <c:crossAx val="230711872"/>
         <c:crosses val="autoZero"/>
         <c:crossBetween val="midCat"/>
       </c:valAx>
@@ -1807,7 +1792,7 @@
           <a:p>
             <a:fld id="{82AF1EC4-0AE9-4ABA-827F-84879B727577}" type="datetimeFigureOut">
               <a:rPr lang="en-US" smtClean="0"/>
-              <a:t>4/25/2016</a:t>
+              <a:t>4/26/2016</a:t>
             </a:fld>
             <a:endParaRPr lang="en-US"/>
           </a:p>
@@ -2426,6 +2411,14 @@
           <a:bodyPr/>
           <a:lstStyle/>
           <a:p>
+            <a:r>
+              <a:rPr lang="en-US" dirty="0" smtClean="0"/>
+              <a:t>The </a:t>
+            </a:r>
+            <a:r>
+              <a:rPr lang="en-US" smtClean="0"/>
+              <a:t>RADV architecture </a:t>
+            </a:r>
             <a:endParaRPr lang="en-US" dirty="0"/>
           </a:p>
         </p:txBody>
@@ -2537,7 +2530,127 @@
                 <a:ea typeface="+mn-ea"/>
                 <a:cs typeface="+mn-cs"/>
               </a:rPr>
-              <a:t>The candidate risk score meter (or gauge) indicates the severity of the patient’s candidate risk score relative to their current risk score.  It is used to quickly identify if a patient’s candidate HCCs would make a significant impact to their current risk score if they were added to the patient.</a:t>
+              <a:t>The candidate risk score meter (or gauge) </a:t>
+            </a:r>
+            <a:r>
+              <a:rPr lang="en-US" sz="1200" kern="1200" dirty="0" smtClean="0">
+                <a:solidFill>
+                  <a:schemeClr val="tx1"/>
+                </a:solidFill>
+                <a:effectLst/>
+                <a:latin typeface="+mn-lt"/>
+                <a:ea typeface="+mn-ea"/>
+                <a:cs typeface="+mn-cs"/>
+              </a:rPr>
+              <a:t>is used to indicate the </a:t>
+            </a:r>
+            <a:r>
+              <a:rPr lang="en-US" sz="1200" kern="1200" dirty="0" smtClean="0">
+                <a:solidFill>
+                  <a:schemeClr val="tx1"/>
+                </a:solidFill>
+                <a:effectLst/>
+                <a:latin typeface="+mn-lt"/>
+                <a:ea typeface="+mn-ea"/>
+                <a:cs typeface="+mn-cs"/>
+              </a:rPr>
+              <a:t>severity of the patient’s candidate risk score relative to their current risk score.  It is used to quickly identify if </a:t>
+            </a:r>
+            <a:r>
+              <a:rPr lang="en-US" sz="1200" kern="1200" dirty="0" smtClean="0">
+                <a:solidFill>
+                  <a:schemeClr val="tx1"/>
+                </a:solidFill>
+                <a:effectLst/>
+                <a:latin typeface="+mn-lt"/>
+                <a:ea typeface="+mn-ea"/>
+                <a:cs typeface="+mn-cs"/>
+              </a:rPr>
+              <a:t>the</a:t>
+            </a:r>
+            <a:r>
+              <a:rPr lang="en-US" sz="1200" kern="1200" baseline="0" dirty="0" smtClean="0">
+                <a:solidFill>
+                  <a:schemeClr val="tx1"/>
+                </a:solidFill>
+                <a:effectLst/>
+                <a:latin typeface="+mn-lt"/>
+                <a:ea typeface="+mn-ea"/>
+                <a:cs typeface="+mn-cs"/>
+              </a:rPr>
+              <a:t> </a:t>
+            </a:r>
+            <a:r>
+              <a:rPr lang="en-US" sz="1200" kern="1200" dirty="0" smtClean="0">
+                <a:solidFill>
+                  <a:schemeClr val="tx1"/>
+                </a:solidFill>
+                <a:effectLst/>
+                <a:latin typeface="+mn-lt"/>
+                <a:ea typeface="+mn-ea"/>
+                <a:cs typeface="+mn-cs"/>
+              </a:rPr>
+              <a:t>candidate </a:t>
+            </a:r>
+            <a:r>
+              <a:rPr lang="en-US" sz="1200" kern="1200" dirty="0" smtClean="0">
+                <a:solidFill>
+                  <a:schemeClr val="tx1"/>
+                </a:solidFill>
+                <a:effectLst/>
+                <a:latin typeface="+mn-lt"/>
+                <a:ea typeface="+mn-ea"/>
+                <a:cs typeface="+mn-cs"/>
+              </a:rPr>
+              <a:t>HCCs would make a significant impact to </a:t>
+            </a:r>
+            <a:r>
+              <a:rPr lang="en-US" sz="1200" kern="1200" dirty="0" smtClean="0">
+                <a:solidFill>
+                  <a:schemeClr val="tx1"/>
+                </a:solidFill>
+                <a:effectLst/>
+                <a:latin typeface="+mn-lt"/>
+                <a:ea typeface="+mn-ea"/>
+                <a:cs typeface="+mn-cs"/>
+              </a:rPr>
+              <a:t>the</a:t>
+            </a:r>
+            <a:r>
+              <a:rPr lang="en-US" sz="1200" kern="1200" baseline="0" dirty="0" smtClean="0">
+                <a:solidFill>
+                  <a:schemeClr val="tx1"/>
+                </a:solidFill>
+                <a:effectLst/>
+                <a:latin typeface="+mn-lt"/>
+                <a:ea typeface="+mn-ea"/>
+                <a:cs typeface="+mn-cs"/>
+              </a:rPr>
+              <a:t> patient’s </a:t>
+            </a:r>
+            <a:r>
+              <a:rPr lang="en-US" sz="1200" kern="1200" dirty="0" smtClean="0">
+                <a:solidFill>
+                  <a:schemeClr val="tx1"/>
+                </a:solidFill>
+                <a:effectLst/>
+                <a:latin typeface="+mn-lt"/>
+                <a:ea typeface="+mn-ea"/>
+                <a:cs typeface="+mn-cs"/>
+              </a:rPr>
+              <a:t>risk score, were they to be added </a:t>
+            </a:r>
+            <a:r>
+              <a:rPr lang="en-US" sz="1200" kern="1200" dirty="0" smtClean="0">
+                <a:solidFill>
+                  <a:schemeClr val="tx1"/>
+                </a:solidFill>
+                <a:effectLst/>
+                <a:latin typeface="+mn-lt"/>
+                <a:ea typeface="+mn-ea"/>
+                <a:cs typeface="+mn-cs"/>
+              </a:rPr>
+              <a:t>to the patient.</a:t>
             </a:r>
           </a:p>
           <a:p>
@@ -2610,19 +2723,7 @@
                 <a:ea typeface="+mn-ea"/>
                 <a:cs typeface="+mn-cs"/>
               </a:rPr>
-              <a:t>If a patient has a Current Risk Score of 0.723 and the sum of their Candidate Risk Scores is 1.687, the candidate risk score meter would register 70, indicating the patient’s current risk score is 70% less then what it would be </a:t>
-            </a:r>
-            <a:r>
-              <a:rPr lang="en-US" sz="1200" kern="1200" smtClean="0">
-                <a:solidFill>
-                  <a:schemeClr val="tx1"/>
-                </a:solidFill>
-                <a:effectLst/>
-                <a:latin typeface="+mn-lt"/>
-                <a:ea typeface="+mn-ea"/>
-                <a:cs typeface="+mn-cs"/>
-              </a:rPr>
-              <a:t>if the candidate </a:t>
+              <a:t>If a patient has a Current Risk Score of 0.723 and the sum of their Candidate Risk Scores </a:t>
             </a:r>
             <a:r>
               <a:rPr lang="en-US" sz="1200" kern="1200" dirty="0" smtClean="0">
@@ -2634,7 +2735,19 @@
                 <a:ea typeface="+mn-ea"/>
                 <a:cs typeface="+mn-cs"/>
               </a:rPr>
-              <a:t>HCCs where included.</a:t>
+              <a:t>totals1.687</a:t>
+            </a:r>
+            <a:r>
+              <a:rPr lang="en-US" sz="1200" kern="1200" dirty="0" smtClean="0">
+                <a:solidFill>
+                  <a:schemeClr val="tx1"/>
+                </a:solidFill>
+                <a:effectLst/>
+                <a:latin typeface="+mn-lt"/>
+                <a:ea typeface="+mn-ea"/>
+                <a:cs typeface="+mn-cs"/>
+              </a:rPr>
+              <a:t>, the candidate risk score meter would register 70, indicating the patient’s current risk score is 70% less then what it would be if the candidate HCCs where included.</a:t>
             </a:r>
           </a:p>
           <a:p>
@@ -3075,7 +3188,7 @@
           <a:p>
             <a:fld id="{3EAEFB75-4DE4-4DFC-B956-52D01254B927}" type="datetimeFigureOut">
               <a:rPr lang="en-US" smtClean="0"/>
-              <a:t>4/25/2016</a:t>
+              <a:t>4/26/2016</a:t>
             </a:fld>
             <a:endParaRPr lang="en-US"/>
           </a:p>
@@ -3426,7 +3539,7 @@
           <a:p>
             <a:fld id="{3EAEFB75-4DE4-4DFC-B956-52D01254B927}" type="datetimeFigureOut">
               <a:rPr lang="en-US" smtClean="0"/>
-              <a:t>4/25/2016</a:t>
+              <a:t>4/26/2016</a:t>
             </a:fld>
             <a:endParaRPr lang="en-US"/>
           </a:p>
@@ -3600,7 +3713,7 @@
           <a:p>
             <a:fld id="{3EAEFB75-4DE4-4DFC-B956-52D01254B927}" type="datetimeFigureOut">
               <a:rPr lang="en-US" smtClean="0"/>
-              <a:t>4/25/2016</a:t>
+              <a:t>4/26/2016</a:t>
             </a:fld>
             <a:endParaRPr lang="en-US"/>
           </a:p>
@@ -3712,7 +3825,7 @@
           <a:p>
             <a:fld id="{3EAEFB75-4DE4-4DFC-B956-52D01254B927}" type="datetimeFigureOut">
               <a:rPr lang="en-US" smtClean="0"/>
-              <a:t>4/25/2016</a:t>
+              <a:t>4/26/2016</a:t>
             </a:fld>
             <a:endParaRPr lang="en-US"/>
           </a:p>
@@ -4069,7 +4182,7 @@
           <a:p>
             <a:fld id="{3EAEFB75-4DE4-4DFC-B956-52D01254B927}" type="datetimeFigureOut">
               <a:rPr lang="en-US" smtClean="0"/>
-              <a:t>4/25/2016</a:t>
+              <a:t>4/26/2016</a:t>
             </a:fld>
             <a:endParaRPr lang="en-US"/>
           </a:p>
@@ -4333,7 +4446,7 @@
           <a:p>
             <a:fld id="{3EAEFB75-4DE4-4DFC-B956-52D01254B927}" type="datetimeFigureOut">
               <a:rPr lang="en-US" smtClean="0"/>
-              <a:t>4/25/2016</a:t>
+              <a:t>4/26/2016</a:t>
             </a:fld>
             <a:endParaRPr lang="en-US"/>
           </a:p>
@@ -4694,7 +4807,7 @@
           <a:p>
             <a:fld id="{3EAEFB75-4DE4-4DFC-B956-52D01254B927}" type="datetimeFigureOut">
               <a:rPr lang="en-US" smtClean="0"/>
-              <a:t>4/25/2016</a:t>
+              <a:t>4/26/2016</a:t>
             </a:fld>
             <a:endParaRPr lang="en-US"/>
           </a:p>
@@ -4920,7 +5033,7 @@
           <a:p>
             <a:fld id="{3EAEFB75-4DE4-4DFC-B956-52D01254B927}" type="datetimeFigureOut">
               <a:rPr lang="en-US" smtClean="0"/>
-              <a:t>4/25/2016</a:t>
+              <a:t>4/26/2016</a:t>
             </a:fld>
             <a:endParaRPr lang="en-US"/>
           </a:p>
@@ -5010,7 +5123,7 @@
           <a:p>
             <a:fld id="{3EAEFB75-4DE4-4DFC-B956-52D01254B927}" type="datetimeFigureOut">
               <a:rPr lang="en-US" smtClean="0"/>
-              <a:t>4/25/2016</a:t>
+              <a:t>4/26/2016</a:t>
             </a:fld>
             <a:endParaRPr lang="en-US"/>
           </a:p>
@@ -5276,7 +5389,7 @@
           <a:p>
             <a:fld id="{3EAEFB75-4DE4-4DFC-B956-52D01254B927}" type="datetimeFigureOut">
               <a:rPr lang="en-US" smtClean="0"/>
-              <a:t>4/25/2016</a:t>
+              <a:t>4/26/2016</a:t>
             </a:fld>
             <a:endParaRPr lang="en-US"/>
           </a:p>
@@ -5503,7 +5616,7 @@
           <a:p>
             <a:fld id="{3EAEFB75-4DE4-4DFC-B956-52D01254B927}" type="datetimeFigureOut">
               <a:rPr lang="en-US" smtClean="0"/>
-              <a:t>4/25/2016</a:t>
+              <a:t>4/26/2016</a:t>
             </a:fld>
             <a:endParaRPr lang="en-US"/>
           </a:p>
@@ -6000,7 +6113,7 @@
           <a:p>
             <a:fld id="{3EAEFB75-4DE4-4DFC-B956-52D01254B927}" type="datetimeFigureOut">
               <a:rPr lang="en-US" smtClean="0"/>
-              <a:t>4/25/2016</a:t>
+              <a:t>4/26/2016</a:t>
             </a:fld>
             <a:endParaRPr lang="en-US"/>
           </a:p>
@@ -8062,8 +8175,8 @@
           </a:p>
         </p:txBody>
       </p:sp>
-      <mc:AlternateContent xmlns:mc="http://schemas.openxmlformats.org/markup-compatibility/2006">
-        <mc:Choice xmlns:a14="http://schemas.microsoft.com/office/drawing/2010/main" Requires="a14">
+      <mc:AlternateContent xmlns:mc="http://schemas.openxmlformats.org/markup-compatibility/2006" xmlns:a14="http://schemas.microsoft.com/office/drawing/2010/main">
+        <mc:Choice Requires="a14">
           <p:sp>
             <p:nvSpPr>
               <p:cNvPr id="3" name="Content Placeholder 2"/>
@@ -8112,36 +8225,50 @@
                     </m:oMathParaPr>
                     <m:oMath xmlns:m="http://schemas.openxmlformats.org/officeDocument/2006/math">
                       <m:r>
-                        <a:rPr lang="en-US" sz="1200" i="1"/>
+                        <a:rPr lang="en-US" sz="1200" i="1">
+                          <a:latin typeface="Cambria Math" panose="02040503050406030204" pitchFamily="18" charset="0"/>
+                        </a:rPr>
                         <m:t>𝑥</m:t>
                       </m:r>
                       <m:r>
-                        <a:rPr lang="en-US" sz="1200" i="1"/>
+                        <a:rPr lang="en-US" sz="1200" i="1">
+                          <a:latin typeface="Cambria Math" panose="02040503050406030204" pitchFamily="18" charset="0"/>
+                        </a:rPr>
                         <m:t>% </m:t>
                       </m:r>
                       <m:r>
-                        <a:rPr lang="en-US" sz="1200"/>
+                        <a:rPr lang="en-US" sz="1200">
+                          <a:latin typeface="Cambria Math" panose="02040503050406030204" pitchFamily="18" charset="0"/>
+                        </a:rPr>
                         <m:t>=</m:t>
                       </m:r>
                       <m:d>
                         <m:dPr>
                           <m:ctrlPr>
-                            <a:rPr lang="en-US" sz="1200" i="1"/>
+                            <a:rPr lang="en-US" sz="1200" i="1">
+                              <a:latin typeface="Cambria Math" panose="02040503050406030204" pitchFamily="18" charset="0"/>
+                            </a:rPr>
                           </m:ctrlPr>
                         </m:dPr>
                         <m:e>
                           <m:r>
-                            <a:rPr lang="en-US" sz="1200"/>
+                            <a:rPr lang="en-US" sz="1200">
+                              <a:latin typeface="Cambria Math" panose="02040503050406030204" pitchFamily="18" charset="0"/>
+                            </a:rPr>
                             <m:t>1</m:t>
                           </m:r>
                           <m:r>
-                            <a:rPr lang="en-US" sz="1200" i="1"/>
+                            <a:rPr lang="en-US" sz="1200" i="1">
+                              <a:latin typeface="Cambria Math" panose="02040503050406030204" pitchFamily="18" charset="0"/>
+                            </a:rPr>
                             <m:t>−</m:t>
                           </m:r>
                           <m:f>
                             <m:fPr>
                               <m:ctrlPr>
-                                <a:rPr lang="en-US" sz="1200" i="1"/>
+                                <a:rPr lang="en-US" sz="1200" i="1">
+                                  <a:latin typeface="Cambria Math" panose="02040503050406030204" pitchFamily="18" charset="0"/>
+                                </a:rPr>
                               </m:ctrlPr>
                             </m:fPr>
                             <m:num>
@@ -8149,29 +8276,39 @@
                                 <m:rPr>
                                   <m:sty m:val="p"/>
                                 </m:rPr>
-                                <a:rPr lang="en-US" sz="1200"/>
+                                <a:rPr lang="en-US" sz="1200">
+                                  <a:latin typeface="Cambria Math" panose="02040503050406030204" pitchFamily="18" charset="0"/>
+                                </a:rPr>
                                 <m:t>Current</m:t>
                               </m:r>
                               <m:r>
-                                <a:rPr lang="en-US" sz="1200"/>
+                                <a:rPr lang="en-US" sz="1200">
+                                  <a:latin typeface="Cambria Math" panose="02040503050406030204" pitchFamily="18" charset="0"/>
+                                </a:rPr>
                                 <m:t> </m:t>
                               </m:r>
                               <m:r>
                                 <m:rPr>
                                   <m:sty m:val="p"/>
                                 </m:rPr>
-                                <a:rPr lang="en-US" sz="1200"/>
+                                <a:rPr lang="en-US" sz="1200">
+                                  <a:latin typeface="Cambria Math" panose="02040503050406030204" pitchFamily="18" charset="0"/>
+                                </a:rPr>
                                 <m:t>Risk</m:t>
                               </m:r>
                               <m:r>
-                                <a:rPr lang="en-US" sz="1200"/>
+                                <a:rPr lang="en-US" sz="1200">
+                                  <a:latin typeface="Cambria Math" panose="02040503050406030204" pitchFamily="18" charset="0"/>
+                                </a:rPr>
                                 <m:t> </m:t>
                               </m:r>
                               <m:r>
                                 <m:rPr>
                                   <m:sty m:val="p"/>
                                 </m:rPr>
-                                <a:rPr lang="en-US" sz="1200"/>
+                                <a:rPr lang="en-US" sz="1200">
+                                  <a:latin typeface="Cambria Math" panose="02040503050406030204" pitchFamily="18" charset="0"/>
+                                </a:rPr>
                                 <m:t>Score</m:t>
                               </m:r>
                             </m:num>
@@ -8180,17 +8317,23 @@
                                 <m:rPr>
                                   <m:sty m:val="p"/>
                                 </m:rPr>
-                                <a:rPr lang="en-US" sz="1200"/>
+                                <a:rPr lang="en-US" sz="1200">
+                                  <a:latin typeface="Cambria Math" panose="02040503050406030204" pitchFamily="18" charset="0"/>
+                                </a:rPr>
                                 <m:t>Sum</m:t>
                               </m:r>
                               <m:r>
-                                <a:rPr lang="en-US" sz="1200"/>
+                                <a:rPr lang="en-US" sz="1200">
+                                  <a:latin typeface="Cambria Math" panose="02040503050406030204" pitchFamily="18" charset="0"/>
+                                </a:rPr>
                                 <m:t> </m:t>
                               </m:r>
                               <m:d>
                                 <m:dPr>
                                   <m:ctrlPr>
-                                    <a:rPr lang="en-US" sz="1200" i="1"/>
+                                    <a:rPr lang="en-US" sz="1200" i="1">
+                                      <a:latin typeface="Cambria Math" panose="02040503050406030204" pitchFamily="18" charset="0"/>
+                                    </a:rPr>
                                   </m:ctrlPr>
                                 </m:dPr>
                                 <m:e>
@@ -8198,75 +8341,101 @@
                                     <m:rPr>
                                       <m:sty m:val="p"/>
                                     </m:rPr>
-                                    <a:rPr lang="en-US" sz="1200"/>
+                                    <a:rPr lang="en-US" sz="1200">
+                                      <a:latin typeface="Cambria Math" panose="02040503050406030204" pitchFamily="18" charset="0"/>
+                                    </a:rPr>
                                     <m:t>Candidate</m:t>
                                   </m:r>
                                   <m:r>
-                                    <a:rPr lang="en-US" sz="1200"/>
+                                    <a:rPr lang="en-US" sz="1200">
+                                      <a:latin typeface="Cambria Math" panose="02040503050406030204" pitchFamily="18" charset="0"/>
+                                    </a:rPr>
                                     <m:t> </m:t>
                                   </m:r>
                                   <m:r>
                                     <m:rPr>
                                       <m:sty m:val="p"/>
                                     </m:rPr>
-                                    <a:rPr lang="en-US" sz="1200"/>
+                                    <a:rPr lang="en-US" sz="1200">
+                                      <a:latin typeface="Cambria Math" panose="02040503050406030204" pitchFamily="18" charset="0"/>
+                                    </a:rPr>
                                     <m:t>HCC</m:t>
                                   </m:r>
                                   <m:r>
-                                    <a:rPr lang="en-US" sz="1200"/>
+                                    <a:rPr lang="en-US" sz="1200">
+                                      <a:latin typeface="Cambria Math" panose="02040503050406030204" pitchFamily="18" charset="0"/>
+                                    </a:rPr>
                                     <m:t> </m:t>
                                   </m:r>
                                   <m:r>
                                     <m:rPr>
                                       <m:sty m:val="p"/>
                                     </m:rPr>
-                                    <a:rPr lang="en-US" sz="1200"/>
+                                    <a:rPr lang="en-US" sz="1200">
+                                      <a:latin typeface="Cambria Math" panose="02040503050406030204" pitchFamily="18" charset="0"/>
+                                    </a:rPr>
                                     <m:t>Risk</m:t>
                                   </m:r>
                                   <m:r>
-                                    <a:rPr lang="en-US" sz="1200"/>
+                                    <a:rPr lang="en-US" sz="1200">
+                                      <a:latin typeface="Cambria Math" panose="02040503050406030204" pitchFamily="18" charset="0"/>
+                                    </a:rPr>
                                     <m:t> </m:t>
                                   </m:r>
                                   <m:r>
                                     <m:rPr>
                                       <m:sty m:val="p"/>
                                     </m:rPr>
-                                    <a:rPr lang="en-US" sz="1200"/>
+                                    <a:rPr lang="en-US" sz="1200">
+                                      <a:latin typeface="Cambria Math" panose="02040503050406030204" pitchFamily="18" charset="0"/>
+                                    </a:rPr>
                                     <m:t>Scores</m:t>
                                   </m:r>
                                 </m:e>
                               </m:d>
                               <m:r>
-                                <a:rPr lang="en-US" sz="1200" i="1"/>
+                                <a:rPr lang="en-US" sz="1200" i="1">
+                                  <a:latin typeface="Cambria Math" panose="02040503050406030204" pitchFamily="18" charset="0"/>
+                                </a:rPr>
                                 <m:t>+</m:t>
                               </m:r>
                               <m:r>
                                 <m:rPr>
                                   <m:sty m:val="p"/>
                                 </m:rPr>
-                                <a:rPr lang="en-US" sz="1200"/>
+                                <a:rPr lang="en-US" sz="1200">
+                                  <a:latin typeface="Cambria Math" panose="02040503050406030204" pitchFamily="18" charset="0"/>
+                                </a:rPr>
                                 <m:t>Current</m:t>
                               </m:r>
                               <m:r>
-                                <a:rPr lang="en-US" sz="1200"/>
+                                <a:rPr lang="en-US" sz="1200">
+                                  <a:latin typeface="Cambria Math" panose="02040503050406030204" pitchFamily="18" charset="0"/>
+                                </a:rPr>
                                 <m:t> </m:t>
                               </m:r>
                               <m:r>
                                 <m:rPr>
                                   <m:sty m:val="p"/>
                                 </m:rPr>
-                                <a:rPr lang="en-US" sz="1200"/>
+                                <a:rPr lang="en-US" sz="1200">
+                                  <a:latin typeface="Cambria Math" panose="02040503050406030204" pitchFamily="18" charset="0"/>
+                                </a:rPr>
                                 <m:t>Risk</m:t>
                               </m:r>
                               <m:r>
-                                <a:rPr lang="en-US" sz="1200"/>
+                                <a:rPr lang="en-US" sz="1200">
+                                  <a:latin typeface="Cambria Math" panose="02040503050406030204" pitchFamily="18" charset="0"/>
+                                </a:rPr>
                                 <m:t> </m:t>
                               </m:r>
                               <m:r>
                                 <m:rPr>
                                   <m:sty m:val="p"/>
                                 </m:rPr>
-                                <a:rPr lang="en-US" sz="1200"/>
+                                <a:rPr lang="en-US" sz="1200">
+                                  <a:latin typeface="Cambria Math" panose="02040503050406030204" pitchFamily="18" charset="0"/>
+                                </a:rPr>
                                 <m:t>Score</m:t>
                               </m:r>
                             </m:den>
@@ -8274,7 +8443,9 @@
                         </m:e>
                       </m:d>
                       <m:r>
-                        <a:rPr lang="en-US" sz="1200" i="1"/>
+                        <a:rPr lang="en-US" sz="1200" i="1">
+                          <a:latin typeface="Cambria Math" panose="02040503050406030204" pitchFamily="18" charset="0"/>
+                        </a:rPr>
                         <m:t>∗100%</m:t>
                       </m:r>
                     </m:oMath>
@@ -8415,36 +8586,49 @@
                               <a:lumMod val="75000"/>
                             </a:schemeClr>
                           </a:solidFill>
+                          <a:latin typeface="Cambria Math" panose="02040503050406030204" pitchFamily="18" charset="0"/>
                         </a:rPr>
                         <m:t>70%</m:t>
                       </m:r>
                       <m:r>
-                        <a:rPr lang="en-US" sz="1200" i="1"/>
+                        <a:rPr lang="en-US" sz="1200" i="1">
+                          <a:latin typeface="Cambria Math" panose="02040503050406030204" pitchFamily="18" charset="0"/>
+                        </a:rPr>
                         <m:t> </m:t>
                       </m:r>
                       <m:r>
-                        <a:rPr lang="en-US" sz="1200"/>
+                        <a:rPr lang="en-US" sz="1200">
+                          <a:latin typeface="Cambria Math" panose="02040503050406030204" pitchFamily="18" charset="0"/>
+                        </a:rPr>
                         <m:t>=</m:t>
                       </m:r>
                       <m:d>
                         <m:dPr>
                           <m:ctrlPr>
-                            <a:rPr lang="en-US" sz="1200" i="1"/>
+                            <a:rPr lang="en-US" sz="1200" i="1">
+                              <a:latin typeface="Cambria Math" panose="02040503050406030204" pitchFamily="18" charset="0"/>
+                            </a:rPr>
                           </m:ctrlPr>
                         </m:dPr>
                         <m:e>
                           <m:r>
-                            <a:rPr lang="en-US" sz="1200"/>
+                            <a:rPr lang="en-US" sz="1200">
+                              <a:latin typeface="Cambria Math" panose="02040503050406030204" pitchFamily="18" charset="0"/>
+                            </a:rPr>
                             <m:t>1</m:t>
                           </m:r>
                           <m:r>
-                            <a:rPr lang="en-US" sz="1200" i="1"/>
+                            <a:rPr lang="en-US" sz="1200" i="1">
+                              <a:latin typeface="Cambria Math" panose="02040503050406030204" pitchFamily="18" charset="0"/>
+                            </a:rPr>
                             <m:t>−</m:t>
                           </m:r>
                           <m:f>
                             <m:fPr>
                               <m:ctrlPr>
-                                <a:rPr lang="en-US" sz="1200" i="1"/>
+                                <a:rPr lang="en-US" sz="1200" i="1">
+                                  <a:latin typeface="Cambria Math" panose="02040503050406030204" pitchFamily="18" charset="0"/>
+                                </a:rPr>
                               </m:ctrlPr>
                             </m:fPr>
                             <m:num>
@@ -8453,6 +8637,7 @@
                                   <a:solidFill>
                                     <a:srgbClr val="008000"/>
                                   </a:solidFill>
+                                  <a:latin typeface="Cambria Math" panose="02040503050406030204" pitchFamily="18" charset="0"/>
                                 </a:rPr>
                                 <m:t>0.723</m:t>
                               </m:r>
@@ -8463,11 +8648,14 @@
                                   <a:solidFill>
                                     <a:srgbClr val="002060"/>
                                   </a:solidFill>
+                                  <a:latin typeface="Cambria Math" panose="02040503050406030204" pitchFamily="18" charset="0"/>
                                 </a:rPr>
                                 <m:t>1.687</m:t>
                               </m:r>
                               <m:r>
-                                <a:rPr lang="en-US" sz="1200" i="1"/>
+                                <a:rPr lang="en-US" sz="1200" i="1">
+                                  <a:latin typeface="Cambria Math" panose="02040503050406030204" pitchFamily="18" charset="0"/>
+                                </a:rPr>
                                 <m:t>+</m:t>
                               </m:r>
                               <m:r>
@@ -8475,6 +8663,7 @@
                                   <a:solidFill>
                                     <a:srgbClr val="008000"/>
                                   </a:solidFill>
+                                  <a:latin typeface="Cambria Math" panose="02040503050406030204" pitchFamily="18" charset="0"/>
                                 </a:rPr>
                                 <m:t>0.723</m:t>
                               </m:r>
@@ -8483,7 +8672,9 @@
                         </m:e>
                       </m:d>
                       <m:r>
-                        <a:rPr lang="en-US" sz="1200" i="1"/>
+                        <a:rPr lang="en-US" sz="1200" i="1">
+                          <a:latin typeface="Cambria Math" panose="02040503050406030204" pitchFamily="18" charset="0"/>
+                        </a:rPr>
                         <m:t>∗100%</m:t>
                       </m:r>
                     </m:oMath>
@@ -8500,7 +8691,7 @@
             </p:txBody>
           </p:sp>
         </mc:Choice>
-        <mc:Fallback>
+        <mc:Fallback xmlns="">
           <p:sp>
             <p:nvSpPr>
               <p:cNvPr id="3" name="Content Placeholder 2"/>
@@ -8517,7 +8708,7 @@
                 <a:ext cx="7772400" cy="4013200"/>
               </a:xfrm>
               <a:blipFill rotWithShape="0">
-                <a:blip r:embed="rId3"/>
+                <a:blip r:embed="rId5"/>
                 <a:stretch>
                   <a:fillRect l="-627"/>
                 </a:stretch>
@@ -8545,7 +8736,7 @@
           <p:nvPr/>
         </p:nvPicPr>
         <p:blipFill>
-          <a:blip r:embed="rId4"/>
+          <a:blip r:embed="rId6"/>
           <a:stretch>
             <a:fillRect/>
           </a:stretch>
@@ -8554,6 +8745,39 @@
           <a:xfrm>
             <a:off x="5486400" y="2705100"/>
             <a:ext cx="1524000" cy="1589884"/>
+          </a:xfrm>
+          <a:prstGeom prst="rect">
+            <a:avLst/>
+          </a:prstGeom>
+        </p:spPr>
+      </p:pic>
+      <p:pic>
+        <p:nvPicPr>
+          <p:cNvPr id="8" name="Recorded Sound">
+            <a:hlinkClick r:id="" action="ppaction://media"/>
+          </p:cNvPr>
+          <p:cNvPicPr>
+            <a:picLocks noChangeAspect="1"/>
+          </p:cNvPicPr>
+          <p:nvPr>
+            <a:audioFile r:link="rId2"/>
+            <p:extLst>
+              <p:ext uri="{DAA4B4D4-6D71-4841-9C94-3DE7FCFB9230}">
+                <p14:media xmlns:p14="http://schemas.microsoft.com/office/powerpoint/2010/main" r:embed="rId1"/>
+              </p:ext>
+            </p:extLst>
+          </p:nvPr>
+        </p:nvPicPr>
+        <p:blipFill>
+          <a:blip r:embed="rId7"/>
+          <a:stretch>
+            <a:fillRect/>
+          </a:stretch>
+        </p:blipFill>
+        <p:spPr>
+          <a:xfrm>
+            <a:off x="9296400" y="4076700"/>
+            <a:ext cx="609600" cy="609600"/>
           </a:xfrm>
           <a:prstGeom prst="rect">
             <a:avLst/>
@@ -8573,7 +8797,87 @@
   <p:timing>
     <p:tnLst>
       <p:par>
-        <p:cTn id="1" dur="indefinite" restart="never" nodeType="tmRoot"/>
+        <p:cTn id="1" dur="indefinite" restart="never" nodeType="tmRoot">
+          <p:childTnLst>
+            <p:seq concurrent="1" nextAc="seek">
+              <p:cTn id="2" restart="whenNotActive" fill="hold" evtFilter="cancelBubble" nodeType="interactiveSeq">
+                <p:stCondLst>
+                  <p:cond evt="onClick" delay="0">
+                    <p:tgtEl>
+                      <p:spTgt spid="8"/>
+                    </p:tgtEl>
+                  </p:cond>
+                </p:stCondLst>
+                <p:endSync evt="end" delay="0">
+                  <p:rtn val="all"/>
+                </p:endSync>
+                <p:childTnLst>
+                  <p:par>
+                    <p:cTn id="3" fill="hold">
+                      <p:stCondLst>
+                        <p:cond delay="0"/>
+                      </p:stCondLst>
+                      <p:childTnLst>
+                        <p:par>
+                          <p:cTn id="4" fill="hold">
+                            <p:stCondLst>
+                              <p:cond delay="0"/>
+                            </p:stCondLst>
+                            <p:childTnLst>
+                              <p:par>
+                                <p:cTn id="5" presetID="1" presetClass="mediacall" presetSubtype="0" fill="hold" nodeType="clickEffect">
+                                  <p:stCondLst>
+                                    <p:cond delay="0"/>
+                                  </p:stCondLst>
+                                  <p:childTnLst>
+                                    <p:cmd type="call" cmd="playFrom(0.0)">
+                                      <p:cBhvr>
+                                        <p:cTn id="6" dur="36170" fill="hold"/>
+                                        <p:tgtEl>
+                                          <p:spTgt spid="8"/>
+                                        </p:tgtEl>
+                                      </p:cBhvr>
+                                    </p:cmd>
+                                  </p:childTnLst>
+                                </p:cTn>
+                              </p:par>
+                            </p:childTnLst>
+                          </p:cTn>
+                        </p:par>
+                      </p:childTnLst>
+                    </p:cTn>
+                  </p:par>
+                </p:childTnLst>
+              </p:cTn>
+              <p:nextCondLst>
+                <p:cond evt="onClick" delay="0">
+                  <p:tgtEl>
+                    <p:spTgt spid="8"/>
+                  </p:tgtEl>
+                </p:cond>
+              </p:nextCondLst>
+            </p:seq>
+            <p:audio>
+              <p:cMediaNode vol="80000">
+                <p:cTn id="7" fill="hold" display="0">
+                  <p:stCondLst>
+                    <p:cond delay="indefinite"/>
+                  </p:stCondLst>
+                  <p:endCondLst>
+                    <p:cond evt="onStopAudio" delay="0">
+                      <p:tgtEl>
+                        <p:sldTgt/>
+                      </p:tgtEl>
+                    </p:cond>
+                  </p:endCondLst>
+                </p:cTn>
+                <p:tgtEl>
+                  <p:spTgt spid="8"/>
+                </p:tgtEl>
+              </p:cMediaNode>
+            </p:audio>
+          </p:childTnLst>
+        </p:cTn>
       </p:par>
     </p:tnLst>
   </p:timing>

</xml_diff>

<commit_message>
Added narration to the Architecture slide.
</commit_message>
<xml_diff>
--- a/Team Deliverable 4/Final Presentation - FHIRed Up.pptx
+++ b/Team Deliverable 4/Final Presentation - FHIRed Up.pptx
@@ -1630,11 +1630,11 @@
           <c:showPercent val="0"/>
           <c:showBubbleSize val="0"/>
         </c:dLbls>
-        <c:axId val="230711872"/>
-        <c:axId val="230706976"/>
+        <c:axId val="1547442464"/>
+        <c:axId val="1547445184"/>
       </c:scatterChart>
       <c:valAx>
-        <c:axId val="230711872"/>
+        <c:axId val="1547442464"/>
         <c:scaling>
           <c:orientation val="minMax"/>
         </c:scaling>
@@ -1657,12 +1657,12 @@
             <a:endParaRPr lang="en-US"/>
           </a:p>
         </c:txPr>
-        <c:crossAx val="230706976"/>
+        <c:crossAx val="1547445184"/>
         <c:crosses val="autoZero"/>
         <c:crossBetween val="midCat"/>
       </c:valAx>
       <c:valAx>
-        <c:axId val="230706976"/>
+        <c:axId val="1547445184"/>
         <c:scaling>
           <c:orientation val="minMax"/>
         </c:scaling>
@@ -1679,7 +1679,7 @@
         <c:majorTickMark val="out"/>
         <c:minorTickMark val="none"/>
         <c:tickLblPos val="nextTo"/>
-        <c:crossAx val="230711872"/>
+        <c:crossAx val="1547442464"/>
         <c:crosses val="autoZero"/>
         <c:crossBetween val="midCat"/>
       </c:valAx>
@@ -2413,11 +2413,39 @@
           <a:p>
             <a:r>
               <a:rPr lang="en-US" dirty="0" smtClean="0"/>
-              <a:t>The </a:t>
-            </a:r>
-            <a:r>
-              <a:rPr lang="en-US" smtClean="0"/>
-              <a:t>RADV architecture </a:t>
+              <a:t>The RADV architecture </a:t>
+            </a:r>
+            <a:r>
+              <a:rPr lang="en-US" dirty="0" smtClean="0"/>
+              <a:t>consists</a:t>
+            </a:r>
+            <a:r>
+              <a:rPr lang="en-US" baseline="0" dirty="0" smtClean="0"/>
+              <a:t> of an interface to an external FHIR Server, a web interface for end-users and several internal modules, including Patient Lookup, HCC Analysis &amp; Processing, Data Analytics, and Chart Rendering.</a:t>
+            </a:r>
+          </a:p>
+          <a:p>
+            <a:r>
+              <a:rPr lang="en-US" baseline="0" dirty="0" smtClean="0"/>
+              <a:t>The architecture also consists of various internal data stores used for caching, code mappings (such as HCC, ICD9, </a:t>
+            </a:r>
+            <a:r>
+              <a:rPr lang="en-US" baseline="0" dirty="0" err="1" smtClean="0"/>
+              <a:t>SnoMed</a:t>
+            </a:r>
+            <a:r>
+              <a:rPr lang="en-US" baseline="0" dirty="0" smtClean="0"/>
+              <a:t> and other mappings) and persisting patient data that the FHIR server does not currently allow external applications to update.</a:t>
+            </a:r>
+          </a:p>
+          <a:p>
+            <a:r>
+              <a:rPr lang="en-US" baseline="0" dirty="0" smtClean="0"/>
+              <a:t>The RADV application was developed in Python and is currently hosted on Google </a:t>
+            </a:r>
+            <a:r>
+              <a:rPr lang="en-US" baseline="0" smtClean="0"/>
+              <a:t>App Engine.</a:t>
             </a:r>
             <a:endParaRPr lang="en-US" dirty="0"/>
           </a:p>
@@ -2530,43 +2558,7 @@
                 <a:ea typeface="+mn-ea"/>
                 <a:cs typeface="+mn-cs"/>
               </a:rPr>
-              <a:t>The candidate risk score meter (or gauge) </a:t>
-            </a:r>
-            <a:r>
-              <a:rPr lang="en-US" sz="1200" kern="1200" dirty="0" smtClean="0">
-                <a:solidFill>
-                  <a:schemeClr val="tx1"/>
-                </a:solidFill>
-                <a:effectLst/>
-                <a:latin typeface="+mn-lt"/>
-                <a:ea typeface="+mn-ea"/>
-                <a:cs typeface="+mn-cs"/>
-              </a:rPr>
-              <a:t>is used to indicate the </a:t>
-            </a:r>
-            <a:r>
-              <a:rPr lang="en-US" sz="1200" kern="1200" dirty="0" smtClean="0">
-                <a:solidFill>
-                  <a:schemeClr val="tx1"/>
-                </a:solidFill>
-                <a:effectLst/>
-                <a:latin typeface="+mn-lt"/>
-                <a:ea typeface="+mn-ea"/>
-                <a:cs typeface="+mn-cs"/>
-              </a:rPr>
-              <a:t>severity of the patient’s candidate risk score relative to their current risk score.  It is used to quickly identify if </a:t>
-            </a:r>
-            <a:r>
-              <a:rPr lang="en-US" sz="1200" kern="1200" dirty="0" smtClean="0">
-                <a:solidFill>
-                  <a:schemeClr val="tx1"/>
-                </a:solidFill>
-                <a:effectLst/>
-                <a:latin typeface="+mn-lt"/>
-                <a:ea typeface="+mn-ea"/>
-                <a:cs typeface="+mn-cs"/>
-              </a:rPr>
-              <a:t>the</a:t>
+              <a:t>The candidate risk score meter (or gauge) is used to indicate the severity of the patient’s candidate risk score relative to their current risk score.  It is used to quickly identify if the</a:t>
             </a:r>
             <a:r>
               <a:rPr lang="en-US" sz="1200" kern="1200" baseline="0" dirty="0" smtClean="0">
@@ -2590,31 +2582,7 @@
                 <a:ea typeface="+mn-ea"/>
                 <a:cs typeface="+mn-cs"/>
               </a:rPr>
-              <a:t>candidate </a:t>
-            </a:r>
-            <a:r>
-              <a:rPr lang="en-US" sz="1200" kern="1200" dirty="0" smtClean="0">
-                <a:solidFill>
-                  <a:schemeClr val="tx1"/>
-                </a:solidFill>
-                <a:effectLst/>
-                <a:latin typeface="+mn-lt"/>
-                <a:ea typeface="+mn-ea"/>
-                <a:cs typeface="+mn-cs"/>
-              </a:rPr>
-              <a:t>HCCs would make a significant impact to </a:t>
-            </a:r>
-            <a:r>
-              <a:rPr lang="en-US" sz="1200" kern="1200" dirty="0" smtClean="0">
-                <a:solidFill>
-                  <a:schemeClr val="tx1"/>
-                </a:solidFill>
-                <a:effectLst/>
-                <a:latin typeface="+mn-lt"/>
-                <a:ea typeface="+mn-ea"/>
-                <a:cs typeface="+mn-cs"/>
-              </a:rPr>
-              <a:t>the</a:t>
+              <a:t>candidate HCCs would make a significant impact to the</a:t>
             </a:r>
             <a:r>
               <a:rPr lang="en-US" sz="1200" kern="1200" baseline="0" dirty="0" smtClean="0">
@@ -2638,19 +2606,7 @@
                 <a:ea typeface="+mn-ea"/>
                 <a:cs typeface="+mn-cs"/>
               </a:rPr>
-              <a:t>risk score, were they to be added </a:t>
-            </a:r>
-            <a:r>
-              <a:rPr lang="en-US" sz="1200" kern="1200" dirty="0" smtClean="0">
-                <a:solidFill>
-                  <a:schemeClr val="tx1"/>
-                </a:solidFill>
-                <a:effectLst/>
-                <a:latin typeface="+mn-lt"/>
-                <a:ea typeface="+mn-ea"/>
-                <a:cs typeface="+mn-cs"/>
-              </a:rPr>
-              <a:t>to the patient.</a:t>
+              <a:t>risk score, were they to be added to the patient.</a:t>
             </a:r>
           </a:p>
           <a:p>
@@ -2723,31 +2679,7 @@
                 <a:ea typeface="+mn-ea"/>
                 <a:cs typeface="+mn-cs"/>
               </a:rPr>
-              <a:t>If a patient has a Current Risk Score of 0.723 and the sum of their Candidate Risk Scores </a:t>
-            </a:r>
-            <a:r>
-              <a:rPr lang="en-US" sz="1200" kern="1200" dirty="0" smtClean="0">
-                <a:solidFill>
-                  <a:schemeClr val="tx1"/>
-                </a:solidFill>
-                <a:effectLst/>
-                <a:latin typeface="+mn-lt"/>
-                <a:ea typeface="+mn-ea"/>
-                <a:cs typeface="+mn-cs"/>
-              </a:rPr>
-              <a:t>totals1.687</a:t>
-            </a:r>
-            <a:r>
-              <a:rPr lang="en-US" sz="1200" kern="1200" dirty="0" smtClean="0">
-                <a:solidFill>
-                  <a:schemeClr val="tx1"/>
-                </a:solidFill>
-                <a:effectLst/>
-                <a:latin typeface="+mn-lt"/>
-                <a:ea typeface="+mn-ea"/>
-                <a:cs typeface="+mn-cs"/>
-              </a:rPr>
-              <a:t>, the candidate risk score meter would register 70, indicating the patient’s current risk score is 70% less then what it would be if the candidate HCCs where included.</a:t>
+              <a:t>If a patient has a Current Risk Score of 0.723 and the sum of their Candidate Risk Scores totals1.687, the candidate risk score meter would register 70, indicating the patient’s current risk score is 70% less then what it would be if the candidate HCCs where included.</a:t>
             </a:r>
           </a:p>
           <a:p>
@@ -7882,7 +7814,7 @@
           <p:nvPr/>
         </p:nvPicPr>
         <p:blipFill>
-          <a:blip r:embed="rId3">
+          <a:blip r:embed="rId5">
             <a:extLst>
               <a:ext uri="{28A0092B-C50C-407E-A947-70E740481C1C}">
                 <a14:useLocalDpi xmlns:a14="http://schemas.microsoft.com/office/drawing/2010/main" val="0"/>
@@ -7897,6 +7829,39 @@
           <a:xfrm>
             <a:off x="1101939" y="800100"/>
             <a:ext cx="6711522" cy="4741765"/>
+          </a:xfrm>
+          <a:prstGeom prst="rect">
+            <a:avLst/>
+          </a:prstGeom>
+        </p:spPr>
+      </p:pic>
+      <p:pic>
+        <p:nvPicPr>
+          <p:cNvPr id="3" name="Recorded Sound">
+            <a:hlinkClick r:id="" action="ppaction://media"/>
+          </p:cNvPr>
+          <p:cNvPicPr>
+            <a:picLocks noChangeAspect="1"/>
+          </p:cNvPicPr>
+          <p:nvPr>
+            <a:audioFile r:link="rId2"/>
+            <p:extLst>
+              <p:ext uri="{DAA4B4D4-6D71-4841-9C94-3DE7FCFB9230}">
+                <p14:media xmlns:p14="http://schemas.microsoft.com/office/powerpoint/2010/main" r:embed="rId1"/>
+              </p:ext>
+            </p:extLst>
+          </p:nvPr>
+        </p:nvPicPr>
+        <p:blipFill>
+          <a:blip r:embed="rId6"/>
+          <a:stretch>
+            <a:fillRect/>
+          </a:stretch>
+        </p:blipFill>
+        <p:spPr>
+          <a:xfrm>
+            <a:off x="9448800" y="4838700"/>
+            <a:ext cx="609600" cy="609600"/>
           </a:xfrm>
           <a:prstGeom prst="rect">
             <a:avLst/>
@@ -7921,6 +7886,93 @@
       <p:transition advTm="32958"/>
     </mc:Fallback>
   </mc:AlternateContent>
+  <p:timing>
+    <p:tnLst>
+      <p:par>
+        <p:cTn id="1" dur="indefinite" restart="never" nodeType="tmRoot">
+          <p:childTnLst>
+            <p:seq concurrent="1" nextAc="seek">
+              <p:cTn id="2" restart="whenNotActive" fill="hold" evtFilter="cancelBubble" nodeType="interactiveSeq">
+                <p:stCondLst>
+                  <p:cond evt="onClick" delay="0">
+                    <p:tgtEl>
+                      <p:spTgt spid="3"/>
+                    </p:tgtEl>
+                  </p:cond>
+                </p:stCondLst>
+                <p:endSync evt="end" delay="0">
+                  <p:rtn val="all"/>
+                </p:endSync>
+                <p:childTnLst>
+                  <p:par>
+                    <p:cTn id="3" fill="hold">
+                      <p:stCondLst>
+                        <p:cond delay="0"/>
+                      </p:stCondLst>
+                      <p:childTnLst>
+                        <p:par>
+                          <p:cTn id="4" fill="hold">
+                            <p:stCondLst>
+                              <p:cond delay="0"/>
+                            </p:stCondLst>
+                            <p:childTnLst>
+                              <p:par>
+                                <p:cTn id="5" presetID="1" presetClass="mediacall" presetSubtype="0" fill="hold" nodeType="clickEffect">
+                                  <p:stCondLst>
+                                    <p:cond delay="0"/>
+                                  </p:stCondLst>
+                                  <p:childTnLst>
+                                    <p:cmd type="call" cmd="playFrom(0.0)">
+                                      <p:cBhvr>
+                                        <p:cTn id="6" dur="32246" fill="hold"/>
+                                        <p:tgtEl>
+                                          <p:spTgt spid="3"/>
+                                        </p:tgtEl>
+                                      </p:cBhvr>
+                                    </p:cmd>
+                                  </p:childTnLst>
+                                </p:cTn>
+                              </p:par>
+                            </p:childTnLst>
+                          </p:cTn>
+                        </p:par>
+                      </p:childTnLst>
+                    </p:cTn>
+                  </p:par>
+                </p:childTnLst>
+              </p:cTn>
+              <p:nextCondLst>
+                <p:cond evt="onClick" delay="0">
+                  <p:tgtEl>
+                    <p:spTgt spid="3"/>
+                  </p:tgtEl>
+                </p:cond>
+              </p:nextCondLst>
+            </p:seq>
+            <p:audio>
+              <p:cMediaNode vol="80000">
+                <p:cTn id="7" fill="hold" display="0">
+                  <p:stCondLst>
+                    <p:cond delay="indefinite"/>
+                  </p:stCondLst>
+                  <p:endCondLst>
+                    <p:cond evt="onStopAudio" delay="0">
+                      <p:tgtEl>
+                        <p:sldTgt/>
+                      </p:tgtEl>
+                    </p:cond>
+                  </p:endCondLst>
+                </p:cTn>
+                <p:tgtEl>
+                  <p:spTgt spid="3"/>
+                </p:tgtEl>
+              </p:cMediaNode>
+            </p:audio>
+          </p:childTnLst>
+        </p:cTn>
+      </p:par>
+    </p:tnLst>
+  </p:timing>
 </p:sld>
 </file>
 

</xml_diff>